<commit_message>
tentativa de menu lateral
</commit_message>
<xml_diff>
--- a/design.pptx
+++ b/design.pptx
@@ -18,6 +18,7 @@
     <p:sldId id="267" r:id="rId12"/>
     <p:sldId id="268" r:id="rId13"/>
     <p:sldId id="266" r:id="rId14"/>
+    <p:sldId id="269" r:id="rId15"/>
   </p:sldIdLst>
   <p:sldSz cx="9144000" cy="6858000" type="screen4x3"/>
   <p:notesSz cx="6858000" cy="9144000"/>
@@ -118,7 +119,7 @@
   </p:defaultTextStyle>
   <p:extLst>
     <p:ext uri="{EFAFB233-063F-42B5-8137-9DF3F51BA10A}">
-      <p15:sldGuideLst xmlns:p15="http://schemas.microsoft.com/office/powerpoint/2012/main" xmlns="">
+      <p15:sldGuideLst xmlns:p15="http://schemas.microsoft.com/office/powerpoint/2012/main">
         <p15:guide id="1" orient="horz" pos="2160">
           <p15:clr>
             <a:srgbClr val="A4A3A4"/>
@@ -316,7 +317,7 @@
           <a:p>
             <a:fld id="{F13F1855-5749-4CE7-8869-7B9A02C9C351}" type="datetimeFigureOut">
               <a:rPr lang="pt-BR" smtClean="0"/>
-              <a:t>18/10/2019</a:t>
+              <a:t>20/11/2019</a:t>
             </a:fld>
             <a:endParaRPr lang="pt-BR"/>
           </a:p>
@@ -486,7 +487,7 @@
           <a:p>
             <a:fld id="{F13F1855-5749-4CE7-8869-7B9A02C9C351}" type="datetimeFigureOut">
               <a:rPr lang="pt-BR" smtClean="0"/>
-              <a:t>18/10/2019</a:t>
+              <a:t>20/11/2019</a:t>
             </a:fld>
             <a:endParaRPr lang="pt-BR"/>
           </a:p>
@@ -666,7 +667,7 @@
           <a:p>
             <a:fld id="{F13F1855-5749-4CE7-8869-7B9A02C9C351}" type="datetimeFigureOut">
               <a:rPr lang="pt-BR" smtClean="0"/>
-              <a:t>18/10/2019</a:t>
+              <a:t>20/11/2019</a:t>
             </a:fld>
             <a:endParaRPr lang="pt-BR"/>
           </a:p>
@@ -836,7 +837,7 @@
           <a:p>
             <a:fld id="{F13F1855-5749-4CE7-8869-7B9A02C9C351}" type="datetimeFigureOut">
               <a:rPr lang="pt-BR" smtClean="0"/>
-              <a:t>18/10/2019</a:t>
+              <a:t>20/11/2019</a:t>
             </a:fld>
             <a:endParaRPr lang="pt-BR"/>
           </a:p>
@@ -1082,7 +1083,7 @@
           <a:p>
             <a:fld id="{F13F1855-5749-4CE7-8869-7B9A02C9C351}" type="datetimeFigureOut">
               <a:rPr lang="pt-BR" smtClean="0"/>
-              <a:t>18/10/2019</a:t>
+              <a:t>20/11/2019</a:t>
             </a:fld>
             <a:endParaRPr lang="pt-BR"/>
           </a:p>
@@ -1370,7 +1371,7 @@
           <a:p>
             <a:fld id="{F13F1855-5749-4CE7-8869-7B9A02C9C351}" type="datetimeFigureOut">
               <a:rPr lang="pt-BR" smtClean="0"/>
-              <a:t>18/10/2019</a:t>
+              <a:t>20/11/2019</a:t>
             </a:fld>
             <a:endParaRPr lang="pt-BR"/>
           </a:p>
@@ -1792,7 +1793,7 @@
           <a:p>
             <a:fld id="{F13F1855-5749-4CE7-8869-7B9A02C9C351}" type="datetimeFigureOut">
               <a:rPr lang="pt-BR" smtClean="0"/>
-              <a:t>18/10/2019</a:t>
+              <a:t>20/11/2019</a:t>
             </a:fld>
             <a:endParaRPr lang="pt-BR"/>
           </a:p>
@@ -1910,7 +1911,7 @@
           <a:p>
             <a:fld id="{F13F1855-5749-4CE7-8869-7B9A02C9C351}" type="datetimeFigureOut">
               <a:rPr lang="pt-BR" smtClean="0"/>
-              <a:t>18/10/2019</a:t>
+              <a:t>20/11/2019</a:t>
             </a:fld>
             <a:endParaRPr lang="pt-BR"/>
           </a:p>
@@ -2005,7 +2006,7 @@
           <a:p>
             <a:fld id="{F13F1855-5749-4CE7-8869-7B9A02C9C351}" type="datetimeFigureOut">
               <a:rPr lang="pt-BR" smtClean="0"/>
-              <a:t>18/10/2019</a:t>
+              <a:t>20/11/2019</a:t>
             </a:fld>
             <a:endParaRPr lang="pt-BR"/>
           </a:p>
@@ -2282,7 +2283,7 @@
           <a:p>
             <a:fld id="{F13F1855-5749-4CE7-8869-7B9A02C9C351}" type="datetimeFigureOut">
               <a:rPr lang="pt-BR" smtClean="0"/>
-              <a:t>18/10/2019</a:t>
+              <a:t>20/11/2019</a:t>
             </a:fld>
             <a:endParaRPr lang="pt-BR"/>
           </a:p>
@@ -2535,7 +2536,7 @@
           <a:p>
             <a:fld id="{F13F1855-5749-4CE7-8869-7B9A02C9C351}" type="datetimeFigureOut">
               <a:rPr lang="pt-BR" smtClean="0"/>
-              <a:t>18/10/2019</a:t>
+              <a:t>20/11/2019</a:t>
             </a:fld>
             <a:endParaRPr lang="pt-BR"/>
           </a:p>
@@ -2753,7 +2754,7 @@
           <a:p>
             <a:fld id="{F13F1855-5749-4CE7-8869-7B9A02C9C351}" type="datetimeFigureOut">
               <a:rPr lang="pt-BR" smtClean="0"/>
-              <a:t>18/10/2019</a:t>
+              <a:t>20/11/2019</a:t>
             </a:fld>
             <a:endParaRPr lang="pt-BR"/>
           </a:p>
@@ -9529,85 +9530,39 @@
           </a:extLst>
         </p:spPr>
       </p:pic>
-      <p:sp>
-        <p:nvSpPr>
-          <p:cNvPr id="76" name="Retângulo de cantos arredondados 75"/>
-          <p:cNvSpPr/>
-          <p:nvPr/>
-        </p:nvSpPr>
-        <p:spPr>
-          <a:xfrm>
-            <a:off x="5580112" y="2545827"/>
-            <a:ext cx="2115750" cy="2115750"/>
-          </a:xfrm>
-          <a:prstGeom prst="roundRect">
-            <a:avLst/>
-          </a:prstGeom>
-          <a:solidFill>
-            <a:schemeClr val="accent5">
-              <a:lumMod val="40000"/>
-              <a:lumOff val="60000"/>
-            </a:schemeClr>
-          </a:solidFill>
-          <a:ln>
-            <a:noFill/>
-          </a:ln>
-        </p:spPr>
-        <p:style>
-          <a:lnRef idx="2">
-            <a:schemeClr val="accent1">
-              <a:shade val="50000"/>
-            </a:schemeClr>
-          </a:lnRef>
-          <a:fillRef idx="1">
-            <a:schemeClr val="accent1"/>
-          </a:fillRef>
-          <a:effectRef idx="0">
-            <a:schemeClr val="accent1"/>
-          </a:effectRef>
-          <a:fontRef idx="minor">
-            <a:schemeClr val="lt1"/>
-          </a:fontRef>
-        </p:style>
-        <p:txBody>
-          <a:bodyPr rtlCol="0" anchor="ctr"/>
-          <a:lstStyle/>
-          <a:p>
-            <a:pPr algn="ctr"/>
-            <a:endParaRPr lang="pt-BR"/>
-          </a:p>
-        </p:txBody>
-      </p:sp>
       <p:grpSp>
         <p:nvGrpSpPr>
-          <p:cNvPr id="77" name="Grupo 76"/>
+          <p:cNvPr id="5" name="Grupo 4"/>
           <p:cNvGrpSpPr/>
           <p:nvPr/>
         </p:nvGrpSpPr>
         <p:grpSpPr>
           <a:xfrm>
-            <a:off x="5784988" y="2742283"/>
-            <a:ext cx="1705998" cy="1722835"/>
-            <a:chOff x="6214619" y="3329160"/>
-            <a:chExt cx="1705998" cy="1722835"/>
+            <a:off x="5580112" y="2545827"/>
+            <a:ext cx="2115750" cy="2115750"/>
+            <a:chOff x="5580112" y="2545827"/>
+            <a:chExt cx="2115750" cy="2115750"/>
           </a:xfrm>
         </p:grpSpPr>
         <p:sp>
           <p:nvSpPr>
-            <p:cNvPr id="78" name="Elipse 77"/>
+            <p:cNvPr id="76" name="Retângulo de cantos arredondados 75"/>
             <p:cNvSpPr/>
             <p:nvPr/>
           </p:nvSpPr>
           <p:spPr>
             <a:xfrm>
-              <a:off x="6214619" y="3329160"/>
-              <a:ext cx="1705998" cy="1722835"/>
+              <a:off x="5580112" y="2545827"/>
+              <a:ext cx="2115750" cy="2115750"/>
             </a:xfrm>
-            <a:prstGeom prst="ellipse">
+            <a:prstGeom prst="roundRect">
               <a:avLst/>
             </a:prstGeom>
             <a:solidFill>
-              <a:srgbClr val="F6931E"/>
+              <a:schemeClr val="accent5">
+                <a:lumMod val="40000"/>
+                <a:lumOff val="60000"/>
+              </a:schemeClr>
             </a:solidFill>
             <a:ln>
               <a:noFill/>
@@ -9638,144 +9593,205 @@
             </a:p>
           </p:txBody>
         </p:sp>
-        <p:sp>
-          <p:nvSpPr>
-            <p:cNvPr id="79" name="Elipse 78"/>
-            <p:cNvSpPr/>
+        <p:grpSp>
+          <p:nvGrpSpPr>
+            <p:cNvPr id="77" name="Grupo 76"/>
+            <p:cNvGrpSpPr/>
             <p:nvPr/>
-          </p:nvSpPr>
-          <p:spPr>
+          </p:nvGrpSpPr>
+          <p:grpSpPr>
             <a:xfrm>
-              <a:off x="6324415" y="3447376"/>
-              <a:ext cx="1486405" cy="1486405"/>
+              <a:off x="5784988" y="2742283"/>
+              <a:ext cx="1705998" cy="1722835"/>
+              <a:chOff x="6214619" y="3329160"/>
+              <a:chExt cx="1705998" cy="1722835"/>
             </a:xfrm>
-            <a:prstGeom prst="ellipse">
-              <a:avLst/>
-            </a:prstGeom>
-            <a:solidFill>
-              <a:srgbClr val="F6BB00"/>
-            </a:solidFill>
-            <a:ln>
-              <a:noFill/>
-            </a:ln>
-          </p:spPr>
-          <p:style>
-            <a:lnRef idx="2">
-              <a:schemeClr val="accent1">
-                <a:shade val="50000"/>
-              </a:schemeClr>
-            </a:lnRef>
-            <a:fillRef idx="1">
-              <a:schemeClr val="accent1"/>
-            </a:fillRef>
-            <a:effectRef idx="0">
-              <a:schemeClr val="accent1"/>
-            </a:effectRef>
-            <a:fontRef idx="minor">
-              <a:schemeClr val="lt1"/>
-            </a:fontRef>
-          </p:style>
-          <p:txBody>
-            <a:bodyPr rtlCol="0" anchor="ctr"/>
-            <a:lstStyle/>
-            <a:p>
-              <a:pPr algn="ctr"/>
-              <a:endParaRPr lang="pt-BR"/>
-            </a:p>
-          </p:txBody>
-        </p:sp>
-        <p:sp>
-          <p:nvSpPr>
-            <p:cNvPr id="80" name="Elipse 79"/>
-            <p:cNvSpPr/>
-            <p:nvPr/>
-          </p:nvSpPr>
-          <p:spPr>
-            <a:xfrm>
-              <a:off x="6431718" y="3554679"/>
-              <a:ext cx="1271800" cy="1271800"/>
-            </a:xfrm>
-            <a:prstGeom prst="ellipse">
-              <a:avLst/>
-            </a:prstGeom>
-            <a:solidFill>
-              <a:srgbClr val="F4EE00"/>
-            </a:solidFill>
-            <a:ln>
-              <a:noFill/>
-            </a:ln>
-          </p:spPr>
-          <p:style>
-            <a:lnRef idx="2">
-              <a:schemeClr val="accent1">
-                <a:shade val="50000"/>
-              </a:schemeClr>
-            </a:lnRef>
-            <a:fillRef idx="1">
-              <a:schemeClr val="accent1"/>
-            </a:fillRef>
-            <a:effectRef idx="0">
-              <a:schemeClr val="accent1"/>
-            </a:effectRef>
-            <a:fontRef idx="minor">
-              <a:schemeClr val="lt1"/>
-            </a:fontRef>
-          </p:style>
-          <p:txBody>
-            <a:bodyPr rtlCol="0" anchor="ctr"/>
-            <a:lstStyle/>
-            <a:p>
-              <a:pPr algn="ctr"/>
-              <a:endParaRPr lang="pt-BR"/>
-            </a:p>
-          </p:txBody>
-        </p:sp>
-        <p:sp>
-          <p:nvSpPr>
-            <p:cNvPr id="81" name="Elipse 80"/>
-            <p:cNvSpPr/>
-            <p:nvPr/>
-          </p:nvSpPr>
-          <p:spPr>
-            <a:xfrm>
-              <a:off x="6552220" y="3675181"/>
-              <a:ext cx="1030796" cy="1030796"/>
-            </a:xfrm>
-            <a:prstGeom prst="ellipse">
-              <a:avLst/>
-            </a:prstGeom>
-            <a:solidFill>
-              <a:srgbClr val="FFFF1D"/>
-            </a:solidFill>
-            <a:ln>
-              <a:noFill/>
-            </a:ln>
-          </p:spPr>
-          <p:style>
-            <a:lnRef idx="2">
-              <a:schemeClr val="accent1">
-                <a:shade val="50000"/>
-              </a:schemeClr>
-            </a:lnRef>
-            <a:fillRef idx="1">
-              <a:schemeClr val="accent1"/>
-            </a:fillRef>
-            <a:effectRef idx="0">
-              <a:schemeClr val="accent1"/>
-            </a:effectRef>
-            <a:fontRef idx="minor">
-              <a:schemeClr val="lt1"/>
-            </a:fontRef>
-          </p:style>
-          <p:txBody>
-            <a:bodyPr rtlCol="0" anchor="ctr"/>
-            <a:lstStyle/>
-            <a:p>
-              <a:pPr algn="ctr"/>
-              <a:endParaRPr lang="pt-BR"/>
-            </a:p>
-          </p:txBody>
-        </p:sp>
+          </p:grpSpPr>
+          <p:sp>
+            <p:nvSpPr>
+              <p:cNvPr id="78" name="Elipse 77"/>
+              <p:cNvSpPr/>
+              <p:nvPr/>
+            </p:nvSpPr>
+            <p:spPr>
+              <a:xfrm>
+                <a:off x="6214619" y="3329160"/>
+                <a:ext cx="1705998" cy="1722835"/>
+              </a:xfrm>
+              <a:prstGeom prst="ellipse">
+                <a:avLst/>
+              </a:prstGeom>
+              <a:solidFill>
+                <a:srgbClr val="F6931E"/>
+              </a:solidFill>
+              <a:ln>
+                <a:noFill/>
+              </a:ln>
+            </p:spPr>
+            <p:style>
+              <a:lnRef idx="2">
+                <a:schemeClr val="accent1">
+                  <a:shade val="50000"/>
+                </a:schemeClr>
+              </a:lnRef>
+              <a:fillRef idx="1">
+                <a:schemeClr val="accent1"/>
+              </a:fillRef>
+              <a:effectRef idx="0">
+                <a:schemeClr val="accent1"/>
+              </a:effectRef>
+              <a:fontRef idx="minor">
+                <a:schemeClr val="lt1"/>
+              </a:fontRef>
+            </p:style>
+            <p:txBody>
+              <a:bodyPr rtlCol="0" anchor="ctr"/>
+              <a:lstStyle/>
+              <a:p>
+                <a:pPr algn="ctr"/>
+                <a:endParaRPr lang="pt-BR"/>
+              </a:p>
+            </p:txBody>
+          </p:sp>
+          <p:sp>
+            <p:nvSpPr>
+              <p:cNvPr id="79" name="Elipse 78"/>
+              <p:cNvSpPr/>
+              <p:nvPr/>
+            </p:nvSpPr>
+            <p:spPr>
+              <a:xfrm>
+                <a:off x="6324415" y="3447376"/>
+                <a:ext cx="1486405" cy="1486405"/>
+              </a:xfrm>
+              <a:prstGeom prst="ellipse">
+                <a:avLst/>
+              </a:prstGeom>
+              <a:solidFill>
+                <a:srgbClr val="F6BB00"/>
+              </a:solidFill>
+              <a:ln>
+                <a:noFill/>
+              </a:ln>
+            </p:spPr>
+            <p:style>
+              <a:lnRef idx="2">
+                <a:schemeClr val="accent1">
+                  <a:shade val="50000"/>
+                </a:schemeClr>
+              </a:lnRef>
+              <a:fillRef idx="1">
+                <a:schemeClr val="accent1"/>
+              </a:fillRef>
+              <a:effectRef idx="0">
+                <a:schemeClr val="accent1"/>
+              </a:effectRef>
+              <a:fontRef idx="minor">
+                <a:schemeClr val="lt1"/>
+              </a:fontRef>
+            </p:style>
+            <p:txBody>
+              <a:bodyPr rtlCol="0" anchor="ctr"/>
+              <a:lstStyle/>
+              <a:p>
+                <a:pPr algn="ctr"/>
+                <a:endParaRPr lang="pt-BR"/>
+              </a:p>
+            </p:txBody>
+          </p:sp>
+          <p:sp>
+            <p:nvSpPr>
+              <p:cNvPr id="80" name="Elipse 79"/>
+              <p:cNvSpPr/>
+              <p:nvPr/>
+            </p:nvSpPr>
+            <p:spPr>
+              <a:xfrm>
+                <a:off x="6431718" y="3554679"/>
+                <a:ext cx="1271800" cy="1271800"/>
+              </a:xfrm>
+              <a:prstGeom prst="ellipse">
+                <a:avLst/>
+              </a:prstGeom>
+              <a:solidFill>
+                <a:srgbClr val="F4EE00"/>
+              </a:solidFill>
+              <a:ln>
+                <a:noFill/>
+              </a:ln>
+            </p:spPr>
+            <p:style>
+              <a:lnRef idx="2">
+                <a:schemeClr val="accent1">
+                  <a:shade val="50000"/>
+                </a:schemeClr>
+              </a:lnRef>
+              <a:fillRef idx="1">
+                <a:schemeClr val="accent1"/>
+              </a:fillRef>
+              <a:effectRef idx="0">
+                <a:schemeClr val="accent1"/>
+              </a:effectRef>
+              <a:fontRef idx="minor">
+                <a:schemeClr val="lt1"/>
+              </a:fontRef>
+            </p:style>
+            <p:txBody>
+              <a:bodyPr rtlCol="0" anchor="ctr"/>
+              <a:lstStyle/>
+              <a:p>
+                <a:pPr algn="ctr"/>
+                <a:endParaRPr lang="pt-BR"/>
+              </a:p>
+            </p:txBody>
+          </p:sp>
+          <p:sp>
+            <p:nvSpPr>
+              <p:cNvPr id="81" name="Elipse 80"/>
+              <p:cNvSpPr/>
+              <p:nvPr/>
+            </p:nvSpPr>
+            <p:spPr>
+              <a:xfrm>
+                <a:off x="6552220" y="3675181"/>
+                <a:ext cx="1030796" cy="1030796"/>
+              </a:xfrm>
+              <a:prstGeom prst="ellipse">
+                <a:avLst/>
+              </a:prstGeom>
+              <a:solidFill>
+                <a:srgbClr val="FFFF1D"/>
+              </a:solidFill>
+              <a:ln>
+                <a:noFill/>
+              </a:ln>
+            </p:spPr>
+            <p:style>
+              <a:lnRef idx="2">
+                <a:schemeClr val="accent1">
+                  <a:shade val="50000"/>
+                </a:schemeClr>
+              </a:lnRef>
+              <a:fillRef idx="1">
+                <a:schemeClr val="accent1"/>
+              </a:fillRef>
+              <a:effectRef idx="0">
+                <a:schemeClr val="accent1"/>
+              </a:effectRef>
+              <a:fontRef idx="minor">
+                <a:schemeClr val="lt1"/>
+              </a:fontRef>
+            </p:style>
+            <p:txBody>
+              <a:bodyPr rtlCol="0" anchor="ctr"/>
+              <a:lstStyle/>
+              <a:p>
+                <a:pPr algn="ctr"/>
+                <a:endParaRPr lang="pt-BR"/>
+              </a:p>
+            </p:txBody>
+          </p:sp>
+        </p:grpSp>
       </p:grpSp>
       <p:grpSp>
         <p:nvGrpSpPr>
@@ -10860,215 +10876,106 @@
           </p:grpSp>
         </p:grpSp>
       </p:grpSp>
+      <p:sp>
+        <p:nvSpPr>
+          <p:cNvPr id="102" name="Retângulo de cantos arredondados 101"/>
+          <p:cNvSpPr/>
+          <p:nvPr/>
+        </p:nvSpPr>
+        <p:spPr>
+          <a:xfrm>
+            <a:off x="5574278" y="4729148"/>
+            <a:ext cx="2128852" cy="2128852"/>
+          </a:xfrm>
+          <a:prstGeom prst="roundRect">
+            <a:avLst/>
+          </a:prstGeom>
+          <a:solidFill>
+            <a:srgbClr val="79CD4B"/>
+          </a:solidFill>
+          <a:ln>
+            <a:noFill/>
+          </a:ln>
+        </p:spPr>
+        <p:style>
+          <a:lnRef idx="2">
+            <a:schemeClr val="accent1">
+              <a:shade val="50000"/>
+            </a:schemeClr>
+          </a:lnRef>
+          <a:fillRef idx="1">
+            <a:schemeClr val="accent1"/>
+          </a:fillRef>
+          <a:effectRef idx="0">
+            <a:schemeClr val="accent1"/>
+          </a:effectRef>
+          <a:fontRef idx="minor">
+            <a:schemeClr val="lt1"/>
+          </a:fontRef>
+        </p:style>
+        <p:txBody>
+          <a:bodyPr rtlCol="0" anchor="ctr"/>
+          <a:lstStyle/>
+          <a:p>
+            <a:pPr algn="ctr"/>
+            <a:endParaRPr lang="pt-BR"/>
+          </a:p>
+        </p:txBody>
+      </p:sp>
       <p:grpSp>
         <p:nvGrpSpPr>
-          <p:cNvPr id="101" name="Grupo 100"/>
+          <p:cNvPr id="103" name="Grupo 102"/>
           <p:cNvGrpSpPr/>
           <p:nvPr/>
         </p:nvGrpSpPr>
         <p:grpSpPr>
           <a:xfrm>
-            <a:off x="5574278" y="4729148"/>
-            <a:ext cx="2128852" cy="2128852"/>
-            <a:chOff x="3702974" y="1072734"/>
-            <a:chExt cx="2655485" cy="2655485"/>
+            <a:off x="6139321" y="5071980"/>
+            <a:ext cx="998766" cy="1443186"/>
+            <a:chOff x="4439702" y="1124744"/>
+            <a:chExt cx="1245840" cy="1800200"/>
           </a:xfrm>
         </p:grpSpPr>
-        <p:sp>
-          <p:nvSpPr>
-            <p:cNvPr id="102" name="Retângulo de cantos arredondados 101"/>
-            <p:cNvSpPr/>
-            <p:nvPr/>
-          </p:nvSpPr>
-          <p:spPr>
-            <a:xfrm>
-              <a:off x="3702974" y="1072734"/>
-              <a:ext cx="2655485" cy="2655485"/>
-            </a:xfrm>
-            <a:prstGeom prst="roundRect">
-              <a:avLst/>
-            </a:prstGeom>
-            <a:solidFill>
-              <a:srgbClr val="79CD4B"/>
-            </a:solidFill>
-            <a:ln>
-              <a:noFill/>
-            </a:ln>
-          </p:spPr>
-          <p:style>
-            <a:lnRef idx="2">
-              <a:schemeClr val="accent1">
-                <a:shade val="50000"/>
-              </a:schemeClr>
-            </a:lnRef>
-            <a:fillRef idx="1">
-              <a:schemeClr val="accent1"/>
-            </a:fillRef>
-            <a:effectRef idx="0">
-              <a:schemeClr val="accent1"/>
-            </a:effectRef>
-            <a:fontRef idx="minor">
-              <a:schemeClr val="lt1"/>
-            </a:fontRef>
-          </p:style>
-          <p:txBody>
-            <a:bodyPr rtlCol="0" anchor="ctr"/>
-            <a:lstStyle/>
-            <a:p>
-              <a:pPr algn="ctr"/>
-              <a:endParaRPr lang="pt-BR"/>
-            </a:p>
-          </p:txBody>
-        </p:sp>
         <p:grpSp>
           <p:nvGrpSpPr>
-            <p:cNvPr id="103" name="Grupo 102"/>
+            <p:cNvPr id="104" name="Grupo 103"/>
             <p:cNvGrpSpPr/>
             <p:nvPr/>
           </p:nvGrpSpPr>
           <p:grpSpPr>
             <a:xfrm>
-              <a:off x="4407797" y="1500376"/>
-              <a:ext cx="1245840" cy="1800200"/>
-              <a:chOff x="4439702" y="1124744"/>
-              <a:chExt cx="1245840" cy="1800200"/>
+              <a:off x="4439702" y="1412776"/>
+              <a:ext cx="1245840" cy="1512168"/>
+              <a:chOff x="4439702" y="1412776"/>
+              <a:chExt cx="1245840" cy="1512168"/>
             </a:xfrm>
+            <a:gradFill>
+              <a:gsLst>
+                <a:gs pos="49000">
+                  <a:srgbClr val="D6368A"/>
+                </a:gs>
+                <a:gs pos="50000">
+                  <a:srgbClr val="B92573"/>
+                </a:gs>
+              </a:gsLst>
+              <a:lin ang="10800000" scaled="0"/>
+            </a:gradFill>
           </p:grpSpPr>
-          <p:grpSp>
-            <p:nvGrpSpPr>
-              <p:cNvPr id="104" name="Grupo 103"/>
-              <p:cNvGrpSpPr/>
-              <p:nvPr/>
-            </p:nvGrpSpPr>
-            <p:grpSpPr>
-              <a:xfrm>
-                <a:off x="4439702" y="1412776"/>
-                <a:ext cx="1245840" cy="1512168"/>
-                <a:chOff x="4439702" y="1412776"/>
-                <a:chExt cx="1245840" cy="1512168"/>
-              </a:xfrm>
-              <a:gradFill>
-                <a:gsLst>
-                  <a:gs pos="49000">
-                    <a:srgbClr val="D6368A"/>
-                  </a:gs>
-                  <a:gs pos="50000">
-                    <a:srgbClr val="B92573"/>
-                  </a:gs>
-                </a:gsLst>
-                <a:lin ang="10800000" scaled="0"/>
-              </a:gradFill>
-            </p:grpSpPr>
-            <p:sp>
-              <p:nvSpPr>
-                <p:cNvPr id="118" name="Retângulo 117"/>
-                <p:cNvSpPr/>
-                <p:nvPr/>
-              </p:nvSpPr>
-              <p:spPr>
-                <a:xfrm>
-                  <a:off x="4439702" y="1876010"/>
-                  <a:ext cx="1245840" cy="1048934"/>
-                </a:xfrm>
-                <a:prstGeom prst="rect">
-                  <a:avLst/>
-                </a:prstGeom>
-                <a:grpFill/>
-                <a:ln>
-                  <a:noFill/>
-                </a:ln>
-              </p:spPr>
-              <p:style>
-                <a:lnRef idx="2">
-                  <a:schemeClr val="accent1">
-                    <a:shade val="50000"/>
-                  </a:schemeClr>
-                </a:lnRef>
-                <a:fillRef idx="1">
-                  <a:schemeClr val="accent1"/>
-                </a:fillRef>
-                <a:effectRef idx="0">
-                  <a:schemeClr val="accent1"/>
-                </a:effectRef>
-                <a:fontRef idx="minor">
-                  <a:schemeClr val="lt1"/>
-                </a:fontRef>
-              </p:style>
-              <p:txBody>
-                <a:bodyPr rtlCol="0" anchor="ctr"/>
-                <a:lstStyle/>
-                <a:p>
-                  <a:pPr algn="ctr"/>
-                  <a:endParaRPr lang="pt-BR"/>
-                </a:p>
-              </p:txBody>
-            </p:sp>
-            <p:sp>
-              <p:nvSpPr>
-                <p:cNvPr id="119" name="Trapezoide 118"/>
-                <p:cNvSpPr/>
-                <p:nvPr/>
-              </p:nvSpPr>
-              <p:spPr>
-                <a:xfrm>
-                  <a:off x="4439702" y="1412776"/>
-                  <a:ext cx="1245840" cy="463234"/>
-                </a:xfrm>
-                <a:prstGeom prst="trapezoid">
-                  <a:avLst>
-                    <a:gd name="adj" fmla="val 52964"/>
-                  </a:avLst>
-                </a:prstGeom>
-                <a:grpFill/>
-                <a:ln>
-                  <a:noFill/>
-                </a:ln>
-              </p:spPr>
-              <p:style>
-                <a:lnRef idx="2">
-                  <a:schemeClr val="accent1">
-                    <a:shade val="50000"/>
-                  </a:schemeClr>
-                </a:lnRef>
-                <a:fillRef idx="1">
-                  <a:schemeClr val="accent1"/>
-                </a:fillRef>
-                <a:effectRef idx="0">
-                  <a:schemeClr val="accent1"/>
-                </a:effectRef>
-                <a:fontRef idx="minor">
-                  <a:schemeClr val="lt1"/>
-                </a:fontRef>
-              </p:style>
-              <p:txBody>
-                <a:bodyPr rtlCol="0" anchor="ctr"/>
-                <a:lstStyle/>
-                <a:p>
-                  <a:pPr algn="ctr"/>
-                  <a:endParaRPr lang="pt-BR"/>
-                </a:p>
-              </p:txBody>
-            </p:sp>
-          </p:grpSp>
           <p:sp>
             <p:nvSpPr>
-              <p:cNvPr id="105" name="Retângulo de cantos arredondados 104"/>
+              <p:cNvPr id="118" name="Retângulo 117"/>
               <p:cNvSpPr/>
               <p:nvPr/>
             </p:nvSpPr>
             <p:spPr>
               <a:xfrm>
-                <a:off x="4545132" y="1124744"/>
-                <a:ext cx="1034980" cy="380170"/>
+                <a:off x="4439702" y="1876010"/>
+                <a:ext cx="1245840" cy="1048934"/>
               </a:xfrm>
-              <a:prstGeom prst="roundRect">
-                <a:avLst>
-                  <a:gd name="adj" fmla="val 10654"/>
-                </a:avLst>
+              <a:prstGeom prst="rect">
+                <a:avLst/>
               </a:prstGeom>
-              <a:solidFill>
-                <a:srgbClr val="D6368A"/>
-              </a:solidFill>
+              <a:grpFill/>
               <a:ln>
                 <a:noFill/>
               </a:ln>
@@ -11100,547 +11007,21 @@
           </p:sp>
           <p:sp>
             <p:nvSpPr>
-              <p:cNvPr id="106" name="Retângulo de cantos arredondados 105"/>
+              <p:cNvPr id="119" name="Trapezoide 118"/>
               <p:cNvSpPr/>
               <p:nvPr/>
             </p:nvSpPr>
             <p:spPr>
               <a:xfrm>
-                <a:off x="4644234" y="1160480"/>
-                <a:ext cx="45719" cy="292267"/>
+                <a:off x="4439702" y="1412776"/>
+                <a:ext cx="1245840" cy="463234"/>
               </a:xfrm>
-              <a:prstGeom prst="roundRect">
-                <a:avLst/>
+              <a:prstGeom prst="trapezoid">
+                <a:avLst>
+                  <a:gd name="adj" fmla="val 52964"/>
+                </a:avLst>
               </a:prstGeom>
-              <a:solidFill>
-                <a:srgbClr val="B92573"/>
-              </a:solidFill>
-              <a:ln>
-                <a:noFill/>
-              </a:ln>
-            </p:spPr>
-            <p:style>
-              <a:lnRef idx="2">
-                <a:schemeClr val="accent1">
-                  <a:shade val="50000"/>
-                </a:schemeClr>
-              </a:lnRef>
-              <a:fillRef idx="1">
-                <a:schemeClr val="accent1"/>
-              </a:fillRef>
-              <a:effectRef idx="0">
-                <a:schemeClr val="accent1"/>
-              </a:effectRef>
-              <a:fontRef idx="minor">
-                <a:schemeClr val="lt1"/>
-              </a:fontRef>
-            </p:style>
-            <p:txBody>
-              <a:bodyPr rtlCol="0" anchor="ctr"/>
-              <a:lstStyle/>
-              <a:p>
-                <a:pPr algn="ctr"/>
-                <a:endParaRPr lang="pt-BR"/>
-              </a:p>
-            </p:txBody>
-          </p:sp>
-          <p:sp>
-            <p:nvSpPr>
-              <p:cNvPr id="107" name="Retângulo de cantos arredondados 106"/>
-              <p:cNvSpPr/>
-              <p:nvPr/>
-            </p:nvSpPr>
-            <p:spPr>
-              <a:xfrm>
-                <a:off x="4735140" y="1160476"/>
-                <a:ext cx="45719" cy="292267"/>
-              </a:xfrm>
-              <a:prstGeom prst="roundRect">
-                <a:avLst/>
-              </a:prstGeom>
-              <a:solidFill>
-                <a:srgbClr val="B92573"/>
-              </a:solidFill>
-              <a:ln>
-                <a:noFill/>
-              </a:ln>
-            </p:spPr>
-            <p:style>
-              <a:lnRef idx="2">
-                <a:schemeClr val="accent1">
-                  <a:shade val="50000"/>
-                </a:schemeClr>
-              </a:lnRef>
-              <a:fillRef idx="1">
-                <a:schemeClr val="accent1"/>
-              </a:fillRef>
-              <a:effectRef idx="0">
-                <a:schemeClr val="accent1"/>
-              </a:effectRef>
-              <a:fontRef idx="minor">
-                <a:schemeClr val="lt1"/>
-              </a:fontRef>
-            </p:style>
-            <p:txBody>
-              <a:bodyPr rtlCol="0" anchor="ctr"/>
-              <a:lstStyle/>
-              <a:p>
-                <a:pPr algn="ctr"/>
-                <a:endParaRPr lang="pt-BR"/>
-              </a:p>
-            </p:txBody>
-          </p:sp>
-          <p:sp>
-            <p:nvSpPr>
-              <p:cNvPr id="108" name="Retângulo de cantos arredondados 107"/>
-              <p:cNvSpPr/>
-              <p:nvPr/>
-            </p:nvSpPr>
-            <p:spPr>
-              <a:xfrm>
-                <a:off x="4826046" y="1160480"/>
-                <a:ext cx="45719" cy="292267"/>
-              </a:xfrm>
-              <a:prstGeom prst="roundRect">
-                <a:avLst/>
-              </a:prstGeom>
-              <a:solidFill>
-                <a:srgbClr val="B92573"/>
-              </a:solidFill>
-              <a:ln>
-                <a:noFill/>
-              </a:ln>
-            </p:spPr>
-            <p:style>
-              <a:lnRef idx="2">
-                <a:schemeClr val="accent1">
-                  <a:shade val="50000"/>
-                </a:schemeClr>
-              </a:lnRef>
-              <a:fillRef idx="1">
-                <a:schemeClr val="accent1"/>
-              </a:fillRef>
-              <a:effectRef idx="0">
-                <a:schemeClr val="accent1"/>
-              </a:effectRef>
-              <a:fontRef idx="minor">
-                <a:schemeClr val="lt1"/>
-              </a:fontRef>
-            </p:style>
-            <p:txBody>
-              <a:bodyPr rtlCol="0" anchor="ctr"/>
-              <a:lstStyle/>
-              <a:p>
-                <a:pPr algn="ctr"/>
-                <a:endParaRPr lang="pt-BR"/>
-              </a:p>
-            </p:txBody>
-          </p:sp>
-          <p:sp>
-            <p:nvSpPr>
-              <p:cNvPr id="109" name="Retângulo de cantos arredondados 108"/>
-              <p:cNvSpPr/>
-              <p:nvPr/>
-            </p:nvSpPr>
-            <p:spPr>
-              <a:xfrm>
-                <a:off x="4916952" y="1160477"/>
-                <a:ext cx="45719" cy="292267"/>
-              </a:xfrm>
-              <a:prstGeom prst="roundRect">
-                <a:avLst/>
-              </a:prstGeom>
-              <a:solidFill>
-                <a:srgbClr val="B92573"/>
-              </a:solidFill>
-              <a:ln>
-                <a:noFill/>
-              </a:ln>
-            </p:spPr>
-            <p:style>
-              <a:lnRef idx="2">
-                <a:schemeClr val="accent1">
-                  <a:shade val="50000"/>
-                </a:schemeClr>
-              </a:lnRef>
-              <a:fillRef idx="1">
-                <a:schemeClr val="accent1"/>
-              </a:fillRef>
-              <a:effectRef idx="0">
-                <a:schemeClr val="accent1"/>
-              </a:effectRef>
-              <a:fontRef idx="minor">
-                <a:schemeClr val="lt1"/>
-              </a:fontRef>
-            </p:style>
-            <p:txBody>
-              <a:bodyPr rtlCol="0" anchor="ctr"/>
-              <a:lstStyle/>
-              <a:p>
-                <a:pPr algn="ctr"/>
-                <a:endParaRPr lang="pt-BR"/>
-              </a:p>
-            </p:txBody>
-          </p:sp>
-          <p:sp>
-            <p:nvSpPr>
-              <p:cNvPr id="110" name="Retângulo de cantos arredondados 109"/>
-              <p:cNvSpPr/>
-              <p:nvPr/>
-            </p:nvSpPr>
-            <p:spPr>
-              <a:xfrm>
-                <a:off x="5007858" y="1160475"/>
-                <a:ext cx="45719" cy="292267"/>
-              </a:xfrm>
-              <a:prstGeom prst="roundRect">
-                <a:avLst/>
-              </a:prstGeom>
-              <a:solidFill>
-                <a:srgbClr val="B92573"/>
-              </a:solidFill>
-              <a:ln>
-                <a:noFill/>
-              </a:ln>
-            </p:spPr>
-            <p:style>
-              <a:lnRef idx="2">
-                <a:schemeClr val="accent1">
-                  <a:shade val="50000"/>
-                </a:schemeClr>
-              </a:lnRef>
-              <a:fillRef idx="1">
-                <a:schemeClr val="accent1"/>
-              </a:fillRef>
-              <a:effectRef idx="0">
-                <a:schemeClr val="accent1"/>
-              </a:effectRef>
-              <a:fontRef idx="minor">
-                <a:schemeClr val="lt1"/>
-              </a:fontRef>
-            </p:style>
-            <p:txBody>
-              <a:bodyPr rtlCol="0" anchor="ctr"/>
-              <a:lstStyle/>
-              <a:p>
-                <a:pPr algn="ctr"/>
-                <a:endParaRPr lang="pt-BR"/>
-              </a:p>
-            </p:txBody>
-          </p:sp>
-          <p:sp>
-            <p:nvSpPr>
-              <p:cNvPr id="111" name="Retângulo de cantos arredondados 110"/>
-              <p:cNvSpPr/>
-              <p:nvPr/>
-            </p:nvSpPr>
-            <p:spPr>
-              <a:xfrm>
-                <a:off x="5098764" y="1160474"/>
-                <a:ext cx="45719" cy="292267"/>
-              </a:xfrm>
-              <a:prstGeom prst="roundRect">
-                <a:avLst/>
-              </a:prstGeom>
-              <a:solidFill>
-                <a:srgbClr val="B92573"/>
-              </a:solidFill>
-              <a:ln>
-                <a:noFill/>
-              </a:ln>
-            </p:spPr>
-            <p:style>
-              <a:lnRef idx="2">
-                <a:schemeClr val="accent1">
-                  <a:shade val="50000"/>
-                </a:schemeClr>
-              </a:lnRef>
-              <a:fillRef idx="1">
-                <a:schemeClr val="accent1"/>
-              </a:fillRef>
-              <a:effectRef idx="0">
-                <a:schemeClr val="accent1"/>
-              </a:effectRef>
-              <a:fontRef idx="minor">
-                <a:schemeClr val="lt1"/>
-              </a:fontRef>
-            </p:style>
-            <p:txBody>
-              <a:bodyPr rtlCol="0" anchor="ctr"/>
-              <a:lstStyle/>
-              <a:p>
-                <a:pPr algn="ctr"/>
-                <a:endParaRPr lang="pt-BR"/>
-              </a:p>
-            </p:txBody>
-          </p:sp>
-          <p:sp>
-            <p:nvSpPr>
-              <p:cNvPr id="112" name="Retângulo de cantos arredondados 111"/>
-              <p:cNvSpPr/>
-              <p:nvPr/>
-            </p:nvSpPr>
-            <p:spPr>
-              <a:xfrm>
-                <a:off x="5189670" y="1160473"/>
-                <a:ext cx="45719" cy="292267"/>
-              </a:xfrm>
-              <a:prstGeom prst="roundRect">
-                <a:avLst/>
-              </a:prstGeom>
-              <a:solidFill>
-                <a:srgbClr val="B92573"/>
-              </a:solidFill>
-              <a:ln>
-                <a:noFill/>
-              </a:ln>
-            </p:spPr>
-            <p:style>
-              <a:lnRef idx="2">
-                <a:schemeClr val="accent1">
-                  <a:shade val="50000"/>
-                </a:schemeClr>
-              </a:lnRef>
-              <a:fillRef idx="1">
-                <a:schemeClr val="accent1"/>
-              </a:fillRef>
-              <a:effectRef idx="0">
-                <a:schemeClr val="accent1"/>
-              </a:effectRef>
-              <a:fontRef idx="minor">
-                <a:schemeClr val="lt1"/>
-              </a:fontRef>
-            </p:style>
-            <p:txBody>
-              <a:bodyPr rtlCol="0" anchor="ctr"/>
-              <a:lstStyle/>
-              <a:p>
-                <a:pPr algn="ctr"/>
-                <a:endParaRPr lang="pt-BR"/>
-              </a:p>
-            </p:txBody>
-          </p:sp>
-          <p:sp>
-            <p:nvSpPr>
-              <p:cNvPr id="113" name="Retângulo de cantos arredondados 112"/>
-              <p:cNvSpPr/>
-              <p:nvPr/>
-            </p:nvSpPr>
-            <p:spPr>
-              <a:xfrm>
-                <a:off x="5280576" y="1160472"/>
-                <a:ext cx="45719" cy="292267"/>
-              </a:xfrm>
-              <a:prstGeom prst="roundRect">
-                <a:avLst/>
-              </a:prstGeom>
-              <a:solidFill>
-                <a:srgbClr val="B92573"/>
-              </a:solidFill>
-              <a:ln>
-                <a:noFill/>
-              </a:ln>
-            </p:spPr>
-            <p:style>
-              <a:lnRef idx="2">
-                <a:schemeClr val="accent1">
-                  <a:shade val="50000"/>
-                </a:schemeClr>
-              </a:lnRef>
-              <a:fillRef idx="1">
-                <a:schemeClr val="accent1"/>
-              </a:fillRef>
-              <a:effectRef idx="0">
-                <a:schemeClr val="accent1"/>
-              </a:effectRef>
-              <a:fontRef idx="minor">
-                <a:schemeClr val="lt1"/>
-              </a:fontRef>
-            </p:style>
-            <p:txBody>
-              <a:bodyPr rtlCol="0" anchor="ctr"/>
-              <a:lstStyle/>
-              <a:p>
-                <a:pPr algn="ctr"/>
-                <a:endParaRPr lang="pt-BR"/>
-              </a:p>
-            </p:txBody>
-          </p:sp>
-          <p:sp>
-            <p:nvSpPr>
-              <p:cNvPr id="114" name="Retângulo de cantos arredondados 113"/>
-              <p:cNvSpPr/>
-              <p:nvPr/>
-            </p:nvSpPr>
-            <p:spPr>
-              <a:xfrm>
-                <a:off x="5371482" y="1160480"/>
-                <a:ext cx="45719" cy="292267"/>
-              </a:xfrm>
-              <a:prstGeom prst="roundRect">
-                <a:avLst/>
-              </a:prstGeom>
-              <a:solidFill>
-                <a:srgbClr val="B92573"/>
-              </a:solidFill>
-              <a:ln>
-                <a:noFill/>
-              </a:ln>
-            </p:spPr>
-            <p:style>
-              <a:lnRef idx="2">
-                <a:schemeClr val="accent1">
-                  <a:shade val="50000"/>
-                </a:schemeClr>
-              </a:lnRef>
-              <a:fillRef idx="1">
-                <a:schemeClr val="accent1"/>
-              </a:fillRef>
-              <a:effectRef idx="0">
-                <a:schemeClr val="accent1"/>
-              </a:effectRef>
-              <a:fontRef idx="minor">
-                <a:schemeClr val="lt1"/>
-              </a:fontRef>
-            </p:style>
-            <p:txBody>
-              <a:bodyPr rtlCol="0" anchor="ctr"/>
-              <a:lstStyle/>
-              <a:p>
-                <a:pPr algn="ctr"/>
-                <a:endParaRPr lang="pt-BR"/>
-              </a:p>
-            </p:txBody>
-          </p:sp>
-          <p:sp>
-            <p:nvSpPr>
-              <p:cNvPr id="115" name="Retângulo de cantos arredondados 114"/>
-              <p:cNvSpPr/>
-              <p:nvPr/>
-            </p:nvSpPr>
-            <p:spPr>
-              <a:xfrm>
-                <a:off x="5462385" y="1160480"/>
-                <a:ext cx="45719" cy="292267"/>
-              </a:xfrm>
-              <a:prstGeom prst="roundRect">
-                <a:avLst/>
-              </a:prstGeom>
-              <a:solidFill>
-                <a:srgbClr val="B92573"/>
-              </a:solidFill>
-              <a:ln>
-                <a:noFill/>
-              </a:ln>
-            </p:spPr>
-            <p:style>
-              <a:lnRef idx="2">
-                <a:schemeClr val="accent1">
-                  <a:shade val="50000"/>
-                </a:schemeClr>
-              </a:lnRef>
-              <a:fillRef idx="1">
-                <a:schemeClr val="accent1"/>
-              </a:fillRef>
-              <a:effectRef idx="0">
-                <a:schemeClr val="accent1"/>
-              </a:effectRef>
-              <a:fontRef idx="minor">
-                <a:schemeClr val="lt1"/>
-              </a:fontRef>
-            </p:style>
-            <p:txBody>
-              <a:bodyPr rtlCol="0" anchor="ctr"/>
-              <a:lstStyle/>
-              <a:p>
-                <a:pPr algn="ctr"/>
-                <a:endParaRPr lang="pt-BR"/>
-              </a:p>
-            </p:txBody>
-          </p:sp>
-          <p:sp>
-            <p:nvSpPr>
-              <p:cNvPr id="116" name="Elipse 115"/>
-              <p:cNvSpPr/>
-              <p:nvPr/>
-            </p:nvSpPr>
-            <p:spPr>
-              <a:xfrm>
-                <a:off x="4679592" y="2017447"/>
-                <a:ext cx="766060" cy="766060"/>
-              </a:xfrm>
-              <a:prstGeom prst="ellipse">
-                <a:avLst/>
-              </a:prstGeom>
-              <a:gradFill>
-                <a:gsLst>
-                  <a:gs pos="49000">
-                    <a:schemeClr val="bg1"/>
-                  </a:gs>
-                  <a:gs pos="50000">
-                    <a:schemeClr val="bg1">
-                      <a:lumMod val="86000"/>
-                    </a:schemeClr>
-                  </a:gs>
-                </a:gsLst>
-                <a:lin ang="10800000" scaled="0"/>
-              </a:gradFill>
-              <a:ln>
-                <a:noFill/>
-              </a:ln>
-            </p:spPr>
-            <p:style>
-              <a:lnRef idx="2">
-                <a:schemeClr val="accent1">
-                  <a:shade val="50000"/>
-                </a:schemeClr>
-              </a:lnRef>
-              <a:fillRef idx="1">
-                <a:schemeClr val="accent1"/>
-              </a:fillRef>
-              <a:effectRef idx="0">
-                <a:schemeClr val="accent1"/>
-              </a:effectRef>
-              <a:fontRef idx="minor">
-                <a:schemeClr val="lt1"/>
-              </a:fontRef>
-            </p:style>
-            <p:txBody>
-              <a:bodyPr rtlCol="0" anchor="ctr"/>
-              <a:lstStyle/>
-              <a:p>
-                <a:pPr algn="ctr"/>
-                <a:endParaRPr lang="pt-BR"/>
-              </a:p>
-            </p:txBody>
-          </p:sp>
-          <p:sp>
-            <p:nvSpPr>
-              <p:cNvPr id="117" name="Raio 116"/>
-              <p:cNvSpPr/>
-              <p:nvPr/>
-            </p:nvSpPr>
-            <p:spPr>
-              <a:xfrm>
-                <a:off x="4819937" y="2157792"/>
-                <a:ext cx="485370" cy="485370"/>
-              </a:xfrm>
-              <a:prstGeom prst="lightningBolt">
-                <a:avLst/>
-              </a:prstGeom>
-              <a:gradFill>
-                <a:gsLst>
-                  <a:gs pos="49000">
-                    <a:srgbClr val="92D050"/>
-                  </a:gs>
-                  <a:gs pos="50000">
-                    <a:srgbClr val="92D050">
-                      <a:lumMod val="84000"/>
-                    </a:srgbClr>
-                  </a:gs>
-                </a:gsLst>
-                <a:lin ang="10800000" scaled="0"/>
-              </a:gradFill>
+              <a:grpFill/>
               <a:ln>
                 <a:noFill/>
               </a:ln>
@@ -11671,37 +11052,24 @@
             </p:txBody>
           </p:sp>
         </p:grpSp>
-      </p:grpSp>
-      <p:grpSp>
-        <p:nvGrpSpPr>
-          <p:cNvPr id="120" name="Grupo 119"/>
-          <p:cNvGrpSpPr/>
-          <p:nvPr/>
-        </p:nvGrpSpPr>
-        <p:grpSpPr>
-          <a:xfrm>
-            <a:off x="7609840" y="98479"/>
-            <a:ext cx="2918917" cy="2157545"/>
-            <a:chOff x="3058720" y="1055733"/>
-            <a:chExt cx="5046518" cy="3730180"/>
-          </a:xfrm>
-        </p:grpSpPr>
         <p:sp>
           <p:nvSpPr>
-            <p:cNvPr id="121" name="Retângulo de cantos arredondados 120"/>
+            <p:cNvPr id="105" name="Retângulo de cantos arredondados 104"/>
             <p:cNvSpPr/>
             <p:nvPr/>
           </p:nvSpPr>
           <p:spPr>
             <a:xfrm>
-              <a:off x="3716889" y="1055733"/>
-              <a:ext cx="3730180" cy="3730180"/>
+              <a:off x="4545132" y="1124744"/>
+              <a:ext cx="1034980" cy="380170"/>
             </a:xfrm>
             <a:prstGeom prst="roundRect">
-              <a:avLst/>
+              <a:avLst>
+                <a:gd name="adj" fmla="val 10654"/>
+              </a:avLst>
             </a:prstGeom>
             <a:solidFill>
-              <a:srgbClr val="C1E3C2"/>
+              <a:srgbClr val="D6368A"/>
             </a:solidFill>
             <a:ln>
               <a:noFill/>
@@ -11732,171 +11100,578 @@
             </a:p>
           </p:txBody>
         </p:sp>
-        <p:grpSp>
-          <p:nvGrpSpPr>
-            <p:cNvPr id="122" name="Grupo 121"/>
-            <p:cNvGrpSpPr/>
+        <p:sp>
+          <p:nvSpPr>
+            <p:cNvPr id="106" name="Retângulo de cantos arredondados 105"/>
+            <p:cNvSpPr/>
             <p:nvPr/>
-          </p:nvGrpSpPr>
-          <p:grpSpPr>
-            <a:xfrm rot="1800000">
-              <a:off x="3058720" y="1055733"/>
-              <a:ext cx="5046518" cy="3492637"/>
-              <a:chOff x="452634" y="347116"/>
-              <a:chExt cx="5046518" cy="3492637"/>
+          </p:nvSpPr>
+          <p:spPr>
+            <a:xfrm>
+              <a:off x="4644234" y="1160480"/>
+              <a:ext cx="45719" cy="292267"/>
             </a:xfrm>
-          </p:grpSpPr>
-          <p:sp>
-            <p:nvSpPr>
-              <p:cNvPr id="123" name="Google Shape;117;p2"/>
-              <p:cNvSpPr/>
-              <p:nvPr/>
-            </p:nvSpPr>
-            <p:spPr>
-              <a:xfrm rot="5014128">
-                <a:off x="2317134" y="540108"/>
-                <a:ext cx="3249656" cy="3114380"/>
-              </a:xfrm>
-              <a:prstGeom prst="chord">
-                <a:avLst>
-                  <a:gd name="adj1" fmla="val 2700000"/>
-                  <a:gd name="adj2" fmla="val 9134488"/>
-                </a:avLst>
-              </a:prstGeom>
-              <a:solidFill>
-                <a:srgbClr val="79CD4B"/>
-              </a:solidFill>
-              <a:ln>
-                <a:noFill/>
-              </a:ln>
-            </p:spPr>
-            <p:txBody>
-              <a:bodyPr spcFirstLastPara="1" wrap="square" lIns="91425" tIns="45700" rIns="91425" bIns="45700" anchor="ctr" anchorCtr="0">
-                <a:noAutofit/>
-              </a:bodyPr>
-              <a:lstStyle/>
-              <a:p>
-                <a:pPr marL="0" marR="0" lvl="0" indent="0" algn="ctr" rtl="0">
-                  <a:spcBef>
-                    <a:spcPts val="0"/>
-                  </a:spcBef>
-                  <a:spcAft>
-                    <a:spcPts val="0"/>
-                  </a:spcAft>
-                  <a:buNone/>
-                </a:pPr>
-                <a:endParaRPr sz="1800">
-                  <a:solidFill>
-                    <a:schemeClr val="lt1"/>
-                  </a:solidFill>
-                  <a:latin typeface="Calibri"/>
-                  <a:ea typeface="Calibri"/>
-                  <a:cs typeface="Calibri"/>
-                  <a:sym typeface="Calibri"/>
-                </a:endParaRPr>
-              </a:p>
-            </p:txBody>
-          </p:sp>
-          <p:sp>
-            <p:nvSpPr>
-              <p:cNvPr id="124" name="Google Shape;117;p2"/>
-              <p:cNvSpPr/>
-              <p:nvPr/>
-            </p:nvSpPr>
-            <p:spPr>
-              <a:xfrm rot="5014128" flipH="1" flipV="1">
-                <a:off x="328729" y="471021"/>
-                <a:ext cx="3362189" cy="3114380"/>
-              </a:xfrm>
-              <a:prstGeom prst="chord">
-                <a:avLst>
-                  <a:gd name="adj1" fmla="val 2700000"/>
-                  <a:gd name="adj2" fmla="val 9134488"/>
-                </a:avLst>
-              </a:prstGeom>
-              <a:solidFill>
-                <a:srgbClr val="79CD4B"/>
-              </a:solidFill>
-              <a:ln>
-                <a:noFill/>
-              </a:ln>
-            </p:spPr>
-            <p:txBody>
-              <a:bodyPr spcFirstLastPara="1" wrap="square" lIns="91425" tIns="45700" rIns="91425" bIns="45700" anchor="ctr" anchorCtr="0">
-                <a:noAutofit/>
-              </a:bodyPr>
-              <a:lstStyle/>
-              <a:p>
-                <a:pPr marL="0" marR="0" lvl="0" indent="0" algn="ctr" rtl="0">
-                  <a:spcBef>
-                    <a:spcPts val="0"/>
-                  </a:spcBef>
-                  <a:spcAft>
-                    <a:spcPts val="0"/>
-                  </a:spcAft>
-                  <a:buNone/>
-                </a:pPr>
-                <a:endParaRPr sz="1800">
-                  <a:solidFill>
-                    <a:schemeClr val="lt1"/>
-                  </a:solidFill>
-                  <a:latin typeface="Calibri"/>
-                  <a:ea typeface="Calibri"/>
-                  <a:cs typeface="Calibri"/>
-                  <a:sym typeface="Calibri"/>
-                </a:endParaRPr>
-              </a:p>
-            </p:txBody>
-          </p:sp>
-          <p:sp>
-            <p:nvSpPr>
-              <p:cNvPr id="125" name="Retângulo de cantos arredondados 124"/>
-              <p:cNvSpPr/>
-              <p:nvPr/>
-            </p:nvSpPr>
-            <p:spPr>
-              <a:xfrm>
-                <a:off x="2930792" y="2001893"/>
-                <a:ext cx="108012" cy="1837860"/>
-              </a:xfrm>
-              <a:prstGeom prst="roundRect">
-                <a:avLst>
-                  <a:gd name="adj" fmla="val 11111"/>
-                </a:avLst>
-              </a:prstGeom>
-              <a:solidFill>
-                <a:srgbClr val="ADE090"/>
-              </a:solidFill>
-              <a:ln>
-                <a:noFill/>
-              </a:ln>
-            </p:spPr>
-            <p:style>
-              <a:lnRef idx="2">
-                <a:schemeClr val="accent1">
-                  <a:shade val="50000"/>
-                </a:schemeClr>
-              </a:lnRef>
-              <a:fillRef idx="1">
-                <a:schemeClr val="accent1"/>
-              </a:fillRef>
-              <a:effectRef idx="0">
-                <a:schemeClr val="accent1"/>
-              </a:effectRef>
-              <a:fontRef idx="minor">
-                <a:schemeClr val="lt1"/>
-              </a:fontRef>
-            </p:style>
-            <p:txBody>
-              <a:bodyPr rtlCol="0" anchor="ctr"/>
-              <a:lstStyle/>
-              <a:p>
-                <a:pPr algn="ctr"/>
-                <a:endParaRPr lang="pt-BR"/>
-              </a:p>
-            </p:txBody>
-          </p:sp>
-        </p:grpSp>
+            <a:prstGeom prst="roundRect">
+              <a:avLst/>
+            </a:prstGeom>
+            <a:solidFill>
+              <a:srgbClr val="B92573"/>
+            </a:solidFill>
+            <a:ln>
+              <a:noFill/>
+            </a:ln>
+          </p:spPr>
+          <p:style>
+            <a:lnRef idx="2">
+              <a:schemeClr val="accent1">
+                <a:shade val="50000"/>
+              </a:schemeClr>
+            </a:lnRef>
+            <a:fillRef idx="1">
+              <a:schemeClr val="accent1"/>
+            </a:fillRef>
+            <a:effectRef idx="0">
+              <a:schemeClr val="accent1"/>
+            </a:effectRef>
+            <a:fontRef idx="minor">
+              <a:schemeClr val="lt1"/>
+            </a:fontRef>
+          </p:style>
+          <p:txBody>
+            <a:bodyPr rtlCol="0" anchor="ctr"/>
+            <a:lstStyle/>
+            <a:p>
+              <a:pPr algn="ctr"/>
+              <a:endParaRPr lang="pt-BR"/>
+            </a:p>
+          </p:txBody>
+        </p:sp>
+        <p:sp>
+          <p:nvSpPr>
+            <p:cNvPr id="107" name="Retângulo de cantos arredondados 106"/>
+            <p:cNvSpPr/>
+            <p:nvPr/>
+          </p:nvSpPr>
+          <p:spPr>
+            <a:xfrm>
+              <a:off x="4735140" y="1160476"/>
+              <a:ext cx="45719" cy="292267"/>
+            </a:xfrm>
+            <a:prstGeom prst="roundRect">
+              <a:avLst/>
+            </a:prstGeom>
+            <a:solidFill>
+              <a:srgbClr val="B92573"/>
+            </a:solidFill>
+            <a:ln>
+              <a:noFill/>
+            </a:ln>
+          </p:spPr>
+          <p:style>
+            <a:lnRef idx="2">
+              <a:schemeClr val="accent1">
+                <a:shade val="50000"/>
+              </a:schemeClr>
+            </a:lnRef>
+            <a:fillRef idx="1">
+              <a:schemeClr val="accent1"/>
+            </a:fillRef>
+            <a:effectRef idx="0">
+              <a:schemeClr val="accent1"/>
+            </a:effectRef>
+            <a:fontRef idx="minor">
+              <a:schemeClr val="lt1"/>
+            </a:fontRef>
+          </p:style>
+          <p:txBody>
+            <a:bodyPr rtlCol="0" anchor="ctr"/>
+            <a:lstStyle/>
+            <a:p>
+              <a:pPr algn="ctr"/>
+              <a:endParaRPr lang="pt-BR"/>
+            </a:p>
+          </p:txBody>
+        </p:sp>
+        <p:sp>
+          <p:nvSpPr>
+            <p:cNvPr id="108" name="Retângulo de cantos arredondados 107"/>
+            <p:cNvSpPr/>
+            <p:nvPr/>
+          </p:nvSpPr>
+          <p:spPr>
+            <a:xfrm>
+              <a:off x="4826046" y="1160480"/>
+              <a:ext cx="45719" cy="292267"/>
+            </a:xfrm>
+            <a:prstGeom prst="roundRect">
+              <a:avLst/>
+            </a:prstGeom>
+            <a:solidFill>
+              <a:srgbClr val="B92573"/>
+            </a:solidFill>
+            <a:ln>
+              <a:noFill/>
+            </a:ln>
+          </p:spPr>
+          <p:style>
+            <a:lnRef idx="2">
+              <a:schemeClr val="accent1">
+                <a:shade val="50000"/>
+              </a:schemeClr>
+            </a:lnRef>
+            <a:fillRef idx="1">
+              <a:schemeClr val="accent1"/>
+            </a:fillRef>
+            <a:effectRef idx="0">
+              <a:schemeClr val="accent1"/>
+            </a:effectRef>
+            <a:fontRef idx="minor">
+              <a:schemeClr val="lt1"/>
+            </a:fontRef>
+          </p:style>
+          <p:txBody>
+            <a:bodyPr rtlCol="0" anchor="ctr"/>
+            <a:lstStyle/>
+            <a:p>
+              <a:pPr algn="ctr"/>
+              <a:endParaRPr lang="pt-BR"/>
+            </a:p>
+          </p:txBody>
+        </p:sp>
+        <p:sp>
+          <p:nvSpPr>
+            <p:cNvPr id="109" name="Retângulo de cantos arredondados 108"/>
+            <p:cNvSpPr/>
+            <p:nvPr/>
+          </p:nvSpPr>
+          <p:spPr>
+            <a:xfrm>
+              <a:off x="4916952" y="1160477"/>
+              <a:ext cx="45719" cy="292267"/>
+            </a:xfrm>
+            <a:prstGeom prst="roundRect">
+              <a:avLst/>
+            </a:prstGeom>
+            <a:solidFill>
+              <a:srgbClr val="B92573"/>
+            </a:solidFill>
+            <a:ln>
+              <a:noFill/>
+            </a:ln>
+          </p:spPr>
+          <p:style>
+            <a:lnRef idx="2">
+              <a:schemeClr val="accent1">
+                <a:shade val="50000"/>
+              </a:schemeClr>
+            </a:lnRef>
+            <a:fillRef idx="1">
+              <a:schemeClr val="accent1"/>
+            </a:fillRef>
+            <a:effectRef idx="0">
+              <a:schemeClr val="accent1"/>
+            </a:effectRef>
+            <a:fontRef idx="minor">
+              <a:schemeClr val="lt1"/>
+            </a:fontRef>
+          </p:style>
+          <p:txBody>
+            <a:bodyPr rtlCol="0" anchor="ctr"/>
+            <a:lstStyle/>
+            <a:p>
+              <a:pPr algn="ctr"/>
+              <a:endParaRPr lang="pt-BR"/>
+            </a:p>
+          </p:txBody>
+        </p:sp>
+        <p:sp>
+          <p:nvSpPr>
+            <p:cNvPr id="110" name="Retângulo de cantos arredondados 109"/>
+            <p:cNvSpPr/>
+            <p:nvPr/>
+          </p:nvSpPr>
+          <p:spPr>
+            <a:xfrm>
+              <a:off x="5007858" y="1160475"/>
+              <a:ext cx="45719" cy="292267"/>
+            </a:xfrm>
+            <a:prstGeom prst="roundRect">
+              <a:avLst/>
+            </a:prstGeom>
+            <a:solidFill>
+              <a:srgbClr val="B92573"/>
+            </a:solidFill>
+            <a:ln>
+              <a:noFill/>
+            </a:ln>
+          </p:spPr>
+          <p:style>
+            <a:lnRef idx="2">
+              <a:schemeClr val="accent1">
+                <a:shade val="50000"/>
+              </a:schemeClr>
+            </a:lnRef>
+            <a:fillRef idx="1">
+              <a:schemeClr val="accent1"/>
+            </a:fillRef>
+            <a:effectRef idx="0">
+              <a:schemeClr val="accent1"/>
+            </a:effectRef>
+            <a:fontRef idx="minor">
+              <a:schemeClr val="lt1"/>
+            </a:fontRef>
+          </p:style>
+          <p:txBody>
+            <a:bodyPr rtlCol="0" anchor="ctr"/>
+            <a:lstStyle/>
+            <a:p>
+              <a:pPr algn="ctr"/>
+              <a:endParaRPr lang="pt-BR"/>
+            </a:p>
+          </p:txBody>
+        </p:sp>
+        <p:sp>
+          <p:nvSpPr>
+            <p:cNvPr id="111" name="Retângulo de cantos arredondados 110"/>
+            <p:cNvSpPr/>
+            <p:nvPr/>
+          </p:nvSpPr>
+          <p:spPr>
+            <a:xfrm>
+              <a:off x="5098764" y="1160474"/>
+              <a:ext cx="45719" cy="292267"/>
+            </a:xfrm>
+            <a:prstGeom prst="roundRect">
+              <a:avLst/>
+            </a:prstGeom>
+            <a:solidFill>
+              <a:srgbClr val="B92573"/>
+            </a:solidFill>
+            <a:ln>
+              <a:noFill/>
+            </a:ln>
+          </p:spPr>
+          <p:style>
+            <a:lnRef idx="2">
+              <a:schemeClr val="accent1">
+                <a:shade val="50000"/>
+              </a:schemeClr>
+            </a:lnRef>
+            <a:fillRef idx="1">
+              <a:schemeClr val="accent1"/>
+            </a:fillRef>
+            <a:effectRef idx="0">
+              <a:schemeClr val="accent1"/>
+            </a:effectRef>
+            <a:fontRef idx="minor">
+              <a:schemeClr val="lt1"/>
+            </a:fontRef>
+          </p:style>
+          <p:txBody>
+            <a:bodyPr rtlCol="0" anchor="ctr"/>
+            <a:lstStyle/>
+            <a:p>
+              <a:pPr algn="ctr"/>
+              <a:endParaRPr lang="pt-BR"/>
+            </a:p>
+          </p:txBody>
+        </p:sp>
+        <p:sp>
+          <p:nvSpPr>
+            <p:cNvPr id="112" name="Retângulo de cantos arredondados 111"/>
+            <p:cNvSpPr/>
+            <p:nvPr/>
+          </p:nvSpPr>
+          <p:spPr>
+            <a:xfrm>
+              <a:off x="5189670" y="1160473"/>
+              <a:ext cx="45719" cy="292267"/>
+            </a:xfrm>
+            <a:prstGeom prst="roundRect">
+              <a:avLst/>
+            </a:prstGeom>
+            <a:solidFill>
+              <a:srgbClr val="B92573"/>
+            </a:solidFill>
+            <a:ln>
+              <a:noFill/>
+            </a:ln>
+          </p:spPr>
+          <p:style>
+            <a:lnRef idx="2">
+              <a:schemeClr val="accent1">
+                <a:shade val="50000"/>
+              </a:schemeClr>
+            </a:lnRef>
+            <a:fillRef idx="1">
+              <a:schemeClr val="accent1"/>
+            </a:fillRef>
+            <a:effectRef idx="0">
+              <a:schemeClr val="accent1"/>
+            </a:effectRef>
+            <a:fontRef idx="minor">
+              <a:schemeClr val="lt1"/>
+            </a:fontRef>
+          </p:style>
+          <p:txBody>
+            <a:bodyPr rtlCol="0" anchor="ctr"/>
+            <a:lstStyle/>
+            <a:p>
+              <a:pPr algn="ctr"/>
+              <a:endParaRPr lang="pt-BR"/>
+            </a:p>
+          </p:txBody>
+        </p:sp>
+        <p:sp>
+          <p:nvSpPr>
+            <p:cNvPr id="113" name="Retângulo de cantos arredondados 112"/>
+            <p:cNvSpPr/>
+            <p:nvPr/>
+          </p:nvSpPr>
+          <p:spPr>
+            <a:xfrm>
+              <a:off x="5280576" y="1160472"/>
+              <a:ext cx="45719" cy="292267"/>
+            </a:xfrm>
+            <a:prstGeom prst="roundRect">
+              <a:avLst/>
+            </a:prstGeom>
+            <a:solidFill>
+              <a:srgbClr val="B92573"/>
+            </a:solidFill>
+            <a:ln>
+              <a:noFill/>
+            </a:ln>
+          </p:spPr>
+          <p:style>
+            <a:lnRef idx="2">
+              <a:schemeClr val="accent1">
+                <a:shade val="50000"/>
+              </a:schemeClr>
+            </a:lnRef>
+            <a:fillRef idx="1">
+              <a:schemeClr val="accent1"/>
+            </a:fillRef>
+            <a:effectRef idx="0">
+              <a:schemeClr val="accent1"/>
+            </a:effectRef>
+            <a:fontRef idx="minor">
+              <a:schemeClr val="lt1"/>
+            </a:fontRef>
+          </p:style>
+          <p:txBody>
+            <a:bodyPr rtlCol="0" anchor="ctr"/>
+            <a:lstStyle/>
+            <a:p>
+              <a:pPr algn="ctr"/>
+              <a:endParaRPr lang="pt-BR"/>
+            </a:p>
+          </p:txBody>
+        </p:sp>
+        <p:sp>
+          <p:nvSpPr>
+            <p:cNvPr id="114" name="Retângulo de cantos arredondados 113"/>
+            <p:cNvSpPr/>
+            <p:nvPr/>
+          </p:nvSpPr>
+          <p:spPr>
+            <a:xfrm>
+              <a:off x="5371482" y="1160480"/>
+              <a:ext cx="45719" cy="292267"/>
+            </a:xfrm>
+            <a:prstGeom prst="roundRect">
+              <a:avLst/>
+            </a:prstGeom>
+            <a:solidFill>
+              <a:srgbClr val="B92573"/>
+            </a:solidFill>
+            <a:ln>
+              <a:noFill/>
+            </a:ln>
+          </p:spPr>
+          <p:style>
+            <a:lnRef idx="2">
+              <a:schemeClr val="accent1">
+                <a:shade val="50000"/>
+              </a:schemeClr>
+            </a:lnRef>
+            <a:fillRef idx="1">
+              <a:schemeClr val="accent1"/>
+            </a:fillRef>
+            <a:effectRef idx="0">
+              <a:schemeClr val="accent1"/>
+            </a:effectRef>
+            <a:fontRef idx="minor">
+              <a:schemeClr val="lt1"/>
+            </a:fontRef>
+          </p:style>
+          <p:txBody>
+            <a:bodyPr rtlCol="0" anchor="ctr"/>
+            <a:lstStyle/>
+            <a:p>
+              <a:pPr algn="ctr"/>
+              <a:endParaRPr lang="pt-BR"/>
+            </a:p>
+          </p:txBody>
+        </p:sp>
+        <p:sp>
+          <p:nvSpPr>
+            <p:cNvPr id="115" name="Retângulo de cantos arredondados 114"/>
+            <p:cNvSpPr/>
+            <p:nvPr/>
+          </p:nvSpPr>
+          <p:spPr>
+            <a:xfrm>
+              <a:off x="5462385" y="1160480"/>
+              <a:ext cx="45719" cy="292267"/>
+            </a:xfrm>
+            <a:prstGeom prst="roundRect">
+              <a:avLst/>
+            </a:prstGeom>
+            <a:solidFill>
+              <a:srgbClr val="B92573"/>
+            </a:solidFill>
+            <a:ln>
+              <a:noFill/>
+            </a:ln>
+          </p:spPr>
+          <p:style>
+            <a:lnRef idx="2">
+              <a:schemeClr val="accent1">
+                <a:shade val="50000"/>
+              </a:schemeClr>
+            </a:lnRef>
+            <a:fillRef idx="1">
+              <a:schemeClr val="accent1"/>
+            </a:fillRef>
+            <a:effectRef idx="0">
+              <a:schemeClr val="accent1"/>
+            </a:effectRef>
+            <a:fontRef idx="minor">
+              <a:schemeClr val="lt1"/>
+            </a:fontRef>
+          </p:style>
+          <p:txBody>
+            <a:bodyPr rtlCol="0" anchor="ctr"/>
+            <a:lstStyle/>
+            <a:p>
+              <a:pPr algn="ctr"/>
+              <a:endParaRPr lang="pt-BR"/>
+            </a:p>
+          </p:txBody>
+        </p:sp>
+        <p:sp>
+          <p:nvSpPr>
+            <p:cNvPr id="116" name="Elipse 115"/>
+            <p:cNvSpPr/>
+            <p:nvPr/>
+          </p:nvSpPr>
+          <p:spPr>
+            <a:xfrm>
+              <a:off x="4679592" y="2017447"/>
+              <a:ext cx="766060" cy="766060"/>
+            </a:xfrm>
+            <a:prstGeom prst="ellipse">
+              <a:avLst/>
+            </a:prstGeom>
+            <a:gradFill>
+              <a:gsLst>
+                <a:gs pos="49000">
+                  <a:schemeClr val="bg1"/>
+                </a:gs>
+                <a:gs pos="50000">
+                  <a:schemeClr val="bg1">
+                    <a:lumMod val="86000"/>
+                  </a:schemeClr>
+                </a:gs>
+              </a:gsLst>
+              <a:lin ang="10800000" scaled="0"/>
+            </a:gradFill>
+            <a:ln>
+              <a:noFill/>
+            </a:ln>
+          </p:spPr>
+          <p:style>
+            <a:lnRef idx="2">
+              <a:schemeClr val="accent1">
+                <a:shade val="50000"/>
+              </a:schemeClr>
+            </a:lnRef>
+            <a:fillRef idx="1">
+              <a:schemeClr val="accent1"/>
+            </a:fillRef>
+            <a:effectRef idx="0">
+              <a:schemeClr val="accent1"/>
+            </a:effectRef>
+            <a:fontRef idx="minor">
+              <a:schemeClr val="lt1"/>
+            </a:fontRef>
+          </p:style>
+          <p:txBody>
+            <a:bodyPr rtlCol="0" anchor="ctr"/>
+            <a:lstStyle/>
+            <a:p>
+              <a:pPr algn="ctr"/>
+              <a:endParaRPr lang="pt-BR"/>
+            </a:p>
+          </p:txBody>
+        </p:sp>
+        <p:sp>
+          <p:nvSpPr>
+            <p:cNvPr id="117" name="Raio 116"/>
+            <p:cNvSpPr/>
+            <p:nvPr/>
+          </p:nvSpPr>
+          <p:spPr>
+            <a:xfrm>
+              <a:off x="4819937" y="2157792"/>
+              <a:ext cx="485370" cy="485370"/>
+            </a:xfrm>
+            <a:prstGeom prst="lightningBolt">
+              <a:avLst/>
+            </a:prstGeom>
+            <a:gradFill>
+              <a:gsLst>
+                <a:gs pos="49000">
+                  <a:srgbClr val="92D050"/>
+                </a:gs>
+                <a:gs pos="50000">
+                  <a:srgbClr val="92D050">
+                    <a:lumMod val="84000"/>
+                  </a:srgbClr>
+                </a:gs>
+              </a:gsLst>
+              <a:lin ang="10800000" scaled="0"/>
+            </a:gradFill>
+            <a:ln>
+              <a:noFill/>
+            </a:ln>
+          </p:spPr>
+          <p:style>
+            <a:lnRef idx="2">
+              <a:schemeClr val="accent1">
+                <a:shade val="50000"/>
+              </a:schemeClr>
+            </a:lnRef>
+            <a:fillRef idx="1">
+              <a:schemeClr val="accent1"/>
+            </a:fillRef>
+            <a:effectRef idx="0">
+              <a:schemeClr val="accent1"/>
+            </a:effectRef>
+            <a:fontRef idx="minor">
+              <a:schemeClr val="lt1"/>
+            </a:fontRef>
+          </p:style>
+          <p:txBody>
+            <a:bodyPr rtlCol="0" anchor="ctr"/>
+            <a:lstStyle/>
+            <a:p>
+              <a:pPr algn="ctr"/>
+              <a:endParaRPr lang="pt-BR"/>
+            </a:p>
+          </p:txBody>
+        </p:sp>
       </p:grpSp>
       <p:grpSp>
         <p:nvGrpSpPr>
@@ -12414,6 +12189,766 @@
             </p:style>
           </p:cxnSp>
         </p:grpSp>
+      </p:grpSp>
+      <p:grpSp>
+        <p:nvGrpSpPr>
+          <p:cNvPr id="139" name="Grupo 138"/>
+          <p:cNvGrpSpPr/>
+          <p:nvPr/>
+        </p:nvGrpSpPr>
+        <p:grpSpPr>
+          <a:xfrm>
+            <a:off x="7885110" y="4905141"/>
+            <a:ext cx="2115750" cy="2115750"/>
+            <a:chOff x="3779912" y="1521210"/>
+            <a:chExt cx="2115750" cy="2115750"/>
+          </a:xfrm>
+        </p:grpSpPr>
+        <p:sp>
+          <p:nvSpPr>
+            <p:cNvPr id="140" name="Retângulo de cantos arredondados 139"/>
+            <p:cNvSpPr/>
+            <p:nvPr/>
+          </p:nvSpPr>
+          <p:spPr>
+            <a:xfrm>
+              <a:off x="3779912" y="1521210"/>
+              <a:ext cx="2115750" cy="2115750"/>
+            </a:xfrm>
+            <a:prstGeom prst="roundRect">
+              <a:avLst/>
+            </a:prstGeom>
+            <a:solidFill>
+              <a:srgbClr val="E3C1D4"/>
+            </a:solidFill>
+            <a:ln>
+              <a:noFill/>
+            </a:ln>
+          </p:spPr>
+          <p:style>
+            <a:lnRef idx="2">
+              <a:schemeClr val="accent1">
+                <a:shade val="50000"/>
+              </a:schemeClr>
+            </a:lnRef>
+            <a:fillRef idx="1">
+              <a:schemeClr val="accent1"/>
+            </a:fillRef>
+            <a:effectRef idx="0">
+              <a:schemeClr val="accent1"/>
+            </a:effectRef>
+            <a:fontRef idx="minor">
+              <a:schemeClr val="lt1"/>
+            </a:fontRef>
+          </p:style>
+          <p:txBody>
+            <a:bodyPr rtlCol="0" anchor="ctr"/>
+            <a:lstStyle/>
+            <a:p>
+              <a:pPr algn="ctr"/>
+              <a:endParaRPr lang="pt-BR"/>
+            </a:p>
+          </p:txBody>
+        </p:sp>
+        <p:sp>
+          <p:nvSpPr>
+            <p:cNvPr id="141" name="Forma livre 140"/>
+            <p:cNvSpPr/>
+            <p:nvPr/>
+          </p:nvSpPr>
+          <p:spPr>
+            <a:xfrm>
+              <a:off x="4061254" y="1869989"/>
+              <a:ext cx="1834408" cy="1766971"/>
+            </a:xfrm>
+            <a:custGeom>
+              <a:avLst/>
+              <a:gdLst>
+                <a:gd name="connsiteX0" fmla="*/ 1186249 w 1834408"/>
+                <a:gd name="connsiteY0" fmla="*/ 0 h 1766971"/>
+                <a:gd name="connsiteX1" fmla="*/ 1834408 w 1834408"/>
+                <a:gd name="connsiteY1" fmla="*/ 457791 h 1766971"/>
+                <a:gd name="connsiteX2" fmla="*/ 1834408 w 1834408"/>
+                <a:gd name="connsiteY2" fmla="*/ 1414339 h 1766971"/>
+                <a:gd name="connsiteX3" fmla="*/ 1481776 w 1834408"/>
+                <a:gd name="connsiteY3" fmla="*/ 1766971 h 1766971"/>
+                <a:gd name="connsiteX4" fmla="*/ 500042 w 1834408"/>
+                <a:gd name="connsiteY4" fmla="*/ 1766971 h 1766971"/>
+                <a:gd name="connsiteX5" fmla="*/ 0 w 1834408"/>
+                <a:gd name="connsiteY5" fmla="*/ 1367481 h 1766971"/>
+              </a:gdLst>
+              <a:ahLst/>
+              <a:cxnLst>
+                <a:cxn ang="0">
+                  <a:pos x="connsiteX0" y="connsiteY0"/>
+                </a:cxn>
+                <a:cxn ang="0">
+                  <a:pos x="connsiteX1" y="connsiteY1"/>
+                </a:cxn>
+                <a:cxn ang="0">
+                  <a:pos x="connsiteX2" y="connsiteY2"/>
+                </a:cxn>
+                <a:cxn ang="0">
+                  <a:pos x="connsiteX3" y="connsiteY3"/>
+                </a:cxn>
+                <a:cxn ang="0">
+                  <a:pos x="connsiteX4" y="connsiteY4"/>
+                </a:cxn>
+                <a:cxn ang="0">
+                  <a:pos x="connsiteX5" y="connsiteY5"/>
+                </a:cxn>
+              </a:cxnLst>
+              <a:rect l="l" t="t" r="r" b="b"/>
+              <a:pathLst>
+                <a:path w="1834408" h="1766971">
+                  <a:moveTo>
+                    <a:pt x="1186249" y="0"/>
+                  </a:moveTo>
+                  <a:lnTo>
+                    <a:pt x="1834408" y="457791"/>
+                  </a:lnTo>
+                  <a:lnTo>
+                    <a:pt x="1834408" y="1414339"/>
+                  </a:lnTo>
+                  <a:cubicBezTo>
+                    <a:pt x="1834408" y="1609092"/>
+                    <a:pt x="1676529" y="1766971"/>
+                    <a:pt x="1481776" y="1766971"/>
+                  </a:cubicBezTo>
+                  <a:lnTo>
+                    <a:pt x="500042" y="1766971"/>
+                  </a:lnTo>
+                  <a:lnTo>
+                    <a:pt x="0" y="1367481"/>
+                  </a:lnTo>
+                  <a:close/>
+                </a:path>
+              </a:pathLst>
+            </a:custGeom>
+            <a:solidFill>
+              <a:srgbClr val="000000">
+                <a:alpha val="14118"/>
+              </a:srgbClr>
+            </a:solidFill>
+            <a:ln>
+              <a:noFill/>
+            </a:ln>
+          </p:spPr>
+          <p:style>
+            <a:lnRef idx="2">
+              <a:schemeClr val="accent1">
+                <a:shade val="50000"/>
+              </a:schemeClr>
+            </a:lnRef>
+            <a:fillRef idx="1">
+              <a:schemeClr val="accent1"/>
+            </a:fillRef>
+            <a:effectRef idx="0">
+              <a:schemeClr val="accent1"/>
+            </a:effectRef>
+            <a:fontRef idx="minor">
+              <a:schemeClr val="lt1"/>
+            </a:fontRef>
+          </p:style>
+          <p:txBody>
+            <a:bodyPr rtlCol="0" anchor="ctr"/>
+            <a:lstStyle/>
+            <a:p>
+              <a:pPr algn="ctr"/>
+              <a:endParaRPr lang="pt-BR"/>
+            </a:p>
+          </p:txBody>
+        </p:sp>
+        <p:sp>
+          <p:nvSpPr>
+            <p:cNvPr id="142" name="Retângulo de cantos arredondados 141"/>
+            <p:cNvSpPr/>
+            <p:nvPr/>
+          </p:nvSpPr>
+          <p:spPr>
+            <a:xfrm rot="21253335">
+              <a:off x="4007971" y="2368276"/>
+              <a:ext cx="914400" cy="914400"/>
+            </a:xfrm>
+            <a:prstGeom prst="roundRect">
+              <a:avLst/>
+            </a:prstGeom>
+            <a:solidFill>
+              <a:schemeClr val="bg1"/>
+            </a:solidFill>
+            <a:ln>
+              <a:noFill/>
+            </a:ln>
+            <a:effectLst>
+              <a:outerShdw blurRad="12700" dist="101600" dir="9840000" sx="90000" sy="90000" algn="ctr" rotWithShape="0">
+                <a:srgbClr val="000000">
+                  <a:alpha val="19000"/>
+                </a:srgbClr>
+              </a:outerShdw>
+            </a:effectLst>
+          </p:spPr>
+          <p:style>
+            <a:lnRef idx="2">
+              <a:schemeClr val="accent1">
+                <a:shade val="50000"/>
+              </a:schemeClr>
+            </a:lnRef>
+            <a:fillRef idx="1">
+              <a:schemeClr val="accent1"/>
+            </a:fillRef>
+            <a:effectRef idx="0">
+              <a:schemeClr val="accent1"/>
+            </a:effectRef>
+            <a:fontRef idx="minor">
+              <a:schemeClr val="lt1"/>
+            </a:fontRef>
+          </p:style>
+          <p:txBody>
+            <a:bodyPr rtlCol="0" anchor="ctr"/>
+            <a:lstStyle/>
+            <a:p>
+              <a:pPr algn="ctr"/>
+              <a:endParaRPr lang="pt-BR"/>
+            </a:p>
+          </p:txBody>
+        </p:sp>
+        <p:sp>
+          <p:nvSpPr>
+            <p:cNvPr id="143" name="Retângulo de cantos arredondados 142"/>
+            <p:cNvSpPr/>
+            <p:nvPr/>
+          </p:nvSpPr>
+          <p:spPr>
+            <a:xfrm rot="1446222">
+              <a:off x="4753203" y="2368276"/>
+              <a:ext cx="914400" cy="914400"/>
+            </a:xfrm>
+            <a:prstGeom prst="roundRect">
+              <a:avLst/>
+            </a:prstGeom>
+            <a:solidFill>
+              <a:schemeClr val="bg1"/>
+            </a:solidFill>
+            <a:ln>
+              <a:noFill/>
+            </a:ln>
+            <a:effectLst>
+              <a:outerShdw dist="114300" dir="1200000" sx="90000" sy="90000" algn="ctr" rotWithShape="0">
+                <a:schemeClr val="tx1">
+                  <a:lumMod val="50000"/>
+                  <a:lumOff val="50000"/>
+                  <a:alpha val="19000"/>
+                </a:schemeClr>
+              </a:outerShdw>
+            </a:effectLst>
+          </p:spPr>
+          <p:style>
+            <a:lnRef idx="2">
+              <a:schemeClr val="accent1">
+                <a:shade val="50000"/>
+              </a:schemeClr>
+            </a:lnRef>
+            <a:fillRef idx="1">
+              <a:schemeClr val="accent1"/>
+            </a:fillRef>
+            <a:effectRef idx="0">
+              <a:schemeClr val="accent1"/>
+            </a:effectRef>
+            <a:fontRef idx="minor">
+              <a:schemeClr val="lt1"/>
+            </a:fontRef>
+          </p:style>
+          <p:txBody>
+            <a:bodyPr rtlCol="0" anchor="ctr"/>
+            <a:lstStyle/>
+            <a:p>
+              <a:pPr algn="ctr"/>
+              <a:endParaRPr lang="pt-BR"/>
+            </a:p>
+          </p:txBody>
+        </p:sp>
+        <p:sp>
+          <p:nvSpPr>
+            <p:cNvPr id="144" name="Elipse 143"/>
+            <p:cNvSpPr/>
+            <p:nvPr/>
+          </p:nvSpPr>
+          <p:spPr>
+            <a:xfrm>
+              <a:off x="4064844" y="3068960"/>
+              <a:ext cx="128288" cy="128288"/>
+            </a:xfrm>
+            <a:prstGeom prst="ellipse">
+              <a:avLst/>
+            </a:prstGeom>
+            <a:solidFill>
+              <a:srgbClr val="F9F9F9"/>
+            </a:solidFill>
+            <a:ln>
+              <a:noFill/>
+            </a:ln>
+          </p:spPr>
+          <p:style>
+            <a:lnRef idx="2">
+              <a:schemeClr val="accent1">
+                <a:shade val="50000"/>
+              </a:schemeClr>
+            </a:lnRef>
+            <a:fillRef idx="1">
+              <a:schemeClr val="accent1"/>
+            </a:fillRef>
+            <a:effectRef idx="0">
+              <a:schemeClr val="accent1"/>
+            </a:effectRef>
+            <a:fontRef idx="minor">
+              <a:schemeClr val="lt1"/>
+            </a:fontRef>
+          </p:style>
+          <p:txBody>
+            <a:bodyPr rtlCol="0" anchor="ctr"/>
+            <a:lstStyle/>
+            <a:p>
+              <a:pPr algn="ctr"/>
+              <a:endParaRPr lang="pt-BR"/>
+            </a:p>
+          </p:txBody>
+        </p:sp>
+        <p:sp>
+          <p:nvSpPr>
+            <p:cNvPr id="145" name="Elipse 144"/>
+            <p:cNvSpPr/>
+            <p:nvPr/>
+          </p:nvSpPr>
+          <p:spPr>
+            <a:xfrm>
+              <a:off x="5371659" y="2917279"/>
+              <a:ext cx="128288" cy="128288"/>
+            </a:xfrm>
+            <a:prstGeom prst="ellipse">
+              <a:avLst/>
+            </a:prstGeom>
+            <a:solidFill>
+              <a:srgbClr val="F9F9F9"/>
+            </a:solidFill>
+            <a:ln>
+              <a:noFill/>
+            </a:ln>
+          </p:spPr>
+          <p:style>
+            <a:lnRef idx="2">
+              <a:schemeClr val="accent1">
+                <a:shade val="50000"/>
+              </a:schemeClr>
+            </a:lnRef>
+            <a:fillRef idx="1">
+              <a:schemeClr val="accent1"/>
+            </a:fillRef>
+            <a:effectRef idx="0">
+              <a:schemeClr val="accent1"/>
+            </a:effectRef>
+            <a:fontRef idx="minor">
+              <a:schemeClr val="lt1"/>
+            </a:fontRef>
+          </p:style>
+          <p:txBody>
+            <a:bodyPr rtlCol="0" anchor="ctr"/>
+            <a:lstStyle/>
+            <a:p>
+              <a:pPr algn="ctr"/>
+              <a:endParaRPr lang="pt-BR"/>
+            </a:p>
+          </p:txBody>
+        </p:sp>
+        <p:sp>
+          <p:nvSpPr>
+            <p:cNvPr id="146" name="Elipse 145"/>
+            <p:cNvSpPr/>
+            <p:nvPr/>
+          </p:nvSpPr>
+          <p:spPr>
+            <a:xfrm>
+              <a:off x="5146259" y="1973802"/>
+              <a:ext cx="128288" cy="128288"/>
+            </a:xfrm>
+            <a:prstGeom prst="ellipse">
+              <a:avLst/>
+            </a:prstGeom>
+            <a:solidFill>
+              <a:srgbClr val="F9F9F9"/>
+            </a:solidFill>
+            <a:ln>
+              <a:noFill/>
+            </a:ln>
+          </p:spPr>
+          <p:style>
+            <a:lnRef idx="2">
+              <a:schemeClr val="accent1">
+                <a:shade val="50000"/>
+              </a:schemeClr>
+            </a:lnRef>
+            <a:fillRef idx="1">
+              <a:schemeClr val="accent1"/>
+            </a:fillRef>
+            <a:effectRef idx="0">
+              <a:schemeClr val="accent1"/>
+            </a:effectRef>
+            <a:fontRef idx="minor">
+              <a:schemeClr val="lt1"/>
+            </a:fontRef>
+          </p:style>
+          <p:txBody>
+            <a:bodyPr rtlCol="0" anchor="ctr"/>
+            <a:lstStyle/>
+            <a:p>
+              <a:pPr algn="ctr"/>
+              <a:endParaRPr lang="pt-BR"/>
+            </a:p>
+          </p:txBody>
+        </p:sp>
+        <p:sp>
+          <p:nvSpPr>
+            <p:cNvPr id="147" name="Elipse 146"/>
+            <p:cNvSpPr/>
+            <p:nvPr/>
+          </p:nvSpPr>
+          <p:spPr>
+            <a:xfrm>
+              <a:off x="4605910" y="2579085"/>
+              <a:ext cx="128288" cy="128288"/>
+            </a:xfrm>
+            <a:prstGeom prst="ellipse">
+              <a:avLst/>
+            </a:prstGeom>
+            <a:solidFill>
+              <a:srgbClr val="F9F9F9"/>
+            </a:solidFill>
+            <a:ln>
+              <a:noFill/>
+            </a:ln>
+          </p:spPr>
+          <p:style>
+            <a:lnRef idx="2">
+              <a:schemeClr val="accent1">
+                <a:shade val="50000"/>
+              </a:schemeClr>
+            </a:lnRef>
+            <a:fillRef idx="1">
+              <a:schemeClr val="accent1"/>
+            </a:fillRef>
+            <a:effectRef idx="0">
+              <a:schemeClr val="accent1"/>
+            </a:effectRef>
+            <a:fontRef idx="minor">
+              <a:schemeClr val="lt1"/>
+            </a:fontRef>
+          </p:style>
+          <p:txBody>
+            <a:bodyPr rtlCol="0" anchor="ctr"/>
+            <a:lstStyle/>
+            <a:p>
+              <a:pPr algn="ctr"/>
+              <a:endParaRPr lang="pt-BR"/>
+            </a:p>
+          </p:txBody>
+        </p:sp>
+        <p:sp>
+          <p:nvSpPr>
+            <p:cNvPr id="148" name="Retângulo de cantos arredondados 147"/>
+            <p:cNvSpPr/>
+            <p:nvPr/>
+          </p:nvSpPr>
+          <p:spPr>
+            <a:xfrm>
+              <a:off x="4465171" y="1875494"/>
+              <a:ext cx="914400" cy="914400"/>
+            </a:xfrm>
+            <a:prstGeom prst="roundRect">
+              <a:avLst/>
+            </a:prstGeom>
+            <a:solidFill>
+              <a:schemeClr val="bg1"/>
+            </a:solidFill>
+            <a:ln>
+              <a:noFill/>
+            </a:ln>
+            <a:effectLst>
+              <a:outerShdw blurRad="12700" dist="152400" dir="5400000" sx="90000" sy="90000" algn="t" rotWithShape="0">
+                <a:prstClr val="black">
+                  <a:alpha val="19000"/>
+                </a:prstClr>
+              </a:outerShdw>
+            </a:effectLst>
+          </p:spPr>
+          <p:style>
+            <a:lnRef idx="2">
+              <a:schemeClr val="accent1">
+                <a:shade val="50000"/>
+              </a:schemeClr>
+            </a:lnRef>
+            <a:fillRef idx="1">
+              <a:schemeClr val="accent1"/>
+            </a:fillRef>
+            <a:effectRef idx="0">
+              <a:schemeClr val="accent1"/>
+            </a:effectRef>
+            <a:fontRef idx="minor">
+              <a:schemeClr val="lt1"/>
+            </a:fontRef>
+          </p:style>
+          <p:txBody>
+            <a:bodyPr rtlCol="0" anchor="ctr"/>
+            <a:lstStyle/>
+            <a:p>
+              <a:pPr algn="ctr"/>
+              <a:endParaRPr lang="pt-BR"/>
+            </a:p>
+          </p:txBody>
+        </p:sp>
+      </p:grpSp>
+      <p:grpSp>
+        <p:nvGrpSpPr>
+          <p:cNvPr id="149" name="Grupo 148"/>
+          <p:cNvGrpSpPr/>
+          <p:nvPr/>
+        </p:nvGrpSpPr>
+        <p:grpSpPr>
+          <a:xfrm>
+            <a:off x="8138013" y="85964"/>
+            <a:ext cx="2128852" cy="2128852"/>
+            <a:chOff x="3635896" y="1916832"/>
+            <a:chExt cx="2128852" cy="2128852"/>
+          </a:xfrm>
+        </p:grpSpPr>
+        <p:sp>
+          <p:nvSpPr>
+            <p:cNvPr id="150" name="Retângulo de cantos arredondados 149"/>
+            <p:cNvSpPr/>
+            <p:nvPr/>
+          </p:nvSpPr>
+          <p:spPr>
+            <a:xfrm>
+              <a:off x="3635896" y="1916832"/>
+              <a:ext cx="2128852" cy="2128852"/>
+            </a:xfrm>
+            <a:prstGeom prst="roundRect">
+              <a:avLst/>
+            </a:prstGeom>
+            <a:solidFill>
+              <a:srgbClr val="ADE090"/>
+            </a:solidFill>
+            <a:ln>
+              <a:noFill/>
+            </a:ln>
+          </p:spPr>
+          <p:style>
+            <a:lnRef idx="2">
+              <a:schemeClr val="accent1">
+                <a:shade val="50000"/>
+              </a:schemeClr>
+            </a:lnRef>
+            <a:fillRef idx="1">
+              <a:schemeClr val="accent1"/>
+            </a:fillRef>
+            <a:effectRef idx="0">
+              <a:schemeClr val="accent1"/>
+            </a:effectRef>
+            <a:fontRef idx="minor">
+              <a:schemeClr val="lt1"/>
+            </a:fontRef>
+          </p:style>
+          <p:txBody>
+            <a:bodyPr rtlCol="0" anchor="ctr"/>
+            <a:lstStyle/>
+            <a:p>
+              <a:pPr algn="ctr"/>
+              <a:endParaRPr lang="pt-BR"/>
+            </a:p>
+          </p:txBody>
+        </p:sp>
+        <p:sp>
+          <p:nvSpPr>
+            <p:cNvPr id="151" name="Elipse 150"/>
+            <p:cNvSpPr/>
+            <p:nvPr/>
+          </p:nvSpPr>
+          <p:spPr>
+            <a:xfrm>
+              <a:off x="4067944" y="2060848"/>
+              <a:ext cx="1331026" cy="1584176"/>
+            </a:xfrm>
+            <a:prstGeom prst="ellipse">
+              <a:avLst/>
+            </a:prstGeom>
+            <a:solidFill>
+              <a:srgbClr val="00B050"/>
+            </a:solidFill>
+            <a:ln>
+              <a:noFill/>
+            </a:ln>
+          </p:spPr>
+          <p:style>
+            <a:lnRef idx="2">
+              <a:schemeClr val="accent1">
+                <a:shade val="50000"/>
+              </a:schemeClr>
+            </a:lnRef>
+            <a:fillRef idx="1">
+              <a:schemeClr val="accent1"/>
+            </a:fillRef>
+            <a:effectRef idx="0">
+              <a:schemeClr val="accent1"/>
+            </a:effectRef>
+            <a:fontRef idx="minor">
+              <a:schemeClr val="lt1"/>
+            </a:fontRef>
+          </p:style>
+          <p:txBody>
+            <a:bodyPr rtlCol="0" anchor="ctr"/>
+            <a:lstStyle/>
+            <a:p>
+              <a:pPr algn="ctr"/>
+              <a:endParaRPr lang="pt-BR"/>
+            </a:p>
+          </p:txBody>
+        </p:sp>
+        <p:sp>
+          <p:nvSpPr>
+            <p:cNvPr id="152" name="Triângulo isósceles 151"/>
+            <p:cNvSpPr/>
+            <p:nvPr/>
+          </p:nvSpPr>
+          <p:spPr>
+            <a:xfrm>
+              <a:off x="4620446" y="2240755"/>
+              <a:ext cx="226023" cy="1769038"/>
+            </a:xfrm>
+            <a:prstGeom prst="triangle">
+              <a:avLst/>
+            </a:prstGeom>
+            <a:solidFill>
+              <a:srgbClr val="5D4141"/>
+            </a:solidFill>
+            <a:ln>
+              <a:noFill/>
+            </a:ln>
+          </p:spPr>
+          <p:style>
+            <a:lnRef idx="2">
+              <a:schemeClr val="accent1">
+                <a:shade val="50000"/>
+              </a:schemeClr>
+            </a:lnRef>
+            <a:fillRef idx="1">
+              <a:schemeClr val="accent1"/>
+            </a:fillRef>
+            <a:effectRef idx="0">
+              <a:schemeClr val="accent1"/>
+            </a:effectRef>
+            <a:fontRef idx="minor">
+              <a:schemeClr val="lt1"/>
+            </a:fontRef>
+          </p:style>
+          <p:txBody>
+            <a:bodyPr rtlCol="0" anchor="ctr"/>
+            <a:lstStyle/>
+            <a:p>
+              <a:pPr algn="ctr"/>
+              <a:endParaRPr lang="pt-BR"/>
+            </a:p>
+          </p:txBody>
+        </p:sp>
+        <p:sp>
+          <p:nvSpPr>
+            <p:cNvPr id="153" name="Triângulo isósceles 152"/>
+            <p:cNvSpPr/>
+            <p:nvPr/>
+          </p:nvSpPr>
+          <p:spPr>
+            <a:xfrm rot="3544326">
+              <a:off x="4941408" y="2659289"/>
+              <a:ext cx="97593" cy="640008"/>
+            </a:xfrm>
+            <a:prstGeom prst="triangle">
+              <a:avLst/>
+            </a:prstGeom>
+            <a:solidFill>
+              <a:srgbClr val="5D4141"/>
+            </a:solidFill>
+            <a:ln>
+              <a:noFill/>
+            </a:ln>
+          </p:spPr>
+          <p:style>
+            <a:lnRef idx="2">
+              <a:schemeClr val="accent1">
+                <a:shade val="50000"/>
+              </a:schemeClr>
+            </a:lnRef>
+            <a:fillRef idx="1">
+              <a:schemeClr val="accent1"/>
+            </a:fillRef>
+            <a:effectRef idx="0">
+              <a:schemeClr val="accent1"/>
+            </a:effectRef>
+            <a:fontRef idx="minor">
+              <a:schemeClr val="lt1"/>
+            </a:fontRef>
+          </p:style>
+          <p:txBody>
+            <a:bodyPr rtlCol="0" anchor="ctr"/>
+            <a:lstStyle/>
+            <a:p>
+              <a:pPr algn="ctr"/>
+              <a:endParaRPr lang="pt-BR"/>
+            </a:p>
+          </p:txBody>
+        </p:sp>
+        <p:sp>
+          <p:nvSpPr>
+            <p:cNvPr id="154" name="Triângulo isósceles 153"/>
+            <p:cNvSpPr/>
+            <p:nvPr/>
+          </p:nvSpPr>
+          <p:spPr>
+            <a:xfrm rot="18248600">
+              <a:off x="4450770" y="2870353"/>
+              <a:ext cx="97593" cy="599395"/>
+            </a:xfrm>
+            <a:prstGeom prst="triangle">
+              <a:avLst/>
+            </a:prstGeom>
+            <a:solidFill>
+              <a:srgbClr val="5D4141"/>
+            </a:solidFill>
+            <a:ln>
+              <a:noFill/>
+            </a:ln>
+          </p:spPr>
+          <p:style>
+            <a:lnRef idx="2">
+              <a:schemeClr val="accent1">
+                <a:shade val="50000"/>
+              </a:schemeClr>
+            </a:lnRef>
+            <a:fillRef idx="1">
+              <a:schemeClr val="accent1"/>
+            </a:fillRef>
+            <a:effectRef idx="0">
+              <a:schemeClr val="accent1"/>
+            </a:effectRef>
+            <a:fontRef idx="minor">
+              <a:schemeClr val="lt1"/>
+            </a:fontRef>
+          </p:style>
+          <p:txBody>
+            <a:bodyPr rtlCol="0" anchor="ctr"/>
+            <a:lstStyle/>
+            <a:p>
+              <a:pPr algn="ctr"/>
+              <a:endParaRPr lang="pt-BR"/>
+            </a:p>
+          </p:txBody>
+        </p:sp>
       </p:grpSp>
     </p:spTree>
     <p:extLst>
@@ -16480,6 +17015,933 @@
       </p:par>
     </p:tnLst>
   </p:timing>
+</p:sld>
+</file>
+
+<file path=ppt/slides/slide14.xml><?xml version="1.0" encoding="utf-8"?>
+<p:sld xmlns:a="http://schemas.openxmlformats.org/drawingml/2006/main" xmlns:r="http://schemas.openxmlformats.org/officeDocument/2006/relationships" xmlns:p="http://schemas.openxmlformats.org/presentationml/2006/main">
+  <p:cSld>
+    <p:spTree>
+      <p:nvGrpSpPr>
+        <p:cNvPr id="1" name=""/>
+        <p:cNvGrpSpPr/>
+        <p:nvPr/>
+      </p:nvGrpSpPr>
+      <p:grpSpPr>
+        <a:xfrm>
+          <a:off x="0" y="0"/>
+          <a:ext cx="0" cy="0"/>
+          <a:chOff x="0" y="0"/>
+          <a:chExt cx="0" cy="0"/>
+        </a:xfrm>
+      </p:grpSpPr>
+      <p:pic>
+        <p:nvPicPr>
+          <p:cNvPr id="49" name="Imagem 48"/>
+          <p:cNvPicPr>
+            <a:picLocks noChangeAspect="1"/>
+          </p:cNvPicPr>
+          <p:nvPr/>
+        </p:nvPicPr>
+        <p:blipFill>
+          <a:blip r:embed="rId2"/>
+          <a:stretch>
+            <a:fillRect/>
+          </a:stretch>
+        </p:blipFill>
+        <p:spPr>
+          <a:xfrm>
+            <a:off x="-7653" y="404664"/>
+            <a:ext cx="2057400" cy="2219325"/>
+          </a:xfrm>
+          <a:prstGeom prst="rect">
+            <a:avLst/>
+          </a:prstGeom>
+        </p:spPr>
+      </p:pic>
+      <p:sp>
+        <p:nvSpPr>
+          <p:cNvPr id="58" name="Elipse 57"/>
+          <p:cNvSpPr/>
+          <p:nvPr/>
+        </p:nvSpPr>
+        <p:spPr>
+          <a:xfrm>
+            <a:off x="3275856" y="1556792"/>
+            <a:ext cx="2880000" cy="2880000"/>
+          </a:xfrm>
+          <a:prstGeom prst="ellipse">
+            <a:avLst/>
+          </a:prstGeom>
+          <a:solidFill>
+            <a:schemeClr val="accent1">
+              <a:lumMod val="20000"/>
+              <a:lumOff val="80000"/>
+            </a:schemeClr>
+          </a:solidFill>
+          <a:ln>
+            <a:noFill/>
+          </a:ln>
+        </p:spPr>
+        <p:style>
+          <a:lnRef idx="2">
+            <a:schemeClr val="accent1">
+              <a:shade val="50000"/>
+            </a:schemeClr>
+          </a:lnRef>
+          <a:fillRef idx="1">
+            <a:schemeClr val="accent1"/>
+          </a:fillRef>
+          <a:effectRef idx="0">
+            <a:schemeClr val="accent1"/>
+          </a:effectRef>
+          <a:fontRef idx="minor">
+            <a:schemeClr val="lt1"/>
+          </a:fontRef>
+        </p:style>
+        <p:txBody>
+          <a:bodyPr rtlCol="0" anchor="ctr"/>
+          <a:lstStyle/>
+          <a:p>
+            <a:pPr algn="ctr"/>
+            <a:endParaRPr lang="pt-BR"/>
+          </a:p>
+        </p:txBody>
+      </p:sp>
+      <p:sp>
+        <p:nvSpPr>
+          <p:cNvPr id="60" name="Retângulo de cantos arredondados 2"/>
+          <p:cNvSpPr/>
+          <p:nvPr/>
+        </p:nvSpPr>
+        <p:spPr>
+          <a:xfrm>
+            <a:off x="4139792" y="2616560"/>
+            <a:ext cx="1152128" cy="1329482"/>
+          </a:xfrm>
+          <a:custGeom>
+            <a:avLst/>
+            <a:gdLst>
+              <a:gd name="connsiteX0" fmla="*/ 0 w 1152128"/>
+              <a:gd name="connsiteY0" fmla="*/ 180020 h 1368152"/>
+              <a:gd name="connsiteX1" fmla="*/ 180020 w 1152128"/>
+              <a:gd name="connsiteY1" fmla="*/ 0 h 1368152"/>
+              <a:gd name="connsiteX2" fmla="*/ 972108 w 1152128"/>
+              <a:gd name="connsiteY2" fmla="*/ 0 h 1368152"/>
+              <a:gd name="connsiteX3" fmla="*/ 1152128 w 1152128"/>
+              <a:gd name="connsiteY3" fmla="*/ 180020 h 1368152"/>
+              <a:gd name="connsiteX4" fmla="*/ 1152128 w 1152128"/>
+              <a:gd name="connsiteY4" fmla="*/ 1188132 h 1368152"/>
+              <a:gd name="connsiteX5" fmla="*/ 972108 w 1152128"/>
+              <a:gd name="connsiteY5" fmla="*/ 1368152 h 1368152"/>
+              <a:gd name="connsiteX6" fmla="*/ 180020 w 1152128"/>
+              <a:gd name="connsiteY6" fmla="*/ 1368152 h 1368152"/>
+              <a:gd name="connsiteX7" fmla="*/ 0 w 1152128"/>
+              <a:gd name="connsiteY7" fmla="*/ 1188132 h 1368152"/>
+              <a:gd name="connsiteX8" fmla="*/ 0 w 1152128"/>
+              <a:gd name="connsiteY8" fmla="*/ 180020 h 1368152"/>
+              <a:gd name="connsiteX0" fmla="*/ 57150 w 1152128"/>
+              <a:gd name="connsiteY0" fmla="*/ 184782 h 1368152"/>
+              <a:gd name="connsiteX1" fmla="*/ 180020 w 1152128"/>
+              <a:gd name="connsiteY1" fmla="*/ 0 h 1368152"/>
+              <a:gd name="connsiteX2" fmla="*/ 972108 w 1152128"/>
+              <a:gd name="connsiteY2" fmla="*/ 0 h 1368152"/>
+              <a:gd name="connsiteX3" fmla="*/ 1152128 w 1152128"/>
+              <a:gd name="connsiteY3" fmla="*/ 180020 h 1368152"/>
+              <a:gd name="connsiteX4" fmla="*/ 1152128 w 1152128"/>
+              <a:gd name="connsiteY4" fmla="*/ 1188132 h 1368152"/>
+              <a:gd name="connsiteX5" fmla="*/ 972108 w 1152128"/>
+              <a:gd name="connsiteY5" fmla="*/ 1368152 h 1368152"/>
+              <a:gd name="connsiteX6" fmla="*/ 180020 w 1152128"/>
+              <a:gd name="connsiteY6" fmla="*/ 1368152 h 1368152"/>
+              <a:gd name="connsiteX7" fmla="*/ 0 w 1152128"/>
+              <a:gd name="connsiteY7" fmla="*/ 1188132 h 1368152"/>
+              <a:gd name="connsiteX8" fmla="*/ 57150 w 1152128"/>
+              <a:gd name="connsiteY8" fmla="*/ 184782 h 1368152"/>
+              <a:gd name="connsiteX0" fmla="*/ 57150 w 1152128"/>
+              <a:gd name="connsiteY0" fmla="*/ 184782 h 1368152"/>
+              <a:gd name="connsiteX1" fmla="*/ 180020 w 1152128"/>
+              <a:gd name="connsiteY1" fmla="*/ 0 h 1368152"/>
+              <a:gd name="connsiteX2" fmla="*/ 972108 w 1152128"/>
+              <a:gd name="connsiteY2" fmla="*/ 0 h 1368152"/>
+              <a:gd name="connsiteX3" fmla="*/ 1085453 w 1152128"/>
+              <a:gd name="connsiteY3" fmla="*/ 175257 h 1368152"/>
+              <a:gd name="connsiteX4" fmla="*/ 1152128 w 1152128"/>
+              <a:gd name="connsiteY4" fmla="*/ 1188132 h 1368152"/>
+              <a:gd name="connsiteX5" fmla="*/ 972108 w 1152128"/>
+              <a:gd name="connsiteY5" fmla="*/ 1368152 h 1368152"/>
+              <a:gd name="connsiteX6" fmla="*/ 180020 w 1152128"/>
+              <a:gd name="connsiteY6" fmla="*/ 1368152 h 1368152"/>
+              <a:gd name="connsiteX7" fmla="*/ 0 w 1152128"/>
+              <a:gd name="connsiteY7" fmla="*/ 1188132 h 1368152"/>
+              <a:gd name="connsiteX8" fmla="*/ 57150 w 1152128"/>
+              <a:gd name="connsiteY8" fmla="*/ 184782 h 1368152"/>
+              <a:gd name="connsiteX0" fmla="*/ 0 w 1152128"/>
+              <a:gd name="connsiteY0" fmla="*/ 1188132 h 1368152"/>
+              <a:gd name="connsiteX1" fmla="*/ 180020 w 1152128"/>
+              <a:gd name="connsiteY1" fmla="*/ 0 h 1368152"/>
+              <a:gd name="connsiteX2" fmla="*/ 972108 w 1152128"/>
+              <a:gd name="connsiteY2" fmla="*/ 0 h 1368152"/>
+              <a:gd name="connsiteX3" fmla="*/ 1085453 w 1152128"/>
+              <a:gd name="connsiteY3" fmla="*/ 175257 h 1368152"/>
+              <a:gd name="connsiteX4" fmla="*/ 1152128 w 1152128"/>
+              <a:gd name="connsiteY4" fmla="*/ 1188132 h 1368152"/>
+              <a:gd name="connsiteX5" fmla="*/ 972108 w 1152128"/>
+              <a:gd name="connsiteY5" fmla="*/ 1368152 h 1368152"/>
+              <a:gd name="connsiteX6" fmla="*/ 180020 w 1152128"/>
+              <a:gd name="connsiteY6" fmla="*/ 1368152 h 1368152"/>
+              <a:gd name="connsiteX7" fmla="*/ 0 w 1152128"/>
+              <a:gd name="connsiteY7" fmla="*/ 1188132 h 1368152"/>
+              <a:gd name="connsiteX0" fmla="*/ 0 w 1152128"/>
+              <a:gd name="connsiteY0" fmla="*/ 1188132 h 1368152"/>
+              <a:gd name="connsiteX1" fmla="*/ 180020 w 1152128"/>
+              <a:gd name="connsiteY1" fmla="*/ 0 h 1368152"/>
+              <a:gd name="connsiteX2" fmla="*/ 972108 w 1152128"/>
+              <a:gd name="connsiteY2" fmla="*/ 0 h 1368152"/>
+              <a:gd name="connsiteX3" fmla="*/ 1152128 w 1152128"/>
+              <a:gd name="connsiteY3" fmla="*/ 1188132 h 1368152"/>
+              <a:gd name="connsiteX4" fmla="*/ 972108 w 1152128"/>
+              <a:gd name="connsiteY4" fmla="*/ 1368152 h 1368152"/>
+              <a:gd name="connsiteX5" fmla="*/ 180020 w 1152128"/>
+              <a:gd name="connsiteY5" fmla="*/ 1368152 h 1368152"/>
+              <a:gd name="connsiteX6" fmla="*/ 0 w 1152128"/>
+              <a:gd name="connsiteY6" fmla="*/ 1188132 h 1368152"/>
+              <a:gd name="connsiteX0" fmla="*/ 0 w 1152128"/>
+              <a:gd name="connsiteY0" fmla="*/ 1223322 h 1403342"/>
+              <a:gd name="connsiteX1" fmla="*/ 194307 w 1152128"/>
+              <a:gd name="connsiteY1" fmla="*/ 0 h 1403342"/>
+              <a:gd name="connsiteX2" fmla="*/ 972108 w 1152128"/>
+              <a:gd name="connsiteY2" fmla="*/ 35190 h 1403342"/>
+              <a:gd name="connsiteX3" fmla="*/ 1152128 w 1152128"/>
+              <a:gd name="connsiteY3" fmla="*/ 1223322 h 1403342"/>
+              <a:gd name="connsiteX4" fmla="*/ 972108 w 1152128"/>
+              <a:gd name="connsiteY4" fmla="*/ 1403342 h 1403342"/>
+              <a:gd name="connsiteX5" fmla="*/ 180020 w 1152128"/>
+              <a:gd name="connsiteY5" fmla="*/ 1403342 h 1403342"/>
+              <a:gd name="connsiteX6" fmla="*/ 0 w 1152128"/>
+              <a:gd name="connsiteY6" fmla="*/ 1223322 h 1403342"/>
+              <a:gd name="connsiteX0" fmla="*/ 0 w 1152128"/>
+              <a:gd name="connsiteY0" fmla="*/ 1223322 h 1403342"/>
+              <a:gd name="connsiteX1" fmla="*/ 194307 w 1152128"/>
+              <a:gd name="connsiteY1" fmla="*/ 0 h 1403342"/>
+              <a:gd name="connsiteX2" fmla="*/ 953058 w 1152128"/>
+              <a:gd name="connsiteY2" fmla="*/ 5028 h 1403342"/>
+              <a:gd name="connsiteX3" fmla="*/ 1152128 w 1152128"/>
+              <a:gd name="connsiteY3" fmla="*/ 1223322 h 1403342"/>
+              <a:gd name="connsiteX4" fmla="*/ 972108 w 1152128"/>
+              <a:gd name="connsiteY4" fmla="*/ 1403342 h 1403342"/>
+              <a:gd name="connsiteX5" fmla="*/ 180020 w 1152128"/>
+              <a:gd name="connsiteY5" fmla="*/ 1403342 h 1403342"/>
+              <a:gd name="connsiteX6" fmla="*/ 0 w 1152128"/>
+              <a:gd name="connsiteY6" fmla="*/ 1223322 h 1403342"/>
+            </a:gdLst>
+            <a:ahLst/>
+            <a:cxnLst>
+              <a:cxn ang="0">
+                <a:pos x="connsiteX0" y="connsiteY0"/>
+              </a:cxn>
+              <a:cxn ang="0">
+                <a:pos x="connsiteX1" y="connsiteY1"/>
+              </a:cxn>
+              <a:cxn ang="0">
+                <a:pos x="connsiteX2" y="connsiteY2"/>
+              </a:cxn>
+              <a:cxn ang="0">
+                <a:pos x="connsiteX3" y="connsiteY3"/>
+              </a:cxn>
+              <a:cxn ang="0">
+                <a:pos x="connsiteX4" y="connsiteY4"/>
+              </a:cxn>
+              <a:cxn ang="0">
+                <a:pos x="connsiteX5" y="connsiteY5"/>
+              </a:cxn>
+              <a:cxn ang="0">
+                <a:pos x="connsiteX6" y="connsiteY6"/>
+              </a:cxn>
+            </a:cxnLst>
+            <a:rect l="l" t="t" r="r" b="b"/>
+            <a:pathLst>
+              <a:path w="1152128" h="1403342">
+                <a:moveTo>
+                  <a:pt x="0" y="1223322"/>
+                </a:moveTo>
+                <a:cubicBezTo>
+                  <a:pt x="0" y="995297"/>
+                  <a:pt x="32289" y="198022"/>
+                  <a:pt x="194307" y="0"/>
+                </a:cubicBezTo>
+                <a:lnTo>
+                  <a:pt x="953058" y="5028"/>
+                </a:lnTo>
+                <a:cubicBezTo>
+                  <a:pt x="1115076" y="203050"/>
+                  <a:pt x="1152128" y="995297"/>
+                  <a:pt x="1152128" y="1223322"/>
+                </a:cubicBezTo>
+                <a:cubicBezTo>
+                  <a:pt x="1152128" y="1322744"/>
+                  <a:pt x="1071530" y="1403342"/>
+                  <a:pt x="972108" y="1403342"/>
+                </a:cubicBezTo>
+                <a:lnTo>
+                  <a:pt x="180020" y="1403342"/>
+                </a:lnTo>
+                <a:cubicBezTo>
+                  <a:pt x="80598" y="1403342"/>
+                  <a:pt x="0" y="1322744"/>
+                  <a:pt x="0" y="1223322"/>
+                </a:cubicBezTo>
+                <a:close/>
+              </a:path>
+            </a:pathLst>
+          </a:custGeom>
+          <a:solidFill>
+            <a:srgbClr val="F5F0EA"/>
+          </a:solidFill>
+          <a:ln>
+            <a:noFill/>
+          </a:ln>
+        </p:spPr>
+        <p:style>
+          <a:lnRef idx="2">
+            <a:schemeClr val="accent1">
+              <a:shade val="50000"/>
+            </a:schemeClr>
+          </a:lnRef>
+          <a:fillRef idx="1">
+            <a:schemeClr val="accent1"/>
+          </a:fillRef>
+          <a:effectRef idx="0">
+            <a:schemeClr val="accent1"/>
+          </a:effectRef>
+          <a:fontRef idx="minor">
+            <a:schemeClr val="lt1"/>
+          </a:fontRef>
+        </p:style>
+        <p:txBody>
+          <a:bodyPr rtlCol="0" anchor="ctr"/>
+          <a:lstStyle/>
+          <a:p>
+            <a:pPr algn="ctr"/>
+            <a:endParaRPr lang="pt-BR"/>
+          </a:p>
+        </p:txBody>
+      </p:sp>
+      <p:sp>
+        <p:nvSpPr>
+          <p:cNvPr id="61" name="Trapezoide 60"/>
+          <p:cNvSpPr/>
+          <p:nvPr/>
+        </p:nvSpPr>
+        <p:spPr>
+          <a:xfrm>
+            <a:off x="4258656" y="3225962"/>
+            <a:ext cx="914400" cy="576064"/>
+          </a:xfrm>
+          <a:prstGeom prst="trapezoid">
+            <a:avLst>
+              <a:gd name="adj" fmla="val 11458"/>
+            </a:avLst>
+          </a:prstGeom>
+          <a:solidFill>
+            <a:srgbClr val="FF9999"/>
+          </a:solidFill>
+          <a:ln>
+            <a:noFill/>
+          </a:ln>
+        </p:spPr>
+        <p:style>
+          <a:lnRef idx="2">
+            <a:schemeClr val="accent1">
+              <a:shade val="50000"/>
+            </a:schemeClr>
+          </a:lnRef>
+          <a:fillRef idx="1">
+            <a:schemeClr val="accent1"/>
+          </a:fillRef>
+          <a:effectRef idx="0">
+            <a:schemeClr val="accent1"/>
+          </a:effectRef>
+          <a:fontRef idx="minor">
+            <a:schemeClr val="lt1"/>
+          </a:fontRef>
+        </p:style>
+        <p:txBody>
+          <a:bodyPr rtlCol="0" anchor="ctr"/>
+          <a:lstStyle/>
+          <a:p>
+            <a:pPr algn="ctr"/>
+            <a:endParaRPr lang="pt-BR"/>
+          </a:p>
+        </p:txBody>
+      </p:sp>
+      <p:sp>
+        <p:nvSpPr>
+          <p:cNvPr id="62" name="Elipse 61"/>
+          <p:cNvSpPr/>
+          <p:nvPr/>
+        </p:nvSpPr>
+        <p:spPr>
+          <a:xfrm>
+            <a:off x="4787864" y="3525817"/>
+            <a:ext cx="72000" cy="72000"/>
+          </a:xfrm>
+          <a:prstGeom prst="ellipse">
+            <a:avLst/>
+          </a:prstGeom>
+          <a:solidFill>
+            <a:srgbClr val="F896AB"/>
+          </a:solidFill>
+          <a:ln>
+            <a:noFill/>
+          </a:ln>
+        </p:spPr>
+        <p:style>
+          <a:lnRef idx="2">
+            <a:schemeClr val="accent1">
+              <a:shade val="50000"/>
+            </a:schemeClr>
+          </a:lnRef>
+          <a:fillRef idx="1">
+            <a:schemeClr val="accent1"/>
+          </a:fillRef>
+          <a:effectRef idx="0">
+            <a:schemeClr val="accent1"/>
+          </a:effectRef>
+          <a:fontRef idx="minor">
+            <a:schemeClr val="lt1"/>
+          </a:fontRef>
+        </p:style>
+        <p:txBody>
+          <a:bodyPr rtlCol="0" anchor="ctr"/>
+          <a:lstStyle/>
+          <a:p>
+            <a:pPr algn="ctr"/>
+            <a:endParaRPr lang="pt-BR"/>
+          </a:p>
+        </p:txBody>
+      </p:sp>
+      <p:sp>
+        <p:nvSpPr>
+          <p:cNvPr id="63" name="Elipse 62"/>
+          <p:cNvSpPr/>
+          <p:nvPr/>
+        </p:nvSpPr>
+        <p:spPr>
+          <a:xfrm>
+            <a:off x="4427824" y="3658010"/>
+            <a:ext cx="72000" cy="72000"/>
+          </a:xfrm>
+          <a:prstGeom prst="ellipse">
+            <a:avLst/>
+          </a:prstGeom>
+          <a:solidFill>
+            <a:srgbClr val="F896AB"/>
+          </a:solidFill>
+          <a:ln>
+            <a:noFill/>
+          </a:ln>
+        </p:spPr>
+        <p:style>
+          <a:lnRef idx="2">
+            <a:schemeClr val="accent1">
+              <a:shade val="50000"/>
+            </a:schemeClr>
+          </a:lnRef>
+          <a:fillRef idx="1">
+            <a:schemeClr val="accent1"/>
+          </a:fillRef>
+          <a:effectRef idx="0">
+            <a:schemeClr val="accent1"/>
+          </a:effectRef>
+          <a:fontRef idx="minor">
+            <a:schemeClr val="lt1"/>
+          </a:fontRef>
+        </p:style>
+        <p:txBody>
+          <a:bodyPr rtlCol="0" anchor="ctr"/>
+          <a:lstStyle/>
+          <a:p>
+            <a:pPr algn="ctr"/>
+            <a:endParaRPr lang="pt-BR"/>
+          </a:p>
+        </p:txBody>
+      </p:sp>
+      <p:sp>
+        <p:nvSpPr>
+          <p:cNvPr id="64" name="Elipse 63"/>
+          <p:cNvSpPr/>
+          <p:nvPr/>
+        </p:nvSpPr>
+        <p:spPr>
+          <a:xfrm>
+            <a:off x="4499824" y="3189962"/>
+            <a:ext cx="72000" cy="72000"/>
+          </a:xfrm>
+          <a:prstGeom prst="ellipse">
+            <a:avLst/>
+          </a:prstGeom>
+          <a:solidFill>
+            <a:srgbClr val="F896AB"/>
+          </a:solidFill>
+          <a:ln>
+            <a:noFill/>
+          </a:ln>
+        </p:spPr>
+        <p:style>
+          <a:lnRef idx="2">
+            <a:schemeClr val="accent1">
+              <a:shade val="50000"/>
+            </a:schemeClr>
+          </a:lnRef>
+          <a:fillRef idx="1">
+            <a:schemeClr val="accent1"/>
+          </a:fillRef>
+          <a:effectRef idx="0">
+            <a:schemeClr val="accent1"/>
+          </a:effectRef>
+          <a:fontRef idx="minor">
+            <a:schemeClr val="lt1"/>
+          </a:fontRef>
+        </p:style>
+        <p:txBody>
+          <a:bodyPr rtlCol="0" anchor="ctr"/>
+          <a:lstStyle/>
+          <a:p>
+            <a:pPr algn="ctr"/>
+            <a:endParaRPr lang="pt-BR"/>
+          </a:p>
+        </p:txBody>
+      </p:sp>
+      <p:sp>
+        <p:nvSpPr>
+          <p:cNvPr id="65" name="Elipse 64"/>
+          <p:cNvSpPr/>
+          <p:nvPr/>
+        </p:nvSpPr>
+        <p:spPr>
+          <a:xfrm>
+            <a:off x="4931880" y="3032258"/>
+            <a:ext cx="72000" cy="72000"/>
+          </a:xfrm>
+          <a:prstGeom prst="ellipse">
+            <a:avLst/>
+          </a:prstGeom>
+          <a:solidFill>
+            <a:srgbClr val="F896AB"/>
+          </a:solidFill>
+          <a:ln>
+            <a:noFill/>
+          </a:ln>
+        </p:spPr>
+        <p:style>
+          <a:lnRef idx="2">
+            <a:schemeClr val="accent1">
+              <a:shade val="50000"/>
+            </a:schemeClr>
+          </a:lnRef>
+          <a:fillRef idx="1">
+            <a:schemeClr val="accent1"/>
+          </a:fillRef>
+          <a:effectRef idx="0">
+            <a:schemeClr val="accent1"/>
+          </a:effectRef>
+          <a:fontRef idx="minor">
+            <a:schemeClr val="lt1"/>
+          </a:fontRef>
+        </p:style>
+        <p:txBody>
+          <a:bodyPr rtlCol="0" anchor="ctr"/>
+          <a:lstStyle/>
+          <a:p>
+            <a:pPr algn="ctr"/>
+            <a:endParaRPr lang="pt-BR"/>
+          </a:p>
+        </p:txBody>
+      </p:sp>
+      <p:sp>
+        <p:nvSpPr>
+          <p:cNvPr id="66" name="Retângulo 65"/>
+          <p:cNvSpPr/>
+          <p:nvPr/>
+        </p:nvSpPr>
+        <p:spPr>
+          <a:xfrm>
+            <a:off x="4651516" y="2620083"/>
+            <a:ext cx="144016" cy="753418"/>
+          </a:xfrm>
+          <a:prstGeom prst="rect">
+            <a:avLst/>
+          </a:prstGeom>
+          <a:solidFill>
+            <a:srgbClr val="FF9999"/>
+          </a:solidFill>
+          <a:ln>
+            <a:noFill/>
+          </a:ln>
+        </p:spPr>
+        <p:style>
+          <a:lnRef idx="2">
+            <a:schemeClr val="accent1">
+              <a:shade val="50000"/>
+            </a:schemeClr>
+          </a:lnRef>
+          <a:fillRef idx="1">
+            <a:schemeClr val="accent1"/>
+          </a:fillRef>
+          <a:effectRef idx="0">
+            <a:schemeClr val="accent1"/>
+          </a:effectRef>
+          <a:fontRef idx="minor">
+            <a:schemeClr val="lt1"/>
+          </a:fontRef>
+        </p:style>
+        <p:txBody>
+          <a:bodyPr rtlCol="0" anchor="ctr"/>
+          <a:lstStyle/>
+          <a:p>
+            <a:pPr algn="ctr"/>
+            <a:endParaRPr lang="pt-BR"/>
+          </a:p>
+        </p:txBody>
+      </p:sp>
+      <p:sp>
+        <p:nvSpPr>
+          <p:cNvPr id="67" name="Retângulo 66"/>
+          <p:cNvSpPr/>
+          <p:nvPr/>
+        </p:nvSpPr>
+        <p:spPr>
+          <a:xfrm>
+            <a:off x="4447543" y="2083722"/>
+            <a:ext cx="540000" cy="540000"/>
+          </a:xfrm>
+          <a:prstGeom prst="rect">
+            <a:avLst/>
+          </a:prstGeom>
+          <a:solidFill>
+            <a:srgbClr val="D3BBAF"/>
+          </a:solidFill>
+          <a:ln>
+            <a:noFill/>
+          </a:ln>
+        </p:spPr>
+        <p:style>
+          <a:lnRef idx="2">
+            <a:schemeClr val="accent1">
+              <a:shade val="50000"/>
+            </a:schemeClr>
+          </a:lnRef>
+          <a:fillRef idx="1">
+            <a:schemeClr val="accent1"/>
+          </a:fillRef>
+          <a:effectRef idx="0">
+            <a:schemeClr val="accent1"/>
+          </a:effectRef>
+          <a:fontRef idx="minor">
+            <a:schemeClr val="lt1"/>
+          </a:fontRef>
+        </p:style>
+        <p:txBody>
+          <a:bodyPr rtlCol="0" anchor="ctr"/>
+          <a:lstStyle/>
+          <a:p>
+            <a:pPr algn="ctr"/>
+            <a:endParaRPr lang="pt-BR"/>
+          </a:p>
+        </p:txBody>
+      </p:sp>
+      <p:sp>
+        <p:nvSpPr>
+          <p:cNvPr id="68" name="Fluxograma: Terminação 67"/>
+          <p:cNvSpPr/>
+          <p:nvPr/>
+        </p:nvSpPr>
+        <p:spPr>
+          <a:xfrm>
+            <a:off x="4266324" y="2578450"/>
+            <a:ext cx="914400" cy="45719"/>
+          </a:xfrm>
+          <a:prstGeom prst="flowChartTerminator">
+            <a:avLst/>
+          </a:prstGeom>
+          <a:solidFill>
+            <a:srgbClr val="C0C0C0"/>
+          </a:solidFill>
+          <a:ln>
+            <a:noFill/>
+          </a:ln>
+        </p:spPr>
+        <p:style>
+          <a:lnRef idx="2">
+            <a:schemeClr val="accent1">
+              <a:shade val="50000"/>
+            </a:schemeClr>
+          </a:lnRef>
+          <a:fillRef idx="1">
+            <a:schemeClr val="accent1"/>
+          </a:fillRef>
+          <a:effectRef idx="0">
+            <a:schemeClr val="accent1"/>
+          </a:effectRef>
+          <a:fontRef idx="minor">
+            <a:schemeClr val="lt1"/>
+          </a:fontRef>
+        </p:style>
+        <p:txBody>
+          <a:bodyPr rtlCol="0" anchor="ctr"/>
+          <a:lstStyle/>
+          <a:p>
+            <a:pPr algn="ctr"/>
+            <a:endParaRPr lang="pt-BR"/>
+          </a:p>
+        </p:txBody>
+      </p:sp>
+      <p:sp>
+        <p:nvSpPr>
+          <p:cNvPr id="69" name="Fluxograma: Terminação 68"/>
+          <p:cNvSpPr/>
+          <p:nvPr/>
+        </p:nvSpPr>
+        <p:spPr>
+          <a:xfrm>
+            <a:off x="4266324" y="2444907"/>
+            <a:ext cx="914400" cy="45719"/>
+          </a:xfrm>
+          <a:prstGeom prst="flowChartTerminator">
+            <a:avLst/>
+          </a:prstGeom>
+          <a:solidFill>
+            <a:srgbClr val="F5F0EA"/>
+          </a:solidFill>
+          <a:ln>
+            <a:noFill/>
+          </a:ln>
+        </p:spPr>
+        <p:style>
+          <a:lnRef idx="2">
+            <a:schemeClr val="accent1">
+              <a:shade val="50000"/>
+            </a:schemeClr>
+          </a:lnRef>
+          <a:fillRef idx="1">
+            <a:schemeClr val="accent1"/>
+          </a:fillRef>
+          <a:effectRef idx="0">
+            <a:schemeClr val="accent1"/>
+          </a:effectRef>
+          <a:fontRef idx="minor">
+            <a:schemeClr val="lt1"/>
+          </a:fontRef>
+        </p:style>
+        <p:txBody>
+          <a:bodyPr rtlCol="0" anchor="ctr"/>
+          <a:lstStyle/>
+          <a:p>
+            <a:pPr algn="ctr"/>
+            <a:endParaRPr lang="pt-BR"/>
+          </a:p>
+        </p:txBody>
+      </p:sp>
+      <p:sp>
+        <p:nvSpPr>
+          <p:cNvPr id="70" name="Forma livre 69"/>
+          <p:cNvSpPr/>
+          <p:nvPr/>
+        </p:nvSpPr>
+        <p:spPr>
+          <a:xfrm>
+            <a:off x="4651516" y="1802944"/>
+            <a:ext cx="144016" cy="466998"/>
+          </a:xfrm>
+          <a:custGeom>
+            <a:avLst/>
+            <a:gdLst>
+              <a:gd name="connsiteX0" fmla="*/ 0 w 144016"/>
+              <a:gd name="connsiteY0" fmla="*/ 0 h 559395"/>
+              <a:gd name="connsiteX1" fmla="*/ 1140 w 144016"/>
+              <a:gd name="connsiteY1" fmla="*/ 0 h 559395"/>
+              <a:gd name="connsiteX2" fmla="*/ 144016 w 144016"/>
+              <a:gd name="connsiteY2" fmla="*/ 166127 h 559395"/>
+              <a:gd name="connsiteX3" fmla="*/ 144016 w 144016"/>
+              <a:gd name="connsiteY3" fmla="*/ 559395 h 559395"/>
+              <a:gd name="connsiteX4" fmla="*/ 0 w 144016"/>
+              <a:gd name="connsiteY4" fmla="*/ 559395 h 559395"/>
+            </a:gdLst>
+            <a:ahLst/>
+            <a:cxnLst>
+              <a:cxn ang="0">
+                <a:pos x="connsiteX0" y="connsiteY0"/>
+              </a:cxn>
+              <a:cxn ang="0">
+                <a:pos x="connsiteX1" y="connsiteY1"/>
+              </a:cxn>
+              <a:cxn ang="0">
+                <a:pos x="connsiteX2" y="connsiteY2"/>
+              </a:cxn>
+              <a:cxn ang="0">
+                <a:pos x="connsiteX3" y="connsiteY3"/>
+              </a:cxn>
+              <a:cxn ang="0">
+                <a:pos x="connsiteX4" y="connsiteY4"/>
+              </a:cxn>
+            </a:cxnLst>
+            <a:rect l="l" t="t" r="r" b="b"/>
+            <a:pathLst>
+              <a:path w="144016" h="559395">
+                <a:moveTo>
+                  <a:pt x="0" y="0"/>
+                </a:moveTo>
+                <a:lnTo>
+                  <a:pt x="1140" y="0"/>
+                </a:lnTo>
+                <a:lnTo>
+                  <a:pt x="144016" y="166127"/>
+                </a:lnTo>
+                <a:lnTo>
+                  <a:pt x="144016" y="559395"/>
+                </a:lnTo>
+                <a:lnTo>
+                  <a:pt x="0" y="559395"/>
+                </a:lnTo>
+                <a:close/>
+              </a:path>
+            </a:pathLst>
+          </a:custGeom>
+          <a:solidFill>
+            <a:schemeClr val="bg1"/>
+          </a:solidFill>
+          <a:ln>
+            <a:noFill/>
+          </a:ln>
+        </p:spPr>
+        <p:style>
+          <a:lnRef idx="2">
+            <a:schemeClr val="accent1">
+              <a:shade val="50000"/>
+            </a:schemeClr>
+          </a:lnRef>
+          <a:fillRef idx="1">
+            <a:schemeClr val="accent1"/>
+          </a:fillRef>
+          <a:effectRef idx="0">
+            <a:schemeClr val="accent1"/>
+          </a:effectRef>
+          <a:fontRef idx="minor">
+            <a:schemeClr val="lt1"/>
+          </a:fontRef>
+        </p:style>
+        <p:txBody>
+          <a:bodyPr rtlCol="0" anchor="ctr"/>
+          <a:lstStyle/>
+          <a:p>
+            <a:pPr algn="ctr"/>
+            <a:endParaRPr lang="pt-BR"/>
+          </a:p>
+        </p:txBody>
+      </p:sp>
+      <p:sp>
+        <p:nvSpPr>
+          <p:cNvPr id="71" name="Retângulo 70"/>
+          <p:cNvSpPr/>
+          <p:nvPr/>
+        </p:nvSpPr>
+        <p:spPr>
+          <a:xfrm>
+            <a:off x="4391824" y="2075690"/>
+            <a:ext cx="648064" cy="202099"/>
+          </a:xfrm>
+          <a:prstGeom prst="rect">
+            <a:avLst/>
+          </a:prstGeom>
+          <a:solidFill>
+            <a:srgbClr val="C0C0C0"/>
+          </a:solidFill>
+          <a:ln>
+            <a:noFill/>
+          </a:ln>
+        </p:spPr>
+        <p:style>
+          <a:lnRef idx="2">
+            <a:schemeClr val="accent1">
+              <a:shade val="50000"/>
+            </a:schemeClr>
+          </a:lnRef>
+          <a:fillRef idx="1">
+            <a:schemeClr val="accent1"/>
+          </a:fillRef>
+          <a:effectRef idx="0">
+            <a:schemeClr val="accent1"/>
+          </a:effectRef>
+          <a:fontRef idx="minor">
+            <a:schemeClr val="lt1"/>
+          </a:fontRef>
+        </p:style>
+        <p:txBody>
+          <a:bodyPr rtlCol="0" anchor="ctr"/>
+          <a:lstStyle/>
+          <a:p>
+            <a:pPr algn="ctr"/>
+            <a:endParaRPr lang="pt-BR"/>
+          </a:p>
+        </p:txBody>
+      </p:sp>
+      <p:sp>
+        <p:nvSpPr>
+          <p:cNvPr id="72" name="Fluxograma: Terminação 71"/>
+          <p:cNvSpPr/>
+          <p:nvPr/>
+        </p:nvSpPr>
+        <p:spPr>
+          <a:xfrm>
+            <a:off x="4266324" y="2269757"/>
+            <a:ext cx="914400" cy="45719"/>
+          </a:xfrm>
+          <a:prstGeom prst="flowChartTerminator">
+            <a:avLst/>
+          </a:prstGeom>
+          <a:solidFill>
+            <a:srgbClr val="F5F0EA"/>
+          </a:solidFill>
+          <a:ln>
+            <a:noFill/>
+          </a:ln>
+        </p:spPr>
+        <p:style>
+          <a:lnRef idx="2">
+            <a:schemeClr val="accent1">
+              <a:shade val="50000"/>
+            </a:schemeClr>
+          </a:lnRef>
+          <a:fillRef idx="1">
+            <a:schemeClr val="accent1"/>
+          </a:fillRef>
+          <a:effectRef idx="0">
+            <a:schemeClr val="accent1"/>
+          </a:effectRef>
+          <a:fontRef idx="minor">
+            <a:schemeClr val="lt1"/>
+          </a:fontRef>
+        </p:style>
+        <p:txBody>
+          <a:bodyPr rtlCol="0" anchor="ctr"/>
+          <a:lstStyle/>
+          <a:p>
+            <a:pPr algn="ctr"/>
+            <a:endParaRPr lang="pt-BR"/>
+          </a:p>
+        </p:txBody>
+      </p:sp>
+    </p:spTree>
+    <p:extLst>
+      <p:ext uri="{BB962C8B-B14F-4D97-AF65-F5344CB8AC3E}">
+        <p14:creationId xmlns:p14="http://schemas.microsoft.com/office/powerpoint/2010/main" val="722989789"/>
+      </p:ext>
+    </p:extLst>
+  </p:cSld>
+  <p:clrMapOvr>
+    <a:masterClrMapping/>
+  </p:clrMapOvr>
 </p:sld>
 </file>
 

</xml_diff>

<commit_message>
PRONTO JA DEU EH ISSO AI
</commit_message>
<xml_diff>
--- a/design.pptx
+++ b/design.pptx
@@ -120,7 +120,7 @@
   </p:defaultTextStyle>
   <p:extLst>
     <p:ext uri="{EFAFB233-063F-42B5-8137-9DF3F51BA10A}">
-      <p15:sldGuideLst xmlns="" xmlns:p15="http://schemas.microsoft.com/office/powerpoint/2012/main">
+      <p15:sldGuideLst xmlns:p15="http://schemas.microsoft.com/office/powerpoint/2012/main">
         <p15:guide id="1" orient="horz" pos="2160">
           <p15:clr>
             <a:srgbClr val="A4A3A4"/>
@@ -12747,7 +12747,7 @@
             <a:lstStyle/>
             <a:p>
               <a:pPr algn="ctr"/>
-              <a:endParaRPr lang="pt-BR"/>
+              <a:endParaRPr lang="pt-BR" u="sng"/>
             </a:p>
           </p:txBody>
         </p:sp>
@@ -12793,7 +12793,7 @@
             <a:lstStyle/>
             <a:p>
               <a:pPr algn="ctr"/>
-              <a:endParaRPr lang="pt-BR"/>
+              <a:endParaRPr lang="pt-BR" u="sng"/>
             </a:p>
           </p:txBody>
         </p:sp>
@@ -12839,7 +12839,7 @@
             <a:lstStyle/>
             <a:p>
               <a:pPr algn="ctr"/>
-              <a:endParaRPr lang="pt-BR"/>
+              <a:endParaRPr lang="pt-BR" u="sng"/>
             </a:p>
           </p:txBody>
         </p:sp>
@@ -12885,7 +12885,7 @@
             <a:lstStyle/>
             <a:p>
               <a:pPr algn="ctr"/>
-              <a:endParaRPr lang="pt-BR"/>
+              <a:endParaRPr lang="pt-BR" u="sng"/>
             </a:p>
           </p:txBody>
         </p:sp>
@@ -12931,7 +12931,7 @@
             <a:lstStyle/>
             <a:p>
               <a:pPr algn="ctr"/>
-              <a:endParaRPr lang="pt-BR"/>
+              <a:endParaRPr lang="pt-BR" u="sng"/>
             </a:p>
           </p:txBody>
         </p:sp>
@@ -17112,109 +17112,39 @@
           <a:chExt cx="0" cy="0"/>
         </a:xfrm>
       </p:grpSpPr>
-      <p:pic>
-        <p:nvPicPr>
-          <p:cNvPr id="49" name="Imagem 48"/>
-          <p:cNvPicPr>
-            <a:picLocks noChangeAspect="1"/>
-          </p:cNvPicPr>
-          <p:nvPr/>
-        </p:nvPicPr>
-        <p:blipFill>
-          <a:blip r:embed="rId2"/>
-          <a:stretch>
-            <a:fillRect/>
-          </a:stretch>
-        </p:blipFill>
-        <p:spPr>
-          <a:xfrm>
-            <a:off x="-7653" y="404664"/>
-            <a:ext cx="2057400" cy="2219325"/>
-          </a:xfrm>
-          <a:prstGeom prst="rect">
-            <a:avLst/>
-          </a:prstGeom>
-        </p:spPr>
-      </p:pic>
-      <p:sp>
-        <p:nvSpPr>
-          <p:cNvPr id="58" name="Elipse 57"/>
-          <p:cNvSpPr/>
-          <p:nvPr/>
-        </p:nvSpPr>
-        <p:spPr>
-          <a:xfrm>
-            <a:off x="430384" y="2852936"/>
-            <a:ext cx="2880000" cy="2880000"/>
-          </a:xfrm>
-          <a:prstGeom prst="ellipse">
-            <a:avLst/>
-          </a:prstGeom>
-          <a:solidFill>
-            <a:schemeClr val="accent1">
-              <a:lumMod val="20000"/>
-              <a:lumOff val="80000"/>
-            </a:schemeClr>
-          </a:solidFill>
-          <a:ln>
-            <a:noFill/>
-          </a:ln>
-        </p:spPr>
-        <p:style>
-          <a:lnRef idx="2">
-            <a:schemeClr val="accent1">
-              <a:shade val="50000"/>
-            </a:schemeClr>
-          </a:lnRef>
-          <a:fillRef idx="1">
-            <a:schemeClr val="accent1"/>
-          </a:fillRef>
-          <a:effectRef idx="0">
-            <a:schemeClr val="accent1"/>
-          </a:effectRef>
-          <a:fontRef idx="minor">
-            <a:schemeClr val="lt1"/>
-          </a:fontRef>
-        </p:style>
-        <p:txBody>
-          <a:bodyPr rtlCol="0" anchor="ctr"/>
-          <a:lstStyle/>
-          <a:p>
-            <a:pPr algn="ctr"/>
-            <a:endParaRPr lang="pt-BR"/>
-          </a:p>
-        </p:txBody>
-      </p:sp>
       <p:grpSp>
         <p:nvGrpSpPr>
-          <p:cNvPr id="4" name="Grupo 3"/>
+          <p:cNvPr id="12" name="Grupo 11"/>
           <p:cNvGrpSpPr/>
           <p:nvPr/>
         </p:nvGrpSpPr>
         <p:grpSpPr>
           <a:xfrm>
-            <a:off x="3923928" y="2276872"/>
-            <a:ext cx="3672408" cy="3672408"/>
-            <a:chOff x="3923928" y="2276872"/>
-            <a:chExt cx="3672408" cy="3672408"/>
+            <a:off x="3347864" y="1988840"/>
+            <a:ext cx="2115750" cy="2115750"/>
+            <a:chOff x="3347864" y="1988840"/>
+            <a:chExt cx="2115750" cy="2115750"/>
           </a:xfrm>
         </p:grpSpPr>
         <p:sp>
           <p:nvSpPr>
-            <p:cNvPr id="17" name="Retângulo de cantos arredondados 16"/>
+            <p:cNvPr id="52" name="Retângulo de cantos arredondados 51"/>
             <p:cNvSpPr/>
             <p:nvPr/>
           </p:nvSpPr>
           <p:spPr>
             <a:xfrm>
-              <a:off x="3923928" y="2276872"/>
-              <a:ext cx="3672408" cy="3672408"/>
+              <a:off x="3347864" y="1988840"/>
+              <a:ext cx="2115750" cy="2115750"/>
             </a:xfrm>
             <a:prstGeom prst="roundRect">
               <a:avLst/>
             </a:prstGeom>
             <a:solidFill>
-              <a:srgbClr val="79CD4B"/>
+              <a:schemeClr val="accent5">
+                <a:lumMod val="40000"/>
+                <a:lumOff val="60000"/>
+              </a:schemeClr>
             </a:solidFill>
             <a:ln>
               <a:noFill/>
@@ -17245,1394 +17175,37 @@
             </a:p>
           </p:txBody>
         </p:sp>
-        <p:sp>
-          <p:nvSpPr>
-            <p:cNvPr id="60" name="Retângulo de cantos arredondados 2"/>
-            <p:cNvSpPr/>
+        <p:pic>
+          <p:nvPicPr>
+            <p:cNvPr id="11" name="Imagem 10"/>
+            <p:cNvPicPr>
+              <a:picLocks noChangeAspect="1"/>
+            </p:cNvPicPr>
             <p:nvPr/>
-          </p:nvSpPr>
+          </p:nvPicPr>
+          <p:blipFill>
+            <a:blip r:embed="rId2" cstate="print">
+              <a:extLst>
+                <a:ext uri="{28A0092B-C50C-407E-A947-70E740481C1C}">
+                  <a14:useLocalDpi xmlns:a14="http://schemas.microsoft.com/office/drawing/2010/main" val="0"/>
+                </a:ext>
+              </a:extLst>
+            </a:blip>
+            <a:stretch>
+              <a:fillRect/>
+            </a:stretch>
+          </p:blipFill>
           <p:spPr>
             <a:xfrm>
-              <a:off x="5184068" y="3682964"/>
-              <a:ext cx="1152128" cy="1329482"/>
-            </a:xfrm>
-            <a:custGeom>
-              <a:avLst/>
-              <a:gdLst>
-                <a:gd name="connsiteX0" fmla="*/ 0 w 1152128"/>
-                <a:gd name="connsiteY0" fmla="*/ 180020 h 1368152"/>
-                <a:gd name="connsiteX1" fmla="*/ 180020 w 1152128"/>
-                <a:gd name="connsiteY1" fmla="*/ 0 h 1368152"/>
-                <a:gd name="connsiteX2" fmla="*/ 972108 w 1152128"/>
-                <a:gd name="connsiteY2" fmla="*/ 0 h 1368152"/>
-                <a:gd name="connsiteX3" fmla="*/ 1152128 w 1152128"/>
-                <a:gd name="connsiteY3" fmla="*/ 180020 h 1368152"/>
-                <a:gd name="connsiteX4" fmla="*/ 1152128 w 1152128"/>
-                <a:gd name="connsiteY4" fmla="*/ 1188132 h 1368152"/>
-                <a:gd name="connsiteX5" fmla="*/ 972108 w 1152128"/>
-                <a:gd name="connsiteY5" fmla="*/ 1368152 h 1368152"/>
-                <a:gd name="connsiteX6" fmla="*/ 180020 w 1152128"/>
-                <a:gd name="connsiteY6" fmla="*/ 1368152 h 1368152"/>
-                <a:gd name="connsiteX7" fmla="*/ 0 w 1152128"/>
-                <a:gd name="connsiteY7" fmla="*/ 1188132 h 1368152"/>
-                <a:gd name="connsiteX8" fmla="*/ 0 w 1152128"/>
-                <a:gd name="connsiteY8" fmla="*/ 180020 h 1368152"/>
-                <a:gd name="connsiteX0" fmla="*/ 57150 w 1152128"/>
-                <a:gd name="connsiteY0" fmla="*/ 184782 h 1368152"/>
-                <a:gd name="connsiteX1" fmla="*/ 180020 w 1152128"/>
-                <a:gd name="connsiteY1" fmla="*/ 0 h 1368152"/>
-                <a:gd name="connsiteX2" fmla="*/ 972108 w 1152128"/>
-                <a:gd name="connsiteY2" fmla="*/ 0 h 1368152"/>
-                <a:gd name="connsiteX3" fmla="*/ 1152128 w 1152128"/>
-                <a:gd name="connsiteY3" fmla="*/ 180020 h 1368152"/>
-                <a:gd name="connsiteX4" fmla="*/ 1152128 w 1152128"/>
-                <a:gd name="connsiteY4" fmla="*/ 1188132 h 1368152"/>
-                <a:gd name="connsiteX5" fmla="*/ 972108 w 1152128"/>
-                <a:gd name="connsiteY5" fmla="*/ 1368152 h 1368152"/>
-                <a:gd name="connsiteX6" fmla="*/ 180020 w 1152128"/>
-                <a:gd name="connsiteY6" fmla="*/ 1368152 h 1368152"/>
-                <a:gd name="connsiteX7" fmla="*/ 0 w 1152128"/>
-                <a:gd name="connsiteY7" fmla="*/ 1188132 h 1368152"/>
-                <a:gd name="connsiteX8" fmla="*/ 57150 w 1152128"/>
-                <a:gd name="connsiteY8" fmla="*/ 184782 h 1368152"/>
-                <a:gd name="connsiteX0" fmla="*/ 57150 w 1152128"/>
-                <a:gd name="connsiteY0" fmla="*/ 184782 h 1368152"/>
-                <a:gd name="connsiteX1" fmla="*/ 180020 w 1152128"/>
-                <a:gd name="connsiteY1" fmla="*/ 0 h 1368152"/>
-                <a:gd name="connsiteX2" fmla="*/ 972108 w 1152128"/>
-                <a:gd name="connsiteY2" fmla="*/ 0 h 1368152"/>
-                <a:gd name="connsiteX3" fmla="*/ 1085453 w 1152128"/>
-                <a:gd name="connsiteY3" fmla="*/ 175257 h 1368152"/>
-                <a:gd name="connsiteX4" fmla="*/ 1152128 w 1152128"/>
-                <a:gd name="connsiteY4" fmla="*/ 1188132 h 1368152"/>
-                <a:gd name="connsiteX5" fmla="*/ 972108 w 1152128"/>
-                <a:gd name="connsiteY5" fmla="*/ 1368152 h 1368152"/>
-                <a:gd name="connsiteX6" fmla="*/ 180020 w 1152128"/>
-                <a:gd name="connsiteY6" fmla="*/ 1368152 h 1368152"/>
-                <a:gd name="connsiteX7" fmla="*/ 0 w 1152128"/>
-                <a:gd name="connsiteY7" fmla="*/ 1188132 h 1368152"/>
-                <a:gd name="connsiteX8" fmla="*/ 57150 w 1152128"/>
-                <a:gd name="connsiteY8" fmla="*/ 184782 h 1368152"/>
-                <a:gd name="connsiteX0" fmla="*/ 0 w 1152128"/>
-                <a:gd name="connsiteY0" fmla="*/ 1188132 h 1368152"/>
-                <a:gd name="connsiteX1" fmla="*/ 180020 w 1152128"/>
-                <a:gd name="connsiteY1" fmla="*/ 0 h 1368152"/>
-                <a:gd name="connsiteX2" fmla="*/ 972108 w 1152128"/>
-                <a:gd name="connsiteY2" fmla="*/ 0 h 1368152"/>
-                <a:gd name="connsiteX3" fmla="*/ 1085453 w 1152128"/>
-                <a:gd name="connsiteY3" fmla="*/ 175257 h 1368152"/>
-                <a:gd name="connsiteX4" fmla="*/ 1152128 w 1152128"/>
-                <a:gd name="connsiteY4" fmla="*/ 1188132 h 1368152"/>
-                <a:gd name="connsiteX5" fmla="*/ 972108 w 1152128"/>
-                <a:gd name="connsiteY5" fmla="*/ 1368152 h 1368152"/>
-                <a:gd name="connsiteX6" fmla="*/ 180020 w 1152128"/>
-                <a:gd name="connsiteY6" fmla="*/ 1368152 h 1368152"/>
-                <a:gd name="connsiteX7" fmla="*/ 0 w 1152128"/>
-                <a:gd name="connsiteY7" fmla="*/ 1188132 h 1368152"/>
-                <a:gd name="connsiteX0" fmla="*/ 0 w 1152128"/>
-                <a:gd name="connsiteY0" fmla="*/ 1188132 h 1368152"/>
-                <a:gd name="connsiteX1" fmla="*/ 180020 w 1152128"/>
-                <a:gd name="connsiteY1" fmla="*/ 0 h 1368152"/>
-                <a:gd name="connsiteX2" fmla="*/ 972108 w 1152128"/>
-                <a:gd name="connsiteY2" fmla="*/ 0 h 1368152"/>
-                <a:gd name="connsiteX3" fmla="*/ 1152128 w 1152128"/>
-                <a:gd name="connsiteY3" fmla="*/ 1188132 h 1368152"/>
-                <a:gd name="connsiteX4" fmla="*/ 972108 w 1152128"/>
-                <a:gd name="connsiteY4" fmla="*/ 1368152 h 1368152"/>
-                <a:gd name="connsiteX5" fmla="*/ 180020 w 1152128"/>
-                <a:gd name="connsiteY5" fmla="*/ 1368152 h 1368152"/>
-                <a:gd name="connsiteX6" fmla="*/ 0 w 1152128"/>
-                <a:gd name="connsiteY6" fmla="*/ 1188132 h 1368152"/>
-                <a:gd name="connsiteX0" fmla="*/ 0 w 1152128"/>
-                <a:gd name="connsiteY0" fmla="*/ 1223322 h 1403342"/>
-                <a:gd name="connsiteX1" fmla="*/ 194307 w 1152128"/>
-                <a:gd name="connsiteY1" fmla="*/ 0 h 1403342"/>
-                <a:gd name="connsiteX2" fmla="*/ 972108 w 1152128"/>
-                <a:gd name="connsiteY2" fmla="*/ 35190 h 1403342"/>
-                <a:gd name="connsiteX3" fmla="*/ 1152128 w 1152128"/>
-                <a:gd name="connsiteY3" fmla="*/ 1223322 h 1403342"/>
-                <a:gd name="connsiteX4" fmla="*/ 972108 w 1152128"/>
-                <a:gd name="connsiteY4" fmla="*/ 1403342 h 1403342"/>
-                <a:gd name="connsiteX5" fmla="*/ 180020 w 1152128"/>
-                <a:gd name="connsiteY5" fmla="*/ 1403342 h 1403342"/>
-                <a:gd name="connsiteX6" fmla="*/ 0 w 1152128"/>
-                <a:gd name="connsiteY6" fmla="*/ 1223322 h 1403342"/>
-                <a:gd name="connsiteX0" fmla="*/ 0 w 1152128"/>
-                <a:gd name="connsiteY0" fmla="*/ 1223322 h 1403342"/>
-                <a:gd name="connsiteX1" fmla="*/ 194307 w 1152128"/>
-                <a:gd name="connsiteY1" fmla="*/ 0 h 1403342"/>
-                <a:gd name="connsiteX2" fmla="*/ 953058 w 1152128"/>
-                <a:gd name="connsiteY2" fmla="*/ 5028 h 1403342"/>
-                <a:gd name="connsiteX3" fmla="*/ 1152128 w 1152128"/>
-                <a:gd name="connsiteY3" fmla="*/ 1223322 h 1403342"/>
-                <a:gd name="connsiteX4" fmla="*/ 972108 w 1152128"/>
-                <a:gd name="connsiteY4" fmla="*/ 1403342 h 1403342"/>
-                <a:gd name="connsiteX5" fmla="*/ 180020 w 1152128"/>
-                <a:gd name="connsiteY5" fmla="*/ 1403342 h 1403342"/>
-                <a:gd name="connsiteX6" fmla="*/ 0 w 1152128"/>
-                <a:gd name="connsiteY6" fmla="*/ 1223322 h 1403342"/>
-              </a:gdLst>
-              <a:ahLst/>
-              <a:cxnLst>
-                <a:cxn ang="0">
-                  <a:pos x="connsiteX0" y="connsiteY0"/>
-                </a:cxn>
-                <a:cxn ang="0">
-                  <a:pos x="connsiteX1" y="connsiteY1"/>
-                </a:cxn>
-                <a:cxn ang="0">
-                  <a:pos x="connsiteX2" y="connsiteY2"/>
-                </a:cxn>
-                <a:cxn ang="0">
-                  <a:pos x="connsiteX3" y="connsiteY3"/>
-                </a:cxn>
-                <a:cxn ang="0">
-                  <a:pos x="connsiteX4" y="connsiteY4"/>
-                </a:cxn>
-                <a:cxn ang="0">
-                  <a:pos x="connsiteX5" y="connsiteY5"/>
-                </a:cxn>
-                <a:cxn ang="0">
-                  <a:pos x="connsiteX6" y="connsiteY6"/>
-                </a:cxn>
-              </a:cxnLst>
-              <a:rect l="l" t="t" r="r" b="b"/>
-              <a:pathLst>
-                <a:path w="1152128" h="1403342">
-                  <a:moveTo>
-                    <a:pt x="0" y="1223322"/>
-                  </a:moveTo>
-                  <a:cubicBezTo>
-                    <a:pt x="0" y="995297"/>
-                    <a:pt x="32289" y="198022"/>
-                    <a:pt x="194307" y="0"/>
-                  </a:cubicBezTo>
-                  <a:lnTo>
-                    <a:pt x="953058" y="5028"/>
-                  </a:lnTo>
-                  <a:cubicBezTo>
-                    <a:pt x="1115076" y="203050"/>
-                    <a:pt x="1152128" y="995297"/>
-                    <a:pt x="1152128" y="1223322"/>
-                  </a:cubicBezTo>
-                  <a:cubicBezTo>
-                    <a:pt x="1152128" y="1322744"/>
-                    <a:pt x="1071530" y="1403342"/>
-                    <a:pt x="972108" y="1403342"/>
-                  </a:cubicBezTo>
-                  <a:lnTo>
-                    <a:pt x="180020" y="1403342"/>
-                  </a:lnTo>
-                  <a:cubicBezTo>
-                    <a:pt x="80598" y="1403342"/>
-                    <a:pt x="0" y="1322744"/>
-                    <a:pt x="0" y="1223322"/>
-                  </a:cubicBezTo>
-                  <a:close/>
-                </a:path>
-              </a:pathLst>
-            </a:custGeom>
-            <a:solidFill>
-              <a:srgbClr val="F5F0EA"/>
-            </a:solidFill>
-            <a:ln>
-              <a:noFill/>
-            </a:ln>
-          </p:spPr>
-          <p:style>
-            <a:lnRef idx="2">
-              <a:schemeClr val="accent1">
-                <a:shade val="50000"/>
-              </a:schemeClr>
-            </a:lnRef>
-            <a:fillRef idx="1">
-              <a:schemeClr val="accent1"/>
-            </a:fillRef>
-            <a:effectRef idx="0">
-              <a:schemeClr val="accent1"/>
-            </a:effectRef>
-            <a:fontRef idx="minor">
-              <a:schemeClr val="lt1"/>
-            </a:fontRef>
-          </p:style>
-          <p:txBody>
-            <a:bodyPr rtlCol="0" anchor="ctr"/>
-            <a:lstStyle/>
-            <a:p>
-              <a:pPr algn="ctr"/>
-              <a:endParaRPr lang="pt-BR"/>
-            </a:p>
-          </p:txBody>
-        </p:sp>
-        <p:sp>
-          <p:nvSpPr>
-            <p:cNvPr id="61" name="Trapezoide 60"/>
-            <p:cNvSpPr/>
-            <p:nvPr/>
-          </p:nvSpPr>
-          <p:spPr>
-            <a:xfrm>
-              <a:off x="5302932" y="4292366"/>
-              <a:ext cx="914400" cy="576064"/>
-            </a:xfrm>
-            <a:prstGeom prst="trapezoid">
-              <a:avLst>
-                <a:gd name="adj" fmla="val 11458"/>
-              </a:avLst>
-            </a:prstGeom>
-            <a:solidFill>
-              <a:srgbClr val="FFC000"/>
-            </a:solidFill>
-            <a:ln>
-              <a:noFill/>
-            </a:ln>
-          </p:spPr>
-          <p:style>
-            <a:lnRef idx="2">
-              <a:schemeClr val="accent1">
-                <a:shade val="50000"/>
-              </a:schemeClr>
-            </a:lnRef>
-            <a:fillRef idx="1">
-              <a:schemeClr val="accent1"/>
-            </a:fillRef>
-            <a:effectRef idx="0">
-              <a:schemeClr val="accent1"/>
-            </a:effectRef>
-            <a:fontRef idx="minor">
-              <a:schemeClr val="lt1"/>
-            </a:fontRef>
-          </p:style>
-          <p:txBody>
-            <a:bodyPr rtlCol="0" anchor="ctr"/>
-            <a:lstStyle/>
-            <a:p>
-              <a:pPr algn="ctr"/>
-              <a:endParaRPr lang="pt-BR"/>
-            </a:p>
-          </p:txBody>
-        </p:sp>
-        <p:sp>
-          <p:nvSpPr>
-            <p:cNvPr id="62" name="Elipse 61"/>
-            <p:cNvSpPr/>
-            <p:nvPr/>
-          </p:nvSpPr>
-          <p:spPr>
-            <a:xfrm>
-              <a:off x="5832140" y="4592221"/>
-              <a:ext cx="72000" cy="72000"/>
-            </a:xfrm>
-            <a:prstGeom prst="ellipse">
-              <a:avLst/>
-            </a:prstGeom>
-            <a:solidFill>
-              <a:srgbClr val="FFC000"/>
-            </a:solidFill>
-            <a:ln>
-              <a:noFill/>
-            </a:ln>
-          </p:spPr>
-          <p:style>
-            <a:lnRef idx="2">
-              <a:schemeClr val="accent1">
-                <a:shade val="50000"/>
-              </a:schemeClr>
-            </a:lnRef>
-            <a:fillRef idx="1">
-              <a:schemeClr val="accent1"/>
-            </a:fillRef>
-            <a:effectRef idx="0">
-              <a:schemeClr val="accent1"/>
-            </a:effectRef>
-            <a:fontRef idx="minor">
-              <a:schemeClr val="lt1"/>
-            </a:fontRef>
-          </p:style>
-          <p:txBody>
-            <a:bodyPr rtlCol="0" anchor="ctr"/>
-            <a:lstStyle/>
-            <a:p>
-              <a:pPr algn="ctr"/>
-              <a:endParaRPr lang="pt-BR"/>
-            </a:p>
-          </p:txBody>
-        </p:sp>
-        <p:sp>
-          <p:nvSpPr>
-            <p:cNvPr id="63" name="Elipse 62"/>
-            <p:cNvSpPr/>
-            <p:nvPr/>
-          </p:nvSpPr>
-          <p:spPr>
-            <a:xfrm>
-              <a:off x="5472100" y="4724414"/>
-              <a:ext cx="72000" cy="72000"/>
-            </a:xfrm>
-            <a:prstGeom prst="ellipse">
-              <a:avLst/>
-            </a:prstGeom>
-            <a:solidFill>
-              <a:srgbClr val="FFC000"/>
-            </a:solidFill>
-            <a:ln>
-              <a:noFill/>
-            </a:ln>
-          </p:spPr>
-          <p:style>
-            <a:lnRef idx="2">
-              <a:schemeClr val="accent1">
-                <a:shade val="50000"/>
-              </a:schemeClr>
-            </a:lnRef>
-            <a:fillRef idx="1">
-              <a:schemeClr val="accent1"/>
-            </a:fillRef>
-            <a:effectRef idx="0">
-              <a:schemeClr val="accent1"/>
-            </a:effectRef>
-            <a:fontRef idx="minor">
-              <a:schemeClr val="lt1"/>
-            </a:fontRef>
-          </p:style>
-          <p:txBody>
-            <a:bodyPr rtlCol="0" anchor="ctr"/>
-            <a:lstStyle/>
-            <a:p>
-              <a:pPr algn="ctr"/>
-              <a:endParaRPr lang="pt-BR"/>
-            </a:p>
-          </p:txBody>
-        </p:sp>
-        <p:sp>
-          <p:nvSpPr>
-            <p:cNvPr id="64" name="Elipse 63"/>
-            <p:cNvSpPr/>
-            <p:nvPr/>
-          </p:nvSpPr>
-          <p:spPr>
-            <a:xfrm>
-              <a:off x="5544100" y="4256366"/>
-              <a:ext cx="72000" cy="72000"/>
-            </a:xfrm>
-            <a:prstGeom prst="ellipse">
-              <a:avLst/>
-            </a:prstGeom>
-            <a:solidFill>
-              <a:srgbClr val="FFC000"/>
-            </a:solidFill>
-            <a:ln>
-              <a:noFill/>
-            </a:ln>
-          </p:spPr>
-          <p:style>
-            <a:lnRef idx="2">
-              <a:schemeClr val="accent1">
-                <a:shade val="50000"/>
-              </a:schemeClr>
-            </a:lnRef>
-            <a:fillRef idx="1">
-              <a:schemeClr val="accent1"/>
-            </a:fillRef>
-            <a:effectRef idx="0">
-              <a:schemeClr val="accent1"/>
-            </a:effectRef>
-            <a:fontRef idx="minor">
-              <a:schemeClr val="lt1"/>
-            </a:fontRef>
-          </p:style>
-          <p:txBody>
-            <a:bodyPr rtlCol="0" anchor="ctr"/>
-            <a:lstStyle/>
-            <a:p>
-              <a:pPr algn="ctr"/>
-              <a:endParaRPr lang="pt-BR"/>
-            </a:p>
-          </p:txBody>
-        </p:sp>
-        <p:sp>
-          <p:nvSpPr>
-            <p:cNvPr id="65" name="Elipse 64"/>
-            <p:cNvSpPr/>
-            <p:nvPr/>
-          </p:nvSpPr>
-          <p:spPr>
-            <a:xfrm>
-              <a:off x="5976156" y="4098662"/>
-              <a:ext cx="72000" cy="72000"/>
-            </a:xfrm>
-            <a:prstGeom prst="ellipse">
-              <a:avLst/>
-            </a:prstGeom>
-            <a:solidFill>
-              <a:srgbClr val="FFC000"/>
-            </a:solidFill>
-            <a:ln>
-              <a:noFill/>
-            </a:ln>
-          </p:spPr>
-          <p:style>
-            <a:lnRef idx="2">
-              <a:schemeClr val="accent1">
-                <a:shade val="50000"/>
-              </a:schemeClr>
-            </a:lnRef>
-            <a:fillRef idx="1">
-              <a:schemeClr val="accent1"/>
-            </a:fillRef>
-            <a:effectRef idx="0">
-              <a:schemeClr val="accent1"/>
-            </a:effectRef>
-            <a:fontRef idx="minor">
-              <a:schemeClr val="lt1"/>
-            </a:fontRef>
-          </p:style>
-          <p:txBody>
-            <a:bodyPr rtlCol="0" anchor="ctr"/>
-            <a:lstStyle/>
-            <a:p>
-              <a:pPr algn="ctr"/>
-              <a:endParaRPr lang="pt-BR"/>
-            </a:p>
-          </p:txBody>
-        </p:sp>
-        <p:sp>
-          <p:nvSpPr>
-            <p:cNvPr id="66" name="Retângulo 65"/>
-            <p:cNvSpPr/>
-            <p:nvPr/>
-          </p:nvSpPr>
-          <p:spPr>
-            <a:xfrm>
-              <a:off x="5695792" y="3686487"/>
-              <a:ext cx="144016" cy="753418"/>
+              <a:off x="3980858" y="2250064"/>
+              <a:ext cx="849761" cy="1593301"/>
             </a:xfrm>
             <a:prstGeom prst="rect">
               <a:avLst/>
             </a:prstGeom>
-            <a:solidFill>
-              <a:srgbClr val="FFC000"/>
-            </a:solidFill>
-            <a:ln>
-              <a:noFill/>
-            </a:ln>
           </p:spPr>
-          <p:style>
-            <a:lnRef idx="2">
-              <a:schemeClr val="accent1">
-                <a:shade val="50000"/>
-              </a:schemeClr>
-            </a:lnRef>
-            <a:fillRef idx="1">
-              <a:schemeClr val="accent1"/>
-            </a:fillRef>
-            <a:effectRef idx="0">
-              <a:schemeClr val="accent1"/>
-            </a:effectRef>
-            <a:fontRef idx="minor">
-              <a:schemeClr val="lt1"/>
-            </a:fontRef>
-          </p:style>
-          <p:txBody>
-            <a:bodyPr rtlCol="0" anchor="ctr"/>
-            <a:lstStyle/>
-            <a:p>
-              <a:pPr algn="ctr"/>
-              <a:endParaRPr lang="pt-BR"/>
-            </a:p>
-          </p:txBody>
-        </p:sp>
-        <p:sp>
-          <p:nvSpPr>
-            <p:cNvPr id="67" name="Retângulo 66"/>
-            <p:cNvSpPr/>
-            <p:nvPr/>
-          </p:nvSpPr>
-          <p:spPr>
-            <a:xfrm>
-              <a:off x="5491819" y="3150126"/>
-              <a:ext cx="540000" cy="540000"/>
-            </a:xfrm>
-            <a:prstGeom prst="rect">
-              <a:avLst/>
-            </a:prstGeom>
-            <a:solidFill>
-              <a:srgbClr val="D3BBAF"/>
-            </a:solidFill>
-            <a:ln>
-              <a:noFill/>
-            </a:ln>
-          </p:spPr>
-          <p:style>
-            <a:lnRef idx="2">
-              <a:schemeClr val="accent1">
-                <a:shade val="50000"/>
-              </a:schemeClr>
-            </a:lnRef>
-            <a:fillRef idx="1">
-              <a:schemeClr val="accent1"/>
-            </a:fillRef>
-            <a:effectRef idx="0">
-              <a:schemeClr val="accent1"/>
-            </a:effectRef>
-            <a:fontRef idx="minor">
-              <a:schemeClr val="lt1"/>
-            </a:fontRef>
-          </p:style>
-          <p:txBody>
-            <a:bodyPr rtlCol="0" anchor="ctr"/>
-            <a:lstStyle/>
-            <a:p>
-              <a:pPr algn="ctr"/>
-              <a:endParaRPr lang="pt-BR"/>
-            </a:p>
-          </p:txBody>
-        </p:sp>
-        <p:sp>
-          <p:nvSpPr>
-            <p:cNvPr id="68" name="Fluxograma: Terminação 67"/>
-            <p:cNvSpPr/>
-            <p:nvPr/>
-          </p:nvSpPr>
-          <p:spPr>
-            <a:xfrm>
-              <a:off x="5310600" y="3644854"/>
-              <a:ext cx="914400" cy="45719"/>
-            </a:xfrm>
-            <a:prstGeom prst="flowChartTerminator">
-              <a:avLst/>
-            </a:prstGeom>
-            <a:solidFill>
-              <a:srgbClr val="C0C0C0"/>
-            </a:solidFill>
-            <a:ln>
-              <a:noFill/>
-            </a:ln>
-          </p:spPr>
-          <p:style>
-            <a:lnRef idx="2">
-              <a:schemeClr val="accent1">
-                <a:shade val="50000"/>
-              </a:schemeClr>
-            </a:lnRef>
-            <a:fillRef idx="1">
-              <a:schemeClr val="accent1"/>
-            </a:fillRef>
-            <a:effectRef idx="0">
-              <a:schemeClr val="accent1"/>
-            </a:effectRef>
-            <a:fontRef idx="minor">
-              <a:schemeClr val="lt1"/>
-            </a:fontRef>
-          </p:style>
-          <p:txBody>
-            <a:bodyPr rtlCol="0" anchor="ctr"/>
-            <a:lstStyle/>
-            <a:p>
-              <a:pPr algn="ctr"/>
-              <a:endParaRPr lang="pt-BR"/>
-            </a:p>
-          </p:txBody>
-        </p:sp>
-        <p:sp>
-          <p:nvSpPr>
-            <p:cNvPr id="69" name="Fluxograma: Terminação 68"/>
-            <p:cNvSpPr/>
-            <p:nvPr/>
-          </p:nvSpPr>
-          <p:spPr>
-            <a:xfrm>
-              <a:off x="5310600" y="3511311"/>
-              <a:ext cx="914400" cy="45719"/>
-            </a:xfrm>
-            <a:prstGeom prst="flowChartTerminator">
-              <a:avLst/>
-            </a:prstGeom>
-            <a:solidFill>
-              <a:srgbClr val="F5F0EA"/>
-            </a:solidFill>
-            <a:ln>
-              <a:noFill/>
-            </a:ln>
-          </p:spPr>
-          <p:style>
-            <a:lnRef idx="2">
-              <a:schemeClr val="accent1">
-                <a:shade val="50000"/>
-              </a:schemeClr>
-            </a:lnRef>
-            <a:fillRef idx="1">
-              <a:schemeClr val="accent1"/>
-            </a:fillRef>
-            <a:effectRef idx="0">
-              <a:schemeClr val="accent1"/>
-            </a:effectRef>
-            <a:fontRef idx="minor">
-              <a:schemeClr val="lt1"/>
-            </a:fontRef>
-          </p:style>
-          <p:txBody>
-            <a:bodyPr rtlCol="0" anchor="ctr"/>
-            <a:lstStyle/>
-            <a:p>
-              <a:pPr algn="ctr"/>
-              <a:endParaRPr lang="pt-BR"/>
-            </a:p>
-          </p:txBody>
-        </p:sp>
-        <p:sp>
-          <p:nvSpPr>
-            <p:cNvPr id="70" name="Forma livre 69"/>
-            <p:cNvSpPr/>
-            <p:nvPr/>
-          </p:nvSpPr>
-          <p:spPr>
-            <a:xfrm>
-              <a:off x="5695792" y="2869348"/>
-              <a:ext cx="144016" cy="466998"/>
-            </a:xfrm>
-            <a:custGeom>
-              <a:avLst/>
-              <a:gdLst>
-                <a:gd name="connsiteX0" fmla="*/ 0 w 144016"/>
-                <a:gd name="connsiteY0" fmla="*/ 0 h 559395"/>
-                <a:gd name="connsiteX1" fmla="*/ 1140 w 144016"/>
-                <a:gd name="connsiteY1" fmla="*/ 0 h 559395"/>
-                <a:gd name="connsiteX2" fmla="*/ 144016 w 144016"/>
-                <a:gd name="connsiteY2" fmla="*/ 166127 h 559395"/>
-                <a:gd name="connsiteX3" fmla="*/ 144016 w 144016"/>
-                <a:gd name="connsiteY3" fmla="*/ 559395 h 559395"/>
-                <a:gd name="connsiteX4" fmla="*/ 0 w 144016"/>
-                <a:gd name="connsiteY4" fmla="*/ 559395 h 559395"/>
-              </a:gdLst>
-              <a:ahLst/>
-              <a:cxnLst>
-                <a:cxn ang="0">
-                  <a:pos x="connsiteX0" y="connsiteY0"/>
-                </a:cxn>
-                <a:cxn ang="0">
-                  <a:pos x="connsiteX1" y="connsiteY1"/>
-                </a:cxn>
-                <a:cxn ang="0">
-                  <a:pos x="connsiteX2" y="connsiteY2"/>
-                </a:cxn>
-                <a:cxn ang="0">
-                  <a:pos x="connsiteX3" y="connsiteY3"/>
-                </a:cxn>
-                <a:cxn ang="0">
-                  <a:pos x="connsiteX4" y="connsiteY4"/>
-                </a:cxn>
-              </a:cxnLst>
-              <a:rect l="l" t="t" r="r" b="b"/>
-              <a:pathLst>
-                <a:path w="144016" h="559395">
-                  <a:moveTo>
-                    <a:pt x="0" y="0"/>
-                  </a:moveTo>
-                  <a:lnTo>
-                    <a:pt x="1140" y="0"/>
-                  </a:lnTo>
-                  <a:lnTo>
-                    <a:pt x="144016" y="166127"/>
-                  </a:lnTo>
-                  <a:lnTo>
-                    <a:pt x="144016" y="559395"/>
-                  </a:lnTo>
-                  <a:lnTo>
-                    <a:pt x="0" y="559395"/>
-                  </a:lnTo>
-                  <a:close/>
-                </a:path>
-              </a:pathLst>
-            </a:custGeom>
-            <a:solidFill>
-              <a:schemeClr val="bg1"/>
-            </a:solidFill>
-            <a:ln>
-              <a:noFill/>
-            </a:ln>
-          </p:spPr>
-          <p:style>
-            <a:lnRef idx="2">
-              <a:schemeClr val="accent1">
-                <a:shade val="50000"/>
-              </a:schemeClr>
-            </a:lnRef>
-            <a:fillRef idx="1">
-              <a:schemeClr val="accent1"/>
-            </a:fillRef>
-            <a:effectRef idx="0">
-              <a:schemeClr val="accent1"/>
-            </a:effectRef>
-            <a:fontRef idx="minor">
-              <a:schemeClr val="lt1"/>
-            </a:fontRef>
-          </p:style>
-          <p:txBody>
-            <a:bodyPr rtlCol="0" anchor="ctr"/>
-            <a:lstStyle/>
-            <a:p>
-              <a:pPr algn="ctr"/>
-              <a:endParaRPr lang="pt-BR"/>
-            </a:p>
-          </p:txBody>
-        </p:sp>
-        <p:sp>
-          <p:nvSpPr>
-            <p:cNvPr id="71" name="Retângulo 70"/>
-            <p:cNvSpPr/>
-            <p:nvPr/>
-          </p:nvSpPr>
-          <p:spPr>
-            <a:xfrm>
-              <a:off x="5436100" y="3142094"/>
-              <a:ext cx="648064" cy="202099"/>
-            </a:xfrm>
-            <a:prstGeom prst="rect">
-              <a:avLst/>
-            </a:prstGeom>
-            <a:solidFill>
-              <a:srgbClr val="C0C0C0"/>
-            </a:solidFill>
-            <a:ln>
-              <a:noFill/>
-            </a:ln>
-          </p:spPr>
-          <p:style>
-            <a:lnRef idx="2">
-              <a:schemeClr val="accent1">
-                <a:shade val="50000"/>
-              </a:schemeClr>
-            </a:lnRef>
-            <a:fillRef idx="1">
-              <a:schemeClr val="accent1"/>
-            </a:fillRef>
-            <a:effectRef idx="0">
-              <a:schemeClr val="accent1"/>
-            </a:effectRef>
-            <a:fontRef idx="minor">
-              <a:schemeClr val="lt1"/>
-            </a:fontRef>
-          </p:style>
-          <p:txBody>
-            <a:bodyPr rtlCol="0" anchor="ctr"/>
-            <a:lstStyle/>
-            <a:p>
-              <a:pPr algn="ctr"/>
-              <a:endParaRPr lang="pt-BR"/>
-            </a:p>
-          </p:txBody>
-        </p:sp>
-        <p:sp>
-          <p:nvSpPr>
-            <p:cNvPr id="72" name="Fluxograma: Terminação 71"/>
-            <p:cNvSpPr/>
-            <p:nvPr/>
-          </p:nvSpPr>
-          <p:spPr>
-            <a:xfrm>
-              <a:off x="5310600" y="3336161"/>
-              <a:ext cx="914400" cy="45719"/>
-            </a:xfrm>
-            <a:prstGeom prst="flowChartTerminator">
-              <a:avLst/>
-            </a:prstGeom>
-            <a:solidFill>
-              <a:srgbClr val="F5F0EA"/>
-            </a:solidFill>
-            <a:ln>
-              <a:noFill/>
-            </a:ln>
-          </p:spPr>
-          <p:style>
-            <a:lnRef idx="2">
-              <a:schemeClr val="accent1">
-                <a:shade val="50000"/>
-              </a:schemeClr>
-            </a:lnRef>
-            <a:fillRef idx="1">
-              <a:schemeClr val="accent1"/>
-            </a:fillRef>
-            <a:effectRef idx="0">
-              <a:schemeClr val="accent1"/>
-            </a:effectRef>
-            <a:fontRef idx="minor">
-              <a:schemeClr val="lt1"/>
-            </a:fontRef>
-          </p:style>
-          <p:txBody>
-            <a:bodyPr rtlCol="0" anchor="ctr"/>
-            <a:lstStyle/>
-            <a:p>
-              <a:pPr algn="ctr"/>
-              <a:endParaRPr lang="pt-BR"/>
-            </a:p>
-          </p:txBody>
-        </p:sp>
+        </p:pic>
       </p:grpSp>
-      <p:sp>
-        <p:nvSpPr>
-          <p:cNvPr id="27" name="Retângulo de cantos arredondados 26"/>
-          <p:cNvSpPr/>
-          <p:nvPr/>
-        </p:nvSpPr>
-        <p:spPr>
-          <a:xfrm>
-            <a:off x="1878052" y="5800125"/>
-            <a:ext cx="2115750" cy="2115750"/>
-          </a:xfrm>
-          <a:prstGeom prst="roundRect">
-            <a:avLst/>
-          </a:prstGeom>
-          <a:solidFill>
-            <a:srgbClr val="C1E3C2"/>
-          </a:solidFill>
-          <a:ln>
-            <a:noFill/>
-          </a:ln>
-        </p:spPr>
-        <p:style>
-          <a:lnRef idx="2">
-            <a:schemeClr val="accent1">
-              <a:shade val="50000"/>
-            </a:schemeClr>
-          </a:lnRef>
-          <a:fillRef idx="1">
-            <a:schemeClr val="accent1"/>
-          </a:fillRef>
-          <a:effectRef idx="0">
-            <a:schemeClr val="accent1"/>
-          </a:effectRef>
-          <a:fontRef idx="minor">
-            <a:schemeClr val="lt1"/>
-          </a:fontRef>
-        </p:style>
-        <p:txBody>
-          <a:bodyPr rtlCol="0" anchor="ctr"/>
-          <a:lstStyle/>
-          <a:p>
-            <a:pPr algn="ctr"/>
-            <a:endParaRPr lang="pt-BR"/>
-          </a:p>
-        </p:txBody>
-      </p:sp>
-      <p:sp>
-        <p:nvSpPr>
-          <p:cNvPr id="37" name="Retângulo de cantos arredondados 36"/>
-          <p:cNvSpPr/>
-          <p:nvPr/>
-        </p:nvSpPr>
-        <p:spPr>
-          <a:xfrm>
-            <a:off x="137693" y="4525629"/>
-            <a:ext cx="585381" cy="1087137"/>
-          </a:xfrm>
-          <a:prstGeom prst="roundRect">
-            <a:avLst/>
-          </a:prstGeom>
-          <a:solidFill>
-            <a:schemeClr val="bg1">
-              <a:lumMod val="95000"/>
-            </a:schemeClr>
-          </a:solidFill>
-          <a:ln>
-            <a:noFill/>
-          </a:ln>
-        </p:spPr>
-        <p:style>
-          <a:lnRef idx="2">
-            <a:schemeClr val="accent1">
-              <a:shade val="50000"/>
-            </a:schemeClr>
-          </a:lnRef>
-          <a:fillRef idx="1">
-            <a:schemeClr val="accent1"/>
-          </a:fillRef>
-          <a:effectRef idx="0">
-            <a:schemeClr val="accent1"/>
-          </a:effectRef>
-          <a:fontRef idx="minor">
-            <a:schemeClr val="lt1"/>
-          </a:fontRef>
-        </p:style>
-        <p:txBody>
-          <a:bodyPr rtlCol="0" anchor="ctr"/>
-          <a:lstStyle/>
-          <a:p>
-            <a:pPr algn="ctr"/>
-            <a:endParaRPr lang="pt-BR"/>
-          </a:p>
-        </p:txBody>
-      </p:sp>
-      <p:sp>
-        <p:nvSpPr>
-          <p:cNvPr id="38" name="Elipse 37"/>
-          <p:cNvSpPr/>
-          <p:nvPr/>
-        </p:nvSpPr>
-        <p:spPr>
-          <a:xfrm>
-            <a:off x="4355976" y="726292"/>
-            <a:ext cx="585381" cy="547078"/>
-          </a:xfrm>
-          <a:prstGeom prst="ellipse">
-            <a:avLst/>
-          </a:prstGeom>
-          <a:solidFill>
-            <a:srgbClr val="87C7D9"/>
-          </a:solidFill>
-          <a:ln>
-            <a:noFill/>
-          </a:ln>
-        </p:spPr>
-        <p:style>
-          <a:lnRef idx="2">
-            <a:schemeClr val="accent1">
-              <a:shade val="50000"/>
-            </a:schemeClr>
-          </a:lnRef>
-          <a:fillRef idx="1">
-            <a:schemeClr val="accent1"/>
-          </a:fillRef>
-          <a:effectRef idx="0">
-            <a:schemeClr val="accent1"/>
-          </a:effectRef>
-          <a:fontRef idx="minor">
-            <a:schemeClr val="lt1"/>
-          </a:fontRef>
-        </p:style>
-        <p:txBody>
-          <a:bodyPr rtlCol="0" anchor="ctr"/>
-          <a:lstStyle/>
-          <a:p>
-            <a:pPr algn="ctr"/>
-            <a:endParaRPr lang="pt-BR"/>
-          </a:p>
-        </p:txBody>
-      </p:sp>
-      <p:sp>
-        <p:nvSpPr>
-          <p:cNvPr id="39" name="Elipse 38"/>
-          <p:cNvSpPr/>
-          <p:nvPr/>
-        </p:nvSpPr>
-        <p:spPr>
-          <a:xfrm>
-            <a:off x="4355976" y="1785977"/>
-            <a:ext cx="250878" cy="353977"/>
-          </a:xfrm>
-          <a:prstGeom prst="ellipse">
-            <a:avLst/>
-          </a:prstGeom>
-          <a:solidFill>
-            <a:srgbClr val="87C7D9"/>
-          </a:solidFill>
-          <a:ln>
-            <a:noFill/>
-          </a:ln>
-        </p:spPr>
-        <p:style>
-          <a:lnRef idx="2">
-            <a:schemeClr val="accent1">
-              <a:shade val="50000"/>
-            </a:schemeClr>
-          </a:lnRef>
-          <a:fillRef idx="1">
-            <a:schemeClr val="accent1"/>
-          </a:fillRef>
-          <a:effectRef idx="0">
-            <a:schemeClr val="accent1"/>
-          </a:effectRef>
-          <a:fontRef idx="minor">
-            <a:schemeClr val="lt1"/>
-          </a:fontRef>
-        </p:style>
-        <p:txBody>
-          <a:bodyPr rtlCol="0" anchor="ctr"/>
-          <a:lstStyle/>
-          <a:p>
-            <a:pPr algn="ctr"/>
-            <a:endParaRPr lang="pt-BR"/>
-          </a:p>
-        </p:txBody>
-      </p:sp>
-      <p:sp>
-        <p:nvSpPr>
-          <p:cNvPr id="40" name="Elipse 39"/>
-          <p:cNvSpPr/>
-          <p:nvPr/>
-        </p:nvSpPr>
-        <p:spPr>
-          <a:xfrm>
-            <a:off x="4523228" y="1785977"/>
-            <a:ext cx="250878" cy="353977"/>
-          </a:xfrm>
-          <a:prstGeom prst="ellipse">
-            <a:avLst/>
-          </a:prstGeom>
-          <a:solidFill>
-            <a:srgbClr val="87C7D9"/>
-          </a:solidFill>
-          <a:ln>
-            <a:noFill/>
-          </a:ln>
-        </p:spPr>
-        <p:style>
-          <a:lnRef idx="2">
-            <a:schemeClr val="accent1">
-              <a:shade val="50000"/>
-            </a:schemeClr>
-          </a:lnRef>
-          <a:fillRef idx="1">
-            <a:schemeClr val="accent1"/>
-          </a:fillRef>
-          <a:effectRef idx="0">
-            <a:schemeClr val="accent1"/>
-          </a:effectRef>
-          <a:fontRef idx="minor">
-            <a:schemeClr val="lt1"/>
-          </a:fontRef>
-        </p:style>
-        <p:txBody>
-          <a:bodyPr rtlCol="0" anchor="ctr"/>
-          <a:lstStyle/>
-          <a:p>
-            <a:pPr algn="ctr"/>
-            <a:endParaRPr lang="pt-BR"/>
-          </a:p>
-        </p:txBody>
-      </p:sp>
-      <p:sp>
-        <p:nvSpPr>
-          <p:cNvPr id="41" name="Elipse 40"/>
-          <p:cNvSpPr/>
-          <p:nvPr/>
-        </p:nvSpPr>
-        <p:spPr>
-          <a:xfrm>
-            <a:off x="4690479" y="1785977"/>
-            <a:ext cx="250878" cy="353977"/>
-          </a:xfrm>
-          <a:prstGeom prst="ellipse">
-            <a:avLst/>
-          </a:prstGeom>
-          <a:solidFill>
-            <a:srgbClr val="87C7D9"/>
-          </a:solidFill>
-          <a:ln>
-            <a:noFill/>
-          </a:ln>
-        </p:spPr>
-        <p:style>
-          <a:lnRef idx="2">
-            <a:schemeClr val="accent1">
-              <a:shade val="50000"/>
-            </a:schemeClr>
-          </a:lnRef>
-          <a:fillRef idx="1">
-            <a:schemeClr val="accent1"/>
-          </a:fillRef>
-          <a:effectRef idx="0">
-            <a:schemeClr val="accent1"/>
-          </a:effectRef>
-          <a:fontRef idx="minor">
-            <a:schemeClr val="lt1"/>
-          </a:fontRef>
-        </p:style>
-        <p:txBody>
-          <a:bodyPr rtlCol="0" anchor="ctr"/>
-          <a:lstStyle/>
-          <a:p>
-            <a:pPr algn="ctr"/>
-            <a:endParaRPr lang="pt-BR"/>
-          </a:p>
-        </p:txBody>
-      </p:sp>
-      <p:sp>
-        <p:nvSpPr>
-          <p:cNvPr id="35" name="Retângulo 34"/>
-          <p:cNvSpPr/>
-          <p:nvPr/>
-        </p:nvSpPr>
-        <p:spPr>
-          <a:xfrm>
-            <a:off x="3310384" y="1425656"/>
-            <a:ext cx="585381" cy="418130"/>
-          </a:xfrm>
-          <a:prstGeom prst="rect">
-            <a:avLst/>
-          </a:prstGeom>
-          <a:solidFill>
-            <a:srgbClr val="47AAC5"/>
-          </a:solidFill>
-          <a:ln>
-            <a:noFill/>
-          </a:ln>
-        </p:spPr>
-        <p:style>
-          <a:lnRef idx="2">
-            <a:schemeClr val="accent1">
-              <a:shade val="50000"/>
-            </a:schemeClr>
-          </a:lnRef>
-          <a:fillRef idx="1">
-            <a:schemeClr val="accent1"/>
-          </a:fillRef>
-          <a:effectRef idx="0">
-            <a:schemeClr val="accent1"/>
-          </a:effectRef>
-          <a:fontRef idx="minor">
-            <a:schemeClr val="lt1"/>
-          </a:fontRef>
-        </p:style>
-        <p:txBody>
-          <a:bodyPr rtlCol="0" anchor="ctr"/>
-          <a:lstStyle/>
-          <a:p>
-            <a:pPr algn="ctr"/>
-            <a:endParaRPr lang="pt-BR"/>
-          </a:p>
-        </p:txBody>
-      </p:sp>
-      <p:sp>
-        <p:nvSpPr>
-          <p:cNvPr id="36" name="Elipse 35"/>
-          <p:cNvSpPr/>
-          <p:nvPr/>
-        </p:nvSpPr>
-        <p:spPr>
-          <a:xfrm>
-            <a:off x="3481837" y="1513483"/>
-            <a:ext cx="242476" cy="242476"/>
-          </a:xfrm>
-          <a:prstGeom prst="ellipse">
-            <a:avLst/>
-          </a:prstGeom>
-          <a:solidFill>
-            <a:schemeClr val="bg1"/>
-          </a:solidFill>
-          <a:ln>
-            <a:noFill/>
-          </a:ln>
-        </p:spPr>
-        <p:style>
-          <a:lnRef idx="2">
-            <a:schemeClr val="accent1">
-              <a:shade val="50000"/>
-            </a:schemeClr>
-          </a:lnRef>
-          <a:fillRef idx="1">
-            <a:schemeClr val="accent1"/>
-          </a:fillRef>
-          <a:effectRef idx="0">
-            <a:schemeClr val="accent1"/>
-          </a:effectRef>
-          <a:fontRef idx="minor">
-            <a:schemeClr val="lt1"/>
-          </a:fontRef>
-        </p:style>
-        <p:txBody>
-          <a:bodyPr rtlCol="0" anchor="ctr"/>
-          <a:lstStyle/>
-          <a:p>
-            <a:pPr algn="ctr"/>
-            <a:endParaRPr lang="pt-BR"/>
-          </a:p>
-        </p:txBody>
-      </p:sp>
-      <p:sp>
-        <p:nvSpPr>
-          <p:cNvPr id="30" name="Retângulo de cantos arredondados 29"/>
-          <p:cNvSpPr/>
-          <p:nvPr/>
-        </p:nvSpPr>
-        <p:spPr>
-          <a:xfrm>
-            <a:off x="3805906" y="1152117"/>
-            <a:ext cx="39712" cy="917120"/>
-          </a:xfrm>
-          <a:prstGeom prst="roundRect">
-            <a:avLst>
-              <a:gd name="adj" fmla="val 50000"/>
-            </a:avLst>
-          </a:prstGeom>
-          <a:solidFill>
-            <a:srgbClr val="FFFFFF">
-              <a:alpha val="38824"/>
-            </a:srgbClr>
-          </a:solidFill>
-          <a:ln>
-            <a:noFill/>
-          </a:ln>
-        </p:spPr>
-        <p:style>
-          <a:lnRef idx="2">
-            <a:schemeClr val="accent1">
-              <a:shade val="50000"/>
-            </a:schemeClr>
-          </a:lnRef>
-          <a:fillRef idx="1">
-            <a:schemeClr val="accent1"/>
-          </a:fillRef>
-          <a:effectRef idx="0">
-            <a:schemeClr val="accent1"/>
-          </a:effectRef>
-          <a:fontRef idx="minor">
-            <a:schemeClr val="lt1"/>
-          </a:fontRef>
-        </p:style>
-        <p:txBody>
-          <a:bodyPr rtlCol="0" anchor="ctr"/>
-          <a:lstStyle/>
-          <a:p>
-            <a:pPr algn="ctr"/>
-            <a:endParaRPr lang="pt-BR"/>
-          </a:p>
-        </p:txBody>
-      </p:sp>
-      <p:sp>
-        <p:nvSpPr>
-          <p:cNvPr id="31" name="Retângulo de cantos arredondados 30"/>
-          <p:cNvSpPr/>
-          <p:nvPr/>
-        </p:nvSpPr>
-        <p:spPr>
-          <a:xfrm>
-            <a:off x="3505511" y="850944"/>
-            <a:ext cx="195127" cy="27634"/>
-          </a:xfrm>
-          <a:prstGeom prst="roundRect">
-            <a:avLst>
-              <a:gd name="adj" fmla="val 50000"/>
-            </a:avLst>
-          </a:prstGeom>
-          <a:solidFill>
-            <a:srgbClr val="87C7D9"/>
-          </a:solidFill>
-          <a:ln>
-            <a:noFill/>
-          </a:ln>
-        </p:spPr>
-        <p:style>
-          <a:lnRef idx="2">
-            <a:schemeClr val="accent1">
-              <a:shade val="50000"/>
-            </a:schemeClr>
-          </a:lnRef>
-          <a:fillRef idx="1">
-            <a:schemeClr val="accent1"/>
-          </a:fillRef>
-          <a:effectRef idx="0">
-            <a:schemeClr val="accent1"/>
-          </a:effectRef>
-          <a:fontRef idx="minor">
-            <a:schemeClr val="lt1"/>
-          </a:fontRef>
-        </p:style>
-        <p:txBody>
-          <a:bodyPr rtlCol="0" anchor="ctr"/>
-          <a:lstStyle/>
-          <a:p>
-            <a:pPr algn="ctr"/>
-            <a:endParaRPr lang="pt-BR"/>
-          </a:p>
-        </p:txBody>
-      </p:sp>
-      <p:sp>
-        <p:nvSpPr>
-          <p:cNvPr id="32" name="Retângulo de cantos arredondados 31"/>
-          <p:cNvSpPr/>
-          <p:nvPr/>
-        </p:nvSpPr>
-        <p:spPr>
-          <a:xfrm>
-            <a:off x="3533386" y="785177"/>
-            <a:ext cx="139376" cy="209116"/>
-          </a:xfrm>
-          <a:prstGeom prst="roundRect">
-            <a:avLst/>
-          </a:prstGeom>
-          <a:solidFill>
-            <a:srgbClr val="87C7D9"/>
-          </a:solidFill>
-          <a:ln>
-            <a:noFill/>
-          </a:ln>
-        </p:spPr>
-        <p:style>
-          <a:lnRef idx="2">
-            <a:schemeClr val="accent1">
-              <a:shade val="50000"/>
-            </a:schemeClr>
-          </a:lnRef>
-          <a:fillRef idx="1">
-            <a:schemeClr val="accent1"/>
-          </a:fillRef>
-          <a:effectRef idx="0">
-            <a:schemeClr val="accent1"/>
-          </a:effectRef>
-          <a:fontRef idx="minor">
-            <a:schemeClr val="lt1"/>
-          </a:fontRef>
-        </p:style>
-        <p:txBody>
-          <a:bodyPr rtlCol="0" anchor="ctr"/>
-          <a:lstStyle/>
-          <a:p>
-            <a:pPr algn="ctr"/>
-            <a:endParaRPr lang="pt-BR"/>
-          </a:p>
-        </p:txBody>
-      </p:sp>
-      <p:sp>
-        <p:nvSpPr>
-          <p:cNvPr id="33" name="Arredondar Retângulo no Mesmo Canto Lateral 32"/>
-          <p:cNvSpPr/>
-          <p:nvPr/>
-        </p:nvSpPr>
-        <p:spPr>
-          <a:xfrm>
-            <a:off x="3507611" y="731223"/>
-            <a:ext cx="190926" cy="111502"/>
-          </a:xfrm>
-          <a:prstGeom prst="round2SameRect">
-            <a:avLst>
-              <a:gd name="adj1" fmla="val 26472"/>
-              <a:gd name="adj2" fmla="val 6568"/>
-            </a:avLst>
-          </a:prstGeom>
-          <a:solidFill>
-            <a:srgbClr val="4AABC6"/>
-          </a:solidFill>
-          <a:ln>
-            <a:noFill/>
-          </a:ln>
-        </p:spPr>
-        <p:style>
-          <a:lnRef idx="2">
-            <a:schemeClr val="accent1">
-              <a:shade val="50000"/>
-            </a:schemeClr>
-          </a:lnRef>
-          <a:fillRef idx="1">
-            <a:schemeClr val="accent1"/>
-          </a:fillRef>
-          <a:effectRef idx="0">
-            <a:schemeClr val="accent1"/>
-          </a:effectRef>
-          <a:fontRef idx="minor">
-            <a:schemeClr val="lt1"/>
-          </a:fontRef>
-        </p:style>
-        <p:txBody>
-          <a:bodyPr rtlCol="0" anchor="ctr"/>
-          <a:lstStyle/>
-          <a:p>
-            <a:pPr algn="ctr"/>
-            <a:endParaRPr lang="pt-BR"/>
-          </a:p>
-        </p:txBody>
-      </p:sp>
     </p:spTree>
     <p:extLst>
       <p:ext uri="{BB962C8B-B14F-4D97-AF65-F5344CB8AC3E}">
@@ -21824,36 +20397,255 @@
           </p:txBody>
         </p:sp>
       </p:grpSp>
+      <p:sp>
+        <p:nvSpPr>
+          <p:cNvPr id="84" name="Retângulo de cantos arredondados 83"/>
+          <p:cNvSpPr/>
+          <p:nvPr/>
+        </p:nvSpPr>
+        <p:spPr>
+          <a:xfrm>
+            <a:off x="5193017" y="2223534"/>
+            <a:ext cx="1998431" cy="1998431"/>
+          </a:xfrm>
+          <a:prstGeom prst="roundRect">
+            <a:avLst/>
+          </a:prstGeom>
+          <a:solidFill>
+            <a:srgbClr val="79CD4B"/>
+          </a:solidFill>
+          <a:ln>
+            <a:noFill/>
+          </a:ln>
+        </p:spPr>
+        <p:style>
+          <a:lnRef idx="2">
+            <a:schemeClr val="accent1">
+              <a:shade val="50000"/>
+            </a:schemeClr>
+          </a:lnRef>
+          <a:fillRef idx="1">
+            <a:schemeClr val="accent1"/>
+          </a:fillRef>
+          <a:effectRef idx="0">
+            <a:schemeClr val="accent1"/>
+          </a:effectRef>
+          <a:fontRef idx="minor">
+            <a:schemeClr val="lt1"/>
+          </a:fontRef>
+        </p:style>
+        <p:txBody>
+          <a:bodyPr rtlCol="0" anchor="ctr"/>
+          <a:lstStyle/>
+          <a:p>
+            <a:pPr algn="ctr"/>
+            <a:endParaRPr lang="pt-BR"/>
+          </a:p>
+        </p:txBody>
+      </p:sp>
       <p:grpSp>
         <p:nvGrpSpPr>
-          <p:cNvPr id="30" name="Grupo 29"/>
+          <p:cNvPr id="29" name="Grupo 28"/>
           <p:cNvGrpSpPr/>
           <p:nvPr/>
         </p:nvGrpSpPr>
         <p:grpSpPr>
           <a:xfrm>
-            <a:off x="5193017" y="2223534"/>
-            <a:ext cx="1998431" cy="1998431"/>
-            <a:chOff x="5292080" y="2283455"/>
-            <a:chExt cx="1998431" cy="1998431"/>
+            <a:off x="5743158" y="2262137"/>
+            <a:ext cx="898147" cy="1670661"/>
+            <a:chOff x="3241512" y="2835111"/>
+            <a:chExt cx="626959" cy="1166219"/>
           </a:xfrm>
         </p:grpSpPr>
         <p:sp>
           <p:nvSpPr>
-            <p:cNvPr id="84" name="Retângulo de cantos arredondados 83"/>
+            <p:cNvPr id="85" name="Retângulo de cantos arredondados 2"/>
             <p:cNvSpPr/>
             <p:nvPr/>
           </p:nvSpPr>
           <p:spPr>
             <a:xfrm>
-              <a:off x="5292080" y="2283455"/>
-              <a:ext cx="1998431" cy="1998431"/>
+              <a:off x="3241512" y="3277860"/>
+              <a:ext cx="626959" cy="723470"/>
             </a:xfrm>
-            <a:prstGeom prst="roundRect">
+            <a:custGeom>
               <a:avLst/>
-            </a:prstGeom>
+              <a:gdLst>
+                <a:gd name="connsiteX0" fmla="*/ 0 w 1152128"/>
+                <a:gd name="connsiteY0" fmla="*/ 180020 h 1368152"/>
+                <a:gd name="connsiteX1" fmla="*/ 180020 w 1152128"/>
+                <a:gd name="connsiteY1" fmla="*/ 0 h 1368152"/>
+                <a:gd name="connsiteX2" fmla="*/ 972108 w 1152128"/>
+                <a:gd name="connsiteY2" fmla="*/ 0 h 1368152"/>
+                <a:gd name="connsiteX3" fmla="*/ 1152128 w 1152128"/>
+                <a:gd name="connsiteY3" fmla="*/ 180020 h 1368152"/>
+                <a:gd name="connsiteX4" fmla="*/ 1152128 w 1152128"/>
+                <a:gd name="connsiteY4" fmla="*/ 1188132 h 1368152"/>
+                <a:gd name="connsiteX5" fmla="*/ 972108 w 1152128"/>
+                <a:gd name="connsiteY5" fmla="*/ 1368152 h 1368152"/>
+                <a:gd name="connsiteX6" fmla="*/ 180020 w 1152128"/>
+                <a:gd name="connsiteY6" fmla="*/ 1368152 h 1368152"/>
+                <a:gd name="connsiteX7" fmla="*/ 0 w 1152128"/>
+                <a:gd name="connsiteY7" fmla="*/ 1188132 h 1368152"/>
+                <a:gd name="connsiteX8" fmla="*/ 0 w 1152128"/>
+                <a:gd name="connsiteY8" fmla="*/ 180020 h 1368152"/>
+                <a:gd name="connsiteX0" fmla="*/ 57150 w 1152128"/>
+                <a:gd name="connsiteY0" fmla="*/ 184782 h 1368152"/>
+                <a:gd name="connsiteX1" fmla="*/ 180020 w 1152128"/>
+                <a:gd name="connsiteY1" fmla="*/ 0 h 1368152"/>
+                <a:gd name="connsiteX2" fmla="*/ 972108 w 1152128"/>
+                <a:gd name="connsiteY2" fmla="*/ 0 h 1368152"/>
+                <a:gd name="connsiteX3" fmla="*/ 1152128 w 1152128"/>
+                <a:gd name="connsiteY3" fmla="*/ 180020 h 1368152"/>
+                <a:gd name="connsiteX4" fmla="*/ 1152128 w 1152128"/>
+                <a:gd name="connsiteY4" fmla="*/ 1188132 h 1368152"/>
+                <a:gd name="connsiteX5" fmla="*/ 972108 w 1152128"/>
+                <a:gd name="connsiteY5" fmla="*/ 1368152 h 1368152"/>
+                <a:gd name="connsiteX6" fmla="*/ 180020 w 1152128"/>
+                <a:gd name="connsiteY6" fmla="*/ 1368152 h 1368152"/>
+                <a:gd name="connsiteX7" fmla="*/ 0 w 1152128"/>
+                <a:gd name="connsiteY7" fmla="*/ 1188132 h 1368152"/>
+                <a:gd name="connsiteX8" fmla="*/ 57150 w 1152128"/>
+                <a:gd name="connsiteY8" fmla="*/ 184782 h 1368152"/>
+                <a:gd name="connsiteX0" fmla="*/ 57150 w 1152128"/>
+                <a:gd name="connsiteY0" fmla="*/ 184782 h 1368152"/>
+                <a:gd name="connsiteX1" fmla="*/ 180020 w 1152128"/>
+                <a:gd name="connsiteY1" fmla="*/ 0 h 1368152"/>
+                <a:gd name="connsiteX2" fmla="*/ 972108 w 1152128"/>
+                <a:gd name="connsiteY2" fmla="*/ 0 h 1368152"/>
+                <a:gd name="connsiteX3" fmla="*/ 1085453 w 1152128"/>
+                <a:gd name="connsiteY3" fmla="*/ 175257 h 1368152"/>
+                <a:gd name="connsiteX4" fmla="*/ 1152128 w 1152128"/>
+                <a:gd name="connsiteY4" fmla="*/ 1188132 h 1368152"/>
+                <a:gd name="connsiteX5" fmla="*/ 972108 w 1152128"/>
+                <a:gd name="connsiteY5" fmla="*/ 1368152 h 1368152"/>
+                <a:gd name="connsiteX6" fmla="*/ 180020 w 1152128"/>
+                <a:gd name="connsiteY6" fmla="*/ 1368152 h 1368152"/>
+                <a:gd name="connsiteX7" fmla="*/ 0 w 1152128"/>
+                <a:gd name="connsiteY7" fmla="*/ 1188132 h 1368152"/>
+                <a:gd name="connsiteX8" fmla="*/ 57150 w 1152128"/>
+                <a:gd name="connsiteY8" fmla="*/ 184782 h 1368152"/>
+                <a:gd name="connsiteX0" fmla="*/ 0 w 1152128"/>
+                <a:gd name="connsiteY0" fmla="*/ 1188132 h 1368152"/>
+                <a:gd name="connsiteX1" fmla="*/ 180020 w 1152128"/>
+                <a:gd name="connsiteY1" fmla="*/ 0 h 1368152"/>
+                <a:gd name="connsiteX2" fmla="*/ 972108 w 1152128"/>
+                <a:gd name="connsiteY2" fmla="*/ 0 h 1368152"/>
+                <a:gd name="connsiteX3" fmla="*/ 1085453 w 1152128"/>
+                <a:gd name="connsiteY3" fmla="*/ 175257 h 1368152"/>
+                <a:gd name="connsiteX4" fmla="*/ 1152128 w 1152128"/>
+                <a:gd name="connsiteY4" fmla="*/ 1188132 h 1368152"/>
+                <a:gd name="connsiteX5" fmla="*/ 972108 w 1152128"/>
+                <a:gd name="connsiteY5" fmla="*/ 1368152 h 1368152"/>
+                <a:gd name="connsiteX6" fmla="*/ 180020 w 1152128"/>
+                <a:gd name="connsiteY6" fmla="*/ 1368152 h 1368152"/>
+                <a:gd name="connsiteX7" fmla="*/ 0 w 1152128"/>
+                <a:gd name="connsiteY7" fmla="*/ 1188132 h 1368152"/>
+                <a:gd name="connsiteX0" fmla="*/ 0 w 1152128"/>
+                <a:gd name="connsiteY0" fmla="*/ 1188132 h 1368152"/>
+                <a:gd name="connsiteX1" fmla="*/ 180020 w 1152128"/>
+                <a:gd name="connsiteY1" fmla="*/ 0 h 1368152"/>
+                <a:gd name="connsiteX2" fmla="*/ 972108 w 1152128"/>
+                <a:gd name="connsiteY2" fmla="*/ 0 h 1368152"/>
+                <a:gd name="connsiteX3" fmla="*/ 1152128 w 1152128"/>
+                <a:gd name="connsiteY3" fmla="*/ 1188132 h 1368152"/>
+                <a:gd name="connsiteX4" fmla="*/ 972108 w 1152128"/>
+                <a:gd name="connsiteY4" fmla="*/ 1368152 h 1368152"/>
+                <a:gd name="connsiteX5" fmla="*/ 180020 w 1152128"/>
+                <a:gd name="connsiteY5" fmla="*/ 1368152 h 1368152"/>
+                <a:gd name="connsiteX6" fmla="*/ 0 w 1152128"/>
+                <a:gd name="connsiteY6" fmla="*/ 1188132 h 1368152"/>
+                <a:gd name="connsiteX0" fmla="*/ 0 w 1152128"/>
+                <a:gd name="connsiteY0" fmla="*/ 1223322 h 1403342"/>
+                <a:gd name="connsiteX1" fmla="*/ 194307 w 1152128"/>
+                <a:gd name="connsiteY1" fmla="*/ 0 h 1403342"/>
+                <a:gd name="connsiteX2" fmla="*/ 972108 w 1152128"/>
+                <a:gd name="connsiteY2" fmla="*/ 35190 h 1403342"/>
+                <a:gd name="connsiteX3" fmla="*/ 1152128 w 1152128"/>
+                <a:gd name="connsiteY3" fmla="*/ 1223322 h 1403342"/>
+                <a:gd name="connsiteX4" fmla="*/ 972108 w 1152128"/>
+                <a:gd name="connsiteY4" fmla="*/ 1403342 h 1403342"/>
+                <a:gd name="connsiteX5" fmla="*/ 180020 w 1152128"/>
+                <a:gd name="connsiteY5" fmla="*/ 1403342 h 1403342"/>
+                <a:gd name="connsiteX6" fmla="*/ 0 w 1152128"/>
+                <a:gd name="connsiteY6" fmla="*/ 1223322 h 1403342"/>
+                <a:gd name="connsiteX0" fmla="*/ 0 w 1152128"/>
+                <a:gd name="connsiteY0" fmla="*/ 1223322 h 1403342"/>
+                <a:gd name="connsiteX1" fmla="*/ 194307 w 1152128"/>
+                <a:gd name="connsiteY1" fmla="*/ 0 h 1403342"/>
+                <a:gd name="connsiteX2" fmla="*/ 953058 w 1152128"/>
+                <a:gd name="connsiteY2" fmla="*/ 5028 h 1403342"/>
+                <a:gd name="connsiteX3" fmla="*/ 1152128 w 1152128"/>
+                <a:gd name="connsiteY3" fmla="*/ 1223322 h 1403342"/>
+                <a:gd name="connsiteX4" fmla="*/ 972108 w 1152128"/>
+                <a:gd name="connsiteY4" fmla="*/ 1403342 h 1403342"/>
+                <a:gd name="connsiteX5" fmla="*/ 180020 w 1152128"/>
+                <a:gd name="connsiteY5" fmla="*/ 1403342 h 1403342"/>
+                <a:gd name="connsiteX6" fmla="*/ 0 w 1152128"/>
+                <a:gd name="connsiteY6" fmla="*/ 1223322 h 1403342"/>
+              </a:gdLst>
+              <a:ahLst/>
+              <a:cxnLst>
+                <a:cxn ang="0">
+                  <a:pos x="connsiteX0" y="connsiteY0"/>
+                </a:cxn>
+                <a:cxn ang="0">
+                  <a:pos x="connsiteX1" y="connsiteY1"/>
+                </a:cxn>
+                <a:cxn ang="0">
+                  <a:pos x="connsiteX2" y="connsiteY2"/>
+                </a:cxn>
+                <a:cxn ang="0">
+                  <a:pos x="connsiteX3" y="connsiteY3"/>
+                </a:cxn>
+                <a:cxn ang="0">
+                  <a:pos x="connsiteX4" y="connsiteY4"/>
+                </a:cxn>
+                <a:cxn ang="0">
+                  <a:pos x="connsiteX5" y="connsiteY5"/>
+                </a:cxn>
+                <a:cxn ang="0">
+                  <a:pos x="connsiteX6" y="connsiteY6"/>
+                </a:cxn>
+              </a:cxnLst>
+              <a:rect l="l" t="t" r="r" b="b"/>
+              <a:pathLst>
+                <a:path w="1152128" h="1403342">
+                  <a:moveTo>
+                    <a:pt x="0" y="1223322"/>
+                  </a:moveTo>
+                  <a:cubicBezTo>
+                    <a:pt x="0" y="995297"/>
+                    <a:pt x="32289" y="198022"/>
+                    <a:pt x="194307" y="0"/>
+                  </a:cubicBezTo>
+                  <a:lnTo>
+                    <a:pt x="953058" y="5028"/>
+                  </a:lnTo>
+                  <a:cubicBezTo>
+                    <a:pt x="1115076" y="203050"/>
+                    <a:pt x="1152128" y="995297"/>
+                    <a:pt x="1152128" y="1223322"/>
+                  </a:cubicBezTo>
+                  <a:cubicBezTo>
+                    <a:pt x="1152128" y="1322744"/>
+                    <a:pt x="1071530" y="1403342"/>
+                    <a:pt x="972108" y="1403342"/>
+                  </a:cubicBezTo>
+                  <a:lnTo>
+                    <a:pt x="180020" y="1403342"/>
+                  </a:lnTo>
+                  <a:cubicBezTo>
+                    <a:pt x="80598" y="1403342"/>
+                    <a:pt x="0" y="1322744"/>
+                    <a:pt x="0" y="1223322"/>
+                  </a:cubicBezTo>
+                  <a:close/>
+                </a:path>
+              </a:pathLst>
+            </a:custGeom>
             <a:solidFill>
-              <a:srgbClr val="79CD4B"/>
+              <a:srgbClr val="F5F0EA"/>
             </a:solidFill>
             <a:ln>
               <a:noFill/>
@@ -21884,845 +20676,611 @@
             </a:p>
           </p:txBody>
         </p:sp>
-        <p:grpSp>
-          <p:nvGrpSpPr>
-            <p:cNvPr id="29" name="Grupo 28"/>
-            <p:cNvGrpSpPr/>
+        <p:sp>
+          <p:nvSpPr>
+            <p:cNvPr id="86" name="Trapezoide 85"/>
+            <p:cNvSpPr/>
             <p:nvPr/>
-          </p:nvGrpSpPr>
-          <p:grpSpPr>
+          </p:nvSpPr>
+          <p:spPr>
             <a:xfrm>
-              <a:off x="5842221" y="2322058"/>
-              <a:ext cx="898147" cy="1670661"/>
-              <a:chOff x="3241512" y="2835111"/>
-              <a:chExt cx="626959" cy="1166219"/>
+              <a:off x="3306195" y="3609482"/>
+              <a:ext cx="497593" cy="313479"/>
             </a:xfrm>
-          </p:grpSpPr>
-          <p:sp>
-            <p:nvSpPr>
-              <p:cNvPr id="85" name="Retângulo de cantos arredondados 2"/>
-              <p:cNvSpPr/>
-              <p:nvPr/>
-            </p:nvSpPr>
-            <p:spPr>
-              <a:xfrm>
-                <a:off x="3241512" y="3277860"/>
-                <a:ext cx="626959" cy="723470"/>
-              </a:xfrm>
-              <a:custGeom>
-                <a:avLst/>
-                <a:gdLst>
-                  <a:gd name="connsiteX0" fmla="*/ 0 w 1152128"/>
-                  <a:gd name="connsiteY0" fmla="*/ 180020 h 1368152"/>
-                  <a:gd name="connsiteX1" fmla="*/ 180020 w 1152128"/>
-                  <a:gd name="connsiteY1" fmla="*/ 0 h 1368152"/>
-                  <a:gd name="connsiteX2" fmla="*/ 972108 w 1152128"/>
-                  <a:gd name="connsiteY2" fmla="*/ 0 h 1368152"/>
-                  <a:gd name="connsiteX3" fmla="*/ 1152128 w 1152128"/>
-                  <a:gd name="connsiteY3" fmla="*/ 180020 h 1368152"/>
-                  <a:gd name="connsiteX4" fmla="*/ 1152128 w 1152128"/>
-                  <a:gd name="connsiteY4" fmla="*/ 1188132 h 1368152"/>
-                  <a:gd name="connsiteX5" fmla="*/ 972108 w 1152128"/>
-                  <a:gd name="connsiteY5" fmla="*/ 1368152 h 1368152"/>
-                  <a:gd name="connsiteX6" fmla="*/ 180020 w 1152128"/>
-                  <a:gd name="connsiteY6" fmla="*/ 1368152 h 1368152"/>
-                  <a:gd name="connsiteX7" fmla="*/ 0 w 1152128"/>
-                  <a:gd name="connsiteY7" fmla="*/ 1188132 h 1368152"/>
-                  <a:gd name="connsiteX8" fmla="*/ 0 w 1152128"/>
-                  <a:gd name="connsiteY8" fmla="*/ 180020 h 1368152"/>
-                  <a:gd name="connsiteX0" fmla="*/ 57150 w 1152128"/>
-                  <a:gd name="connsiteY0" fmla="*/ 184782 h 1368152"/>
-                  <a:gd name="connsiteX1" fmla="*/ 180020 w 1152128"/>
-                  <a:gd name="connsiteY1" fmla="*/ 0 h 1368152"/>
-                  <a:gd name="connsiteX2" fmla="*/ 972108 w 1152128"/>
-                  <a:gd name="connsiteY2" fmla="*/ 0 h 1368152"/>
-                  <a:gd name="connsiteX3" fmla="*/ 1152128 w 1152128"/>
-                  <a:gd name="connsiteY3" fmla="*/ 180020 h 1368152"/>
-                  <a:gd name="connsiteX4" fmla="*/ 1152128 w 1152128"/>
-                  <a:gd name="connsiteY4" fmla="*/ 1188132 h 1368152"/>
-                  <a:gd name="connsiteX5" fmla="*/ 972108 w 1152128"/>
-                  <a:gd name="connsiteY5" fmla="*/ 1368152 h 1368152"/>
-                  <a:gd name="connsiteX6" fmla="*/ 180020 w 1152128"/>
-                  <a:gd name="connsiteY6" fmla="*/ 1368152 h 1368152"/>
-                  <a:gd name="connsiteX7" fmla="*/ 0 w 1152128"/>
-                  <a:gd name="connsiteY7" fmla="*/ 1188132 h 1368152"/>
-                  <a:gd name="connsiteX8" fmla="*/ 57150 w 1152128"/>
-                  <a:gd name="connsiteY8" fmla="*/ 184782 h 1368152"/>
-                  <a:gd name="connsiteX0" fmla="*/ 57150 w 1152128"/>
-                  <a:gd name="connsiteY0" fmla="*/ 184782 h 1368152"/>
-                  <a:gd name="connsiteX1" fmla="*/ 180020 w 1152128"/>
-                  <a:gd name="connsiteY1" fmla="*/ 0 h 1368152"/>
-                  <a:gd name="connsiteX2" fmla="*/ 972108 w 1152128"/>
-                  <a:gd name="connsiteY2" fmla="*/ 0 h 1368152"/>
-                  <a:gd name="connsiteX3" fmla="*/ 1085453 w 1152128"/>
-                  <a:gd name="connsiteY3" fmla="*/ 175257 h 1368152"/>
-                  <a:gd name="connsiteX4" fmla="*/ 1152128 w 1152128"/>
-                  <a:gd name="connsiteY4" fmla="*/ 1188132 h 1368152"/>
-                  <a:gd name="connsiteX5" fmla="*/ 972108 w 1152128"/>
-                  <a:gd name="connsiteY5" fmla="*/ 1368152 h 1368152"/>
-                  <a:gd name="connsiteX6" fmla="*/ 180020 w 1152128"/>
-                  <a:gd name="connsiteY6" fmla="*/ 1368152 h 1368152"/>
-                  <a:gd name="connsiteX7" fmla="*/ 0 w 1152128"/>
-                  <a:gd name="connsiteY7" fmla="*/ 1188132 h 1368152"/>
-                  <a:gd name="connsiteX8" fmla="*/ 57150 w 1152128"/>
-                  <a:gd name="connsiteY8" fmla="*/ 184782 h 1368152"/>
-                  <a:gd name="connsiteX0" fmla="*/ 0 w 1152128"/>
-                  <a:gd name="connsiteY0" fmla="*/ 1188132 h 1368152"/>
-                  <a:gd name="connsiteX1" fmla="*/ 180020 w 1152128"/>
-                  <a:gd name="connsiteY1" fmla="*/ 0 h 1368152"/>
-                  <a:gd name="connsiteX2" fmla="*/ 972108 w 1152128"/>
-                  <a:gd name="connsiteY2" fmla="*/ 0 h 1368152"/>
-                  <a:gd name="connsiteX3" fmla="*/ 1085453 w 1152128"/>
-                  <a:gd name="connsiteY3" fmla="*/ 175257 h 1368152"/>
-                  <a:gd name="connsiteX4" fmla="*/ 1152128 w 1152128"/>
-                  <a:gd name="connsiteY4" fmla="*/ 1188132 h 1368152"/>
-                  <a:gd name="connsiteX5" fmla="*/ 972108 w 1152128"/>
-                  <a:gd name="connsiteY5" fmla="*/ 1368152 h 1368152"/>
-                  <a:gd name="connsiteX6" fmla="*/ 180020 w 1152128"/>
-                  <a:gd name="connsiteY6" fmla="*/ 1368152 h 1368152"/>
-                  <a:gd name="connsiteX7" fmla="*/ 0 w 1152128"/>
-                  <a:gd name="connsiteY7" fmla="*/ 1188132 h 1368152"/>
-                  <a:gd name="connsiteX0" fmla="*/ 0 w 1152128"/>
-                  <a:gd name="connsiteY0" fmla="*/ 1188132 h 1368152"/>
-                  <a:gd name="connsiteX1" fmla="*/ 180020 w 1152128"/>
-                  <a:gd name="connsiteY1" fmla="*/ 0 h 1368152"/>
-                  <a:gd name="connsiteX2" fmla="*/ 972108 w 1152128"/>
-                  <a:gd name="connsiteY2" fmla="*/ 0 h 1368152"/>
-                  <a:gd name="connsiteX3" fmla="*/ 1152128 w 1152128"/>
-                  <a:gd name="connsiteY3" fmla="*/ 1188132 h 1368152"/>
-                  <a:gd name="connsiteX4" fmla="*/ 972108 w 1152128"/>
-                  <a:gd name="connsiteY4" fmla="*/ 1368152 h 1368152"/>
-                  <a:gd name="connsiteX5" fmla="*/ 180020 w 1152128"/>
-                  <a:gd name="connsiteY5" fmla="*/ 1368152 h 1368152"/>
-                  <a:gd name="connsiteX6" fmla="*/ 0 w 1152128"/>
-                  <a:gd name="connsiteY6" fmla="*/ 1188132 h 1368152"/>
-                  <a:gd name="connsiteX0" fmla="*/ 0 w 1152128"/>
-                  <a:gd name="connsiteY0" fmla="*/ 1223322 h 1403342"/>
-                  <a:gd name="connsiteX1" fmla="*/ 194307 w 1152128"/>
-                  <a:gd name="connsiteY1" fmla="*/ 0 h 1403342"/>
-                  <a:gd name="connsiteX2" fmla="*/ 972108 w 1152128"/>
-                  <a:gd name="connsiteY2" fmla="*/ 35190 h 1403342"/>
-                  <a:gd name="connsiteX3" fmla="*/ 1152128 w 1152128"/>
-                  <a:gd name="connsiteY3" fmla="*/ 1223322 h 1403342"/>
-                  <a:gd name="connsiteX4" fmla="*/ 972108 w 1152128"/>
-                  <a:gd name="connsiteY4" fmla="*/ 1403342 h 1403342"/>
-                  <a:gd name="connsiteX5" fmla="*/ 180020 w 1152128"/>
-                  <a:gd name="connsiteY5" fmla="*/ 1403342 h 1403342"/>
-                  <a:gd name="connsiteX6" fmla="*/ 0 w 1152128"/>
-                  <a:gd name="connsiteY6" fmla="*/ 1223322 h 1403342"/>
-                  <a:gd name="connsiteX0" fmla="*/ 0 w 1152128"/>
-                  <a:gd name="connsiteY0" fmla="*/ 1223322 h 1403342"/>
-                  <a:gd name="connsiteX1" fmla="*/ 194307 w 1152128"/>
-                  <a:gd name="connsiteY1" fmla="*/ 0 h 1403342"/>
-                  <a:gd name="connsiteX2" fmla="*/ 953058 w 1152128"/>
-                  <a:gd name="connsiteY2" fmla="*/ 5028 h 1403342"/>
-                  <a:gd name="connsiteX3" fmla="*/ 1152128 w 1152128"/>
-                  <a:gd name="connsiteY3" fmla="*/ 1223322 h 1403342"/>
-                  <a:gd name="connsiteX4" fmla="*/ 972108 w 1152128"/>
-                  <a:gd name="connsiteY4" fmla="*/ 1403342 h 1403342"/>
-                  <a:gd name="connsiteX5" fmla="*/ 180020 w 1152128"/>
-                  <a:gd name="connsiteY5" fmla="*/ 1403342 h 1403342"/>
-                  <a:gd name="connsiteX6" fmla="*/ 0 w 1152128"/>
-                  <a:gd name="connsiteY6" fmla="*/ 1223322 h 1403342"/>
-                </a:gdLst>
-                <a:ahLst/>
-                <a:cxnLst>
-                  <a:cxn ang="0">
-                    <a:pos x="connsiteX0" y="connsiteY0"/>
-                  </a:cxn>
-                  <a:cxn ang="0">
-                    <a:pos x="connsiteX1" y="connsiteY1"/>
-                  </a:cxn>
-                  <a:cxn ang="0">
-                    <a:pos x="connsiteX2" y="connsiteY2"/>
-                  </a:cxn>
-                  <a:cxn ang="0">
-                    <a:pos x="connsiteX3" y="connsiteY3"/>
-                  </a:cxn>
-                  <a:cxn ang="0">
-                    <a:pos x="connsiteX4" y="connsiteY4"/>
-                  </a:cxn>
-                  <a:cxn ang="0">
-                    <a:pos x="connsiteX5" y="connsiteY5"/>
-                  </a:cxn>
-                  <a:cxn ang="0">
-                    <a:pos x="connsiteX6" y="connsiteY6"/>
-                  </a:cxn>
-                </a:cxnLst>
-                <a:rect l="l" t="t" r="r" b="b"/>
-                <a:pathLst>
-                  <a:path w="1152128" h="1403342">
-                    <a:moveTo>
-                      <a:pt x="0" y="1223322"/>
-                    </a:moveTo>
-                    <a:cubicBezTo>
-                      <a:pt x="0" y="995297"/>
-                      <a:pt x="32289" y="198022"/>
-                      <a:pt x="194307" y="0"/>
-                    </a:cubicBezTo>
-                    <a:lnTo>
-                      <a:pt x="953058" y="5028"/>
-                    </a:lnTo>
-                    <a:cubicBezTo>
-                      <a:pt x="1115076" y="203050"/>
-                      <a:pt x="1152128" y="995297"/>
-                      <a:pt x="1152128" y="1223322"/>
-                    </a:cubicBezTo>
-                    <a:cubicBezTo>
-                      <a:pt x="1152128" y="1322744"/>
-                      <a:pt x="1071530" y="1403342"/>
-                      <a:pt x="972108" y="1403342"/>
-                    </a:cubicBezTo>
-                    <a:lnTo>
-                      <a:pt x="180020" y="1403342"/>
-                    </a:lnTo>
-                    <a:cubicBezTo>
-                      <a:pt x="80598" y="1403342"/>
-                      <a:pt x="0" y="1322744"/>
-                      <a:pt x="0" y="1223322"/>
-                    </a:cubicBezTo>
-                    <a:close/>
-                  </a:path>
-                </a:pathLst>
-              </a:custGeom>
-              <a:solidFill>
-                <a:srgbClr val="F5F0EA"/>
-              </a:solidFill>
-              <a:ln>
-                <a:noFill/>
-              </a:ln>
-            </p:spPr>
-            <p:style>
-              <a:lnRef idx="2">
-                <a:schemeClr val="accent1">
-                  <a:shade val="50000"/>
-                </a:schemeClr>
-              </a:lnRef>
-              <a:fillRef idx="1">
-                <a:schemeClr val="accent1"/>
-              </a:fillRef>
-              <a:effectRef idx="0">
-                <a:schemeClr val="accent1"/>
-              </a:effectRef>
-              <a:fontRef idx="minor">
-                <a:schemeClr val="lt1"/>
-              </a:fontRef>
-            </p:style>
-            <p:txBody>
-              <a:bodyPr rtlCol="0" anchor="ctr"/>
-              <a:lstStyle/>
-              <a:p>
-                <a:pPr algn="ctr"/>
-                <a:endParaRPr lang="pt-BR"/>
-              </a:p>
-            </p:txBody>
-          </p:sp>
-          <p:sp>
-            <p:nvSpPr>
-              <p:cNvPr id="86" name="Trapezoide 85"/>
-              <p:cNvSpPr/>
-              <p:nvPr/>
-            </p:nvSpPr>
-            <p:spPr>
-              <a:xfrm>
-                <a:off x="3306195" y="3609482"/>
-                <a:ext cx="497593" cy="313479"/>
-              </a:xfrm>
-              <a:prstGeom prst="trapezoid">
-                <a:avLst>
-                  <a:gd name="adj" fmla="val 11458"/>
-                </a:avLst>
-              </a:prstGeom>
-              <a:solidFill>
-                <a:srgbClr val="FFC000"/>
-              </a:solidFill>
-              <a:ln>
-                <a:noFill/>
-              </a:ln>
-            </p:spPr>
-            <p:style>
-              <a:lnRef idx="2">
-                <a:schemeClr val="accent1">
-                  <a:shade val="50000"/>
-                </a:schemeClr>
-              </a:lnRef>
-              <a:fillRef idx="1">
-                <a:schemeClr val="accent1"/>
-              </a:fillRef>
-              <a:effectRef idx="0">
-                <a:schemeClr val="accent1"/>
-              </a:effectRef>
-              <a:fontRef idx="minor">
-                <a:schemeClr val="lt1"/>
-              </a:fontRef>
-            </p:style>
-            <p:txBody>
-              <a:bodyPr rtlCol="0" anchor="ctr"/>
-              <a:lstStyle/>
-              <a:p>
-                <a:pPr algn="ctr"/>
-                <a:endParaRPr lang="pt-BR"/>
-              </a:p>
-            </p:txBody>
-          </p:sp>
-          <p:sp>
-            <p:nvSpPr>
-              <p:cNvPr id="87" name="Elipse 86"/>
-              <p:cNvSpPr/>
-              <p:nvPr/>
-            </p:nvSpPr>
-            <p:spPr>
-              <a:xfrm>
-                <a:off x="3594176" y="3772655"/>
-                <a:ext cx="39181" cy="39181"/>
-              </a:xfrm>
-              <a:prstGeom prst="ellipse">
-                <a:avLst/>
-              </a:prstGeom>
-              <a:solidFill>
-                <a:srgbClr val="FFC000"/>
-              </a:solidFill>
-              <a:ln>
-                <a:noFill/>
-              </a:ln>
-            </p:spPr>
-            <p:style>
-              <a:lnRef idx="2">
-                <a:schemeClr val="accent1">
-                  <a:shade val="50000"/>
-                </a:schemeClr>
-              </a:lnRef>
-              <a:fillRef idx="1">
-                <a:schemeClr val="accent1"/>
-              </a:fillRef>
-              <a:effectRef idx="0">
-                <a:schemeClr val="accent1"/>
-              </a:effectRef>
-              <a:fontRef idx="minor">
-                <a:schemeClr val="lt1"/>
-              </a:fontRef>
-            </p:style>
-            <p:txBody>
-              <a:bodyPr rtlCol="0" anchor="ctr"/>
-              <a:lstStyle/>
-              <a:p>
-                <a:pPr algn="ctr"/>
-                <a:endParaRPr lang="pt-BR"/>
-              </a:p>
-            </p:txBody>
-          </p:sp>
-          <p:sp>
-            <p:nvSpPr>
-              <p:cNvPr id="88" name="Elipse 87"/>
-              <p:cNvSpPr/>
-              <p:nvPr/>
-            </p:nvSpPr>
-            <p:spPr>
-              <a:xfrm>
-                <a:off x="3398252" y="3844591"/>
-                <a:ext cx="39181" cy="39181"/>
-              </a:xfrm>
-              <a:prstGeom prst="ellipse">
-                <a:avLst/>
-              </a:prstGeom>
-              <a:solidFill>
-                <a:srgbClr val="FFC000"/>
-              </a:solidFill>
-              <a:ln>
-                <a:noFill/>
-              </a:ln>
-            </p:spPr>
-            <p:style>
-              <a:lnRef idx="2">
-                <a:schemeClr val="accent1">
-                  <a:shade val="50000"/>
-                </a:schemeClr>
-              </a:lnRef>
-              <a:fillRef idx="1">
-                <a:schemeClr val="accent1"/>
-              </a:fillRef>
-              <a:effectRef idx="0">
-                <a:schemeClr val="accent1"/>
-              </a:effectRef>
-              <a:fontRef idx="minor">
-                <a:schemeClr val="lt1"/>
-              </a:fontRef>
-            </p:style>
-            <p:txBody>
-              <a:bodyPr rtlCol="0" anchor="ctr"/>
-              <a:lstStyle/>
-              <a:p>
-                <a:pPr algn="ctr"/>
-                <a:endParaRPr lang="pt-BR"/>
-              </a:p>
-            </p:txBody>
-          </p:sp>
-          <p:sp>
-            <p:nvSpPr>
-              <p:cNvPr id="89" name="Elipse 88"/>
-              <p:cNvSpPr/>
-              <p:nvPr/>
-            </p:nvSpPr>
-            <p:spPr>
-              <a:xfrm>
-                <a:off x="3437432" y="3589891"/>
-                <a:ext cx="39181" cy="39181"/>
-              </a:xfrm>
-              <a:prstGeom prst="ellipse">
-                <a:avLst/>
-              </a:prstGeom>
-              <a:solidFill>
-                <a:srgbClr val="FFC000"/>
-              </a:solidFill>
-              <a:ln>
-                <a:noFill/>
-              </a:ln>
-            </p:spPr>
-            <p:style>
-              <a:lnRef idx="2">
-                <a:schemeClr val="accent1">
-                  <a:shade val="50000"/>
-                </a:schemeClr>
-              </a:lnRef>
-              <a:fillRef idx="1">
-                <a:schemeClr val="accent1"/>
-              </a:fillRef>
-              <a:effectRef idx="0">
-                <a:schemeClr val="accent1"/>
-              </a:effectRef>
-              <a:fontRef idx="minor">
-                <a:schemeClr val="lt1"/>
-              </a:fontRef>
-            </p:style>
-            <p:txBody>
-              <a:bodyPr rtlCol="0" anchor="ctr"/>
-              <a:lstStyle/>
-              <a:p>
-                <a:pPr algn="ctr"/>
-                <a:endParaRPr lang="pt-BR"/>
-              </a:p>
-            </p:txBody>
-          </p:sp>
-          <p:sp>
-            <p:nvSpPr>
-              <p:cNvPr id="90" name="Elipse 89"/>
-              <p:cNvSpPr/>
-              <p:nvPr/>
-            </p:nvSpPr>
-            <p:spPr>
-              <a:xfrm>
-                <a:off x="3672546" y="3504073"/>
-                <a:ext cx="39181" cy="39181"/>
-              </a:xfrm>
-              <a:prstGeom prst="ellipse">
-                <a:avLst/>
-              </a:prstGeom>
-              <a:solidFill>
-                <a:srgbClr val="FFC000"/>
-              </a:solidFill>
-              <a:ln>
-                <a:noFill/>
-              </a:ln>
-            </p:spPr>
-            <p:style>
-              <a:lnRef idx="2">
-                <a:schemeClr val="accent1">
-                  <a:shade val="50000"/>
-                </a:schemeClr>
-              </a:lnRef>
-              <a:fillRef idx="1">
-                <a:schemeClr val="accent1"/>
-              </a:fillRef>
-              <a:effectRef idx="0">
-                <a:schemeClr val="accent1"/>
-              </a:effectRef>
-              <a:fontRef idx="minor">
-                <a:schemeClr val="lt1"/>
-              </a:fontRef>
-            </p:style>
-            <p:txBody>
-              <a:bodyPr rtlCol="0" anchor="ctr"/>
-              <a:lstStyle/>
-              <a:p>
-                <a:pPr algn="ctr"/>
-                <a:endParaRPr lang="pt-BR"/>
-              </a:p>
-            </p:txBody>
-          </p:sp>
-          <p:sp>
-            <p:nvSpPr>
-              <p:cNvPr id="91" name="Retângulo 90"/>
-              <p:cNvSpPr/>
-              <p:nvPr/>
-            </p:nvSpPr>
-            <p:spPr>
-              <a:xfrm>
-                <a:off x="3519979" y="3279778"/>
-                <a:ext cx="78370" cy="409991"/>
-              </a:xfrm>
-              <a:prstGeom prst="rect">
-                <a:avLst/>
-              </a:prstGeom>
-              <a:solidFill>
-                <a:srgbClr val="FFC000"/>
-              </a:solidFill>
-              <a:ln>
-                <a:noFill/>
-              </a:ln>
-            </p:spPr>
-            <p:style>
-              <a:lnRef idx="2">
-                <a:schemeClr val="accent1">
-                  <a:shade val="50000"/>
-                </a:schemeClr>
-              </a:lnRef>
-              <a:fillRef idx="1">
-                <a:schemeClr val="accent1"/>
-              </a:fillRef>
-              <a:effectRef idx="0">
-                <a:schemeClr val="accent1"/>
-              </a:effectRef>
-              <a:fontRef idx="minor">
-                <a:schemeClr val="lt1"/>
-              </a:fontRef>
-            </p:style>
-            <p:txBody>
-              <a:bodyPr rtlCol="0" anchor="ctr"/>
-              <a:lstStyle/>
-              <a:p>
-                <a:pPr algn="ctr"/>
-                <a:endParaRPr lang="pt-BR"/>
-              </a:p>
-            </p:txBody>
-          </p:sp>
-          <p:sp>
-            <p:nvSpPr>
-              <p:cNvPr id="92" name="Retângulo 91"/>
-              <p:cNvSpPr/>
-              <p:nvPr/>
-            </p:nvSpPr>
-            <p:spPr>
-              <a:xfrm>
-                <a:off x="3408982" y="2987904"/>
-                <a:ext cx="293854" cy="293854"/>
-              </a:xfrm>
-              <a:prstGeom prst="rect">
-                <a:avLst/>
-              </a:prstGeom>
-              <a:solidFill>
-                <a:srgbClr val="D3BBAF"/>
-              </a:solidFill>
-              <a:ln>
-                <a:noFill/>
-              </a:ln>
-            </p:spPr>
-            <p:style>
-              <a:lnRef idx="2">
-                <a:schemeClr val="accent1">
-                  <a:shade val="50000"/>
-                </a:schemeClr>
-              </a:lnRef>
-              <a:fillRef idx="1">
-                <a:schemeClr val="accent1"/>
-              </a:fillRef>
-              <a:effectRef idx="0">
-                <a:schemeClr val="accent1"/>
-              </a:effectRef>
-              <a:fontRef idx="minor">
-                <a:schemeClr val="lt1"/>
-              </a:fontRef>
-            </p:style>
-            <p:txBody>
-              <a:bodyPr rtlCol="0" anchor="ctr"/>
-              <a:lstStyle/>
-              <a:p>
-                <a:pPr algn="ctr"/>
-                <a:endParaRPr lang="pt-BR"/>
-              </a:p>
-            </p:txBody>
-          </p:sp>
-          <p:sp>
-            <p:nvSpPr>
-              <p:cNvPr id="93" name="Fluxograma: Terminação 92"/>
-              <p:cNvSpPr/>
-              <p:nvPr/>
-            </p:nvSpPr>
-            <p:spPr>
-              <a:xfrm>
-                <a:off x="3310368" y="3257122"/>
-                <a:ext cx="497593" cy="24879"/>
-              </a:xfrm>
-              <a:prstGeom prst="flowChartTerminator">
-                <a:avLst/>
-              </a:prstGeom>
-              <a:solidFill>
-                <a:srgbClr val="C0C0C0"/>
-              </a:solidFill>
-              <a:ln>
-                <a:noFill/>
-              </a:ln>
-            </p:spPr>
-            <p:style>
-              <a:lnRef idx="2">
-                <a:schemeClr val="accent1">
-                  <a:shade val="50000"/>
-                </a:schemeClr>
-              </a:lnRef>
-              <a:fillRef idx="1">
-                <a:schemeClr val="accent1"/>
-              </a:fillRef>
-              <a:effectRef idx="0">
-                <a:schemeClr val="accent1"/>
-              </a:effectRef>
-              <a:fontRef idx="minor">
-                <a:schemeClr val="lt1"/>
-              </a:fontRef>
-            </p:style>
-            <p:txBody>
-              <a:bodyPr rtlCol="0" anchor="ctr"/>
-              <a:lstStyle/>
-              <a:p>
-                <a:pPr algn="ctr"/>
-                <a:endParaRPr lang="pt-BR"/>
-              </a:p>
-            </p:txBody>
-          </p:sp>
-          <p:sp>
-            <p:nvSpPr>
-              <p:cNvPr id="94" name="Fluxograma: Terminação 93"/>
-              <p:cNvSpPr/>
-              <p:nvPr/>
-            </p:nvSpPr>
-            <p:spPr>
-              <a:xfrm>
-                <a:off x="3310368" y="3184451"/>
-                <a:ext cx="497593" cy="24879"/>
-              </a:xfrm>
-              <a:prstGeom prst="flowChartTerminator">
-                <a:avLst/>
-              </a:prstGeom>
-              <a:solidFill>
-                <a:srgbClr val="F5F0EA"/>
-              </a:solidFill>
-              <a:ln>
-                <a:noFill/>
-              </a:ln>
-            </p:spPr>
-            <p:style>
-              <a:lnRef idx="2">
-                <a:schemeClr val="accent1">
-                  <a:shade val="50000"/>
-                </a:schemeClr>
-              </a:lnRef>
-              <a:fillRef idx="1">
-                <a:schemeClr val="accent1"/>
-              </a:fillRef>
-              <a:effectRef idx="0">
-                <a:schemeClr val="accent1"/>
-              </a:effectRef>
-              <a:fontRef idx="minor">
-                <a:schemeClr val="lt1"/>
-              </a:fontRef>
-            </p:style>
-            <p:txBody>
-              <a:bodyPr rtlCol="0" anchor="ctr"/>
-              <a:lstStyle/>
-              <a:p>
-                <a:pPr algn="ctr"/>
-                <a:endParaRPr lang="pt-BR"/>
-              </a:p>
-            </p:txBody>
-          </p:sp>
-          <p:sp>
-            <p:nvSpPr>
-              <p:cNvPr id="95" name="Forma livre 94"/>
-              <p:cNvSpPr/>
-              <p:nvPr/>
-            </p:nvSpPr>
-            <p:spPr>
-              <a:xfrm>
-                <a:off x="3519979" y="2835111"/>
-                <a:ext cx="78370" cy="254128"/>
-              </a:xfrm>
-              <a:custGeom>
-                <a:avLst/>
-                <a:gdLst>
-                  <a:gd name="connsiteX0" fmla="*/ 0 w 144016"/>
-                  <a:gd name="connsiteY0" fmla="*/ 0 h 559395"/>
-                  <a:gd name="connsiteX1" fmla="*/ 1140 w 144016"/>
-                  <a:gd name="connsiteY1" fmla="*/ 0 h 559395"/>
-                  <a:gd name="connsiteX2" fmla="*/ 144016 w 144016"/>
-                  <a:gd name="connsiteY2" fmla="*/ 166127 h 559395"/>
-                  <a:gd name="connsiteX3" fmla="*/ 144016 w 144016"/>
-                  <a:gd name="connsiteY3" fmla="*/ 559395 h 559395"/>
-                  <a:gd name="connsiteX4" fmla="*/ 0 w 144016"/>
-                  <a:gd name="connsiteY4" fmla="*/ 559395 h 559395"/>
-                </a:gdLst>
-                <a:ahLst/>
-                <a:cxnLst>
-                  <a:cxn ang="0">
-                    <a:pos x="connsiteX0" y="connsiteY0"/>
-                  </a:cxn>
-                  <a:cxn ang="0">
-                    <a:pos x="connsiteX1" y="connsiteY1"/>
-                  </a:cxn>
-                  <a:cxn ang="0">
-                    <a:pos x="connsiteX2" y="connsiteY2"/>
-                  </a:cxn>
-                  <a:cxn ang="0">
-                    <a:pos x="connsiteX3" y="connsiteY3"/>
-                  </a:cxn>
-                  <a:cxn ang="0">
-                    <a:pos x="connsiteX4" y="connsiteY4"/>
-                  </a:cxn>
-                </a:cxnLst>
-                <a:rect l="l" t="t" r="r" b="b"/>
-                <a:pathLst>
-                  <a:path w="144016" h="559395">
-                    <a:moveTo>
-                      <a:pt x="0" y="0"/>
-                    </a:moveTo>
-                    <a:lnTo>
-                      <a:pt x="1140" y="0"/>
-                    </a:lnTo>
-                    <a:lnTo>
-                      <a:pt x="144016" y="166127"/>
-                    </a:lnTo>
-                    <a:lnTo>
-                      <a:pt x="144016" y="559395"/>
-                    </a:lnTo>
-                    <a:lnTo>
-                      <a:pt x="0" y="559395"/>
-                    </a:lnTo>
-                    <a:close/>
-                  </a:path>
-                </a:pathLst>
-              </a:custGeom>
-              <a:solidFill>
-                <a:schemeClr val="bg1"/>
-              </a:solidFill>
-              <a:ln>
-                <a:noFill/>
-              </a:ln>
-            </p:spPr>
-            <p:style>
-              <a:lnRef idx="2">
-                <a:schemeClr val="accent1">
-                  <a:shade val="50000"/>
-                </a:schemeClr>
-              </a:lnRef>
-              <a:fillRef idx="1">
-                <a:schemeClr val="accent1"/>
-              </a:fillRef>
-              <a:effectRef idx="0">
-                <a:schemeClr val="accent1"/>
-              </a:effectRef>
-              <a:fontRef idx="minor">
-                <a:schemeClr val="lt1"/>
-              </a:fontRef>
-            </p:style>
-            <p:txBody>
-              <a:bodyPr rtlCol="0" anchor="ctr"/>
-              <a:lstStyle/>
-              <a:p>
-                <a:pPr algn="ctr"/>
-                <a:endParaRPr lang="pt-BR"/>
-              </a:p>
-            </p:txBody>
-          </p:sp>
-          <p:sp>
-            <p:nvSpPr>
-              <p:cNvPr id="96" name="Retângulo 95"/>
-              <p:cNvSpPr/>
-              <p:nvPr/>
-            </p:nvSpPr>
-            <p:spPr>
-              <a:xfrm>
-                <a:off x="3378662" y="2983533"/>
-                <a:ext cx="352660" cy="109977"/>
-              </a:xfrm>
-              <a:prstGeom prst="rect">
-                <a:avLst/>
-              </a:prstGeom>
-              <a:solidFill>
-                <a:srgbClr val="C0C0C0"/>
-              </a:solidFill>
-              <a:ln>
-                <a:noFill/>
-              </a:ln>
-            </p:spPr>
-            <p:style>
-              <a:lnRef idx="2">
-                <a:schemeClr val="accent1">
-                  <a:shade val="50000"/>
-                </a:schemeClr>
-              </a:lnRef>
-              <a:fillRef idx="1">
-                <a:schemeClr val="accent1"/>
-              </a:fillRef>
-              <a:effectRef idx="0">
-                <a:schemeClr val="accent1"/>
-              </a:effectRef>
-              <a:fontRef idx="minor">
-                <a:schemeClr val="lt1"/>
-              </a:fontRef>
-            </p:style>
-            <p:txBody>
-              <a:bodyPr rtlCol="0" anchor="ctr"/>
-              <a:lstStyle/>
-              <a:p>
-                <a:pPr algn="ctr"/>
-                <a:endParaRPr lang="pt-BR"/>
-              </a:p>
-            </p:txBody>
-          </p:sp>
-          <p:sp>
-            <p:nvSpPr>
-              <p:cNvPr id="97" name="Fluxograma: Terminação 96"/>
-              <p:cNvSpPr/>
-              <p:nvPr/>
-            </p:nvSpPr>
-            <p:spPr>
-              <a:xfrm>
-                <a:off x="3310368" y="3089139"/>
-                <a:ext cx="497593" cy="24879"/>
-              </a:xfrm>
-              <a:prstGeom prst="flowChartTerminator">
-                <a:avLst/>
-              </a:prstGeom>
-              <a:solidFill>
-                <a:srgbClr val="F5F0EA"/>
-              </a:solidFill>
-              <a:ln>
-                <a:noFill/>
-              </a:ln>
-            </p:spPr>
-            <p:style>
-              <a:lnRef idx="2">
-                <a:schemeClr val="accent1">
-                  <a:shade val="50000"/>
-                </a:schemeClr>
-              </a:lnRef>
-              <a:fillRef idx="1">
-                <a:schemeClr val="accent1"/>
-              </a:fillRef>
-              <a:effectRef idx="0">
-                <a:schemeClr val="accent1"/>
-              </a:effectRef>
-              <a:fontRef idx="minor">
-                <a:schemeClr val="lt1"/>
-              </a:fontRef>
-            </p:style>
-            <p:txBody>
-              <a:bodyPr rtlCol="0" anchor="ctr"/>
-              <a:lstStyle/>
-              <a:p>
-                <a:pPr algn="ctr"/>
-                <a:endParaRPr lang="pt-BR"/>
-              </a:p>
-            </p:txBody>
-          </p:sp>
-        </p:grpSp>
+            <a:prstGeom prst="trapezoid">
+              <a:avLst>
+                <a:gd name="adj" fmla="val 11458"/>
+              </a:avLst>
+            </a:prstGeom>
+            <a:solidFill>
+              <a:srgbClr val="FFC000"/>
+            </a:solidFill>
+            <a:ln>
+              <a:noFill/>
+            </a:ln>
+          </p:spPr>
+          <p:style>
+            <a:lnRef idx="2">
+              <a:schemeClr val="accent1">
+                <a:shade val="50000"/>
+              </a:schemeClr>
+            </a:lnRef>
+            <a:fillRef idx="1">
+              <a:schemeClr val="accent1"/>
+            </a:fillRef>
+            <a:effectRef idx="0">
+              <a:schemeClr val="accent1"/>
+            </a:effectRef>
+            <a:fontRef idx="minor">
+              <a:schemeClr val="lt1"/>
+            </a:fontRef>
+          </p:style>
+          <p:txBody>
+            <a:bodyPr rtlCol="0" anchor="ctr"/>
+            <a:lstStyle/>
+            <a:p>
+              <a:pPr algn="ctr"/>
+              <a:endParaRPr lang="pt-BR"/>
+            </a:p>
+          </p:txBody>
+        </p:sp>
+        <p:sp>
+          <p:nvSpPr>
+            <p:cNvPr id="87" name="Elipse 86"/>
+            <p:cNvSpPr/>
+            <p:nvPr/>
+          </p:nvSpPr>
+          <p:spPr>
+            <a:xfrm>
+              <a:off x="3594176" y="3772655"/>
+              <a:ext cx="39181" cy="39181"/>
+            </a:xfrm>
+            <a:prstGeom prst="ellipse">
+              <a:avLst/>
+            </a:prstGeom>
+            <a:solidFill>
+              <a:srgbClr val="FFC000"/>
+            </a:solidFill>
+            <a:ln>
+              <a:noFill/>
+            </a:ln>
+          </p:spPr>
+          <p:style>
+            <a:lnRef idx="2">
+              <a:schemeClr val="accent1">
+                <a:shade val="50000"/>
+              </a:schemeClr>
+            </a:lnRef>
+            <a:fillRef idx="1">
+              <a:schemeClr val="accent1"/>
+            </a:fillRef>
+            <a:effectRef idx="0">
+              <a:schemeClr val="accent1"/>
+            </a:effectRef>
+            <a:fontRef idx="minor">
+              <a:schemeClr val="lt1"/>
+            </a:fontRef>
+          </p:style>
+          <p:txBody>
+            <a:bodyPr rtlCol="0" anchor="ctr"/>
+            <a:lstStyle/>
+            <a:p>
+              <a:pPr algn="ctr"/>
+              <a:endParaRPr lang="pt-BR"/>
+            </a:p>
+          </p:txBody>
+        </p:sp>
+        <p:sp>
+          <p:nvSpPr>
+            <p:cNvPr id="88" name="Elipse 87"/>
+            <p:cNvSpPr/>
+            <p:nvPr/>
+          </p:nvSpPr>
+          <p:spPr>
+            <a:xfrm>
+              <a:off x="3398252" y="3844591"/>
+              <a:ext cx="39181" cy="39181"/>
+            </a:xfrm>
+            <a:prstGeom prst="ellipse">
+              <a:avLst/>
+            </a:prstGeom>
+            <a:solidFill>
+              <a:srgbClr val="FFC000"/>
+            </a:solidFill>
+            <a:ln>
+              <a:noFill/>
+            </a:ln>
+          </p:spPr>
+          <p:style>
+            <a:lnRef idx="2">
+              <a:schemeClr val="accent1">
+                <a:shade val="50000"/>
+              </a:schemeClr>
+            </a:lnRef>
+            <a:fillRef idx="1">
+              <a:schemeClr val="accent1"/>
+            </a:fillRef>
+            <a:effectRef idx="0">
+              <a:schemeClr val="accent1"/>
+            </a:effectRef>
+            <a:fontRef idx="minor">
+              <a:schemeClr val="lt1"/>
+            </a:fontRef>
+          </p:style>
+          <p:txBody>
+            <a:bodyPr rtlCol="0" anchor="ctr"/>
+            <a:lstStyle/>
+            <a:p>
+              <a:pPr algn="ctr"/>
+              <a:endParaRPr lang="pt-BR"/>
+            </a:p>
+          </p:txBody>
+        </p:sp>
+        <p:sp>
+          <p:nvSpPr>
+            <p:cNvPr id="89" name="Elipse 88"/>
+            <p:cNvSpPr/>
+            <p:nvPr/>
+          </p:nvSpPr>
+          <p:spPr>
+            <a:xfrm>
+              <a:off x="3437432" y="3589891"/>
+              <a:ext cx="39181" cy="39181"/>
+            </a:xfrm>
+            <a:prstGeom prst="ellipse">
+              <a:avLst/>
+            </a:prstGeom>
+            <a:solidFill>
+              <a:srgbClr val="FFC000"/>
+            </a:solidFill>
+            <a:ln>
+              <a:noFill/>
+            </a:ln>
+          </p:spPr>
+          <p:style>
+            <a:lnRef idx="2">
+              <a:schemeClr val="accent1">
+                <a:shade val="50000"/>
+              </a:schemeClr>
+            </a:lnRef>
+            <a:fillRef idx="1">
+              <a:schemeClr val="accent1"/>
+            </a:fillRef>
+            <a:effectRef idx="0">
+              <a:schemeClr val="accent1"/>
+            </a:effectRef>
+            <a:fontRef idx="minor">
+              <a:schemeClr val="lt1"/>
+            </a:fontRef>
+          </p:style>
+          <p:txBody>
+            <a:bodyPr rtlCol="0" anchor="ctr"/>
+            <a:lstStyle/>
+            <a:p>
+              <a:pPr algn="ctr"/>
+              <a:endParaRPr lang="pt-BR"/>
+            </a:p>
+          </p:txBody>
+        </p:sp>
+        <p:sp>
+          <p:nvSpPr>
+            <p:cNvPr id="90" name="Elipse 89"/>
+            <p:cNvSpPr/>
+            <p:nvPr/>
+          </p:nvSpPr>
+          <p:spPr>
+            <a:xfrm>
+              <a:off x="3672546" y="3504073"/>
+              <a:ext cx="39181" cy="39181"/>
+            </a:xfrm>
+            <a:prstGeom prst="ellipse">
+              <a:avLst/>
+            </a:prstGeom>
+            <a:solidFill>
+              <a:srgbClr val="FFC000"/>
+            </a:solidFill>
+            <a:ln>
+              <a:noFill/>
+            </a:ln>
+          </p:spPr>
+          <p:style>
+            <a:lnRef idx="2">
+              <a:schemeClr val="accent1">
+                <a:shade val="50000"/>
+              </a:schemeClr>
+            </a:lnRef>
+            <a:fillRef idx="1">
+              <a:schemeClr val="accent1"/>
+            </a:fillRef>
+            <a:effectRef idx="0">
+              <a:schemeClr val="accent1"/>
+            </a:effectRef>
+            <a:fontRef idx="minor">
+              <a:schemeClr val="lt1"/>
+            </a:fontRef>
+          </p:style>
+          <p:txBody>
+            <a:bodyPr rtlCol="0" anchor="ctr"/>
+            <a:lstStyle/>
+            <a:p>
+              <a:pPr algn="ctr"/>
+              <a:endParaRPr lang="pt-BR"/>
+            </a:p>
+          </p:txBody>
+        </p:sp>
+        <p:sp>
+          <p:nvSpPr>
+            <p:cNvPr id="91" name="Retângulo 90"/>
+            <p:cNvSpPr/>
+            <p:nvPr/>
+          </p:nvSpPr>
+          <p:spPr>
+            <a:xfrm>
+              <a:off x="3519979" y="3279778"/>
+              <a:ext cx="78370" cy="409991"/>
+            </a:xfrm>
+            <a:prstGeom prst="rect">
+              <a:avLst/>
+            </a:prstGeom>
+            <a:solidFill>
+              <a:srgbClr val="FFC000"/>
+            </a:solidFill>
+            <a:ln>
+              <a:noFill/>
+            </a:ln>
+          </p:spPr>
+          <p:style>
+            <a:lnRef idx="2">
+              <a:schemeClr val="accent1">
+                <a:shade val="50000"/>
+              </a:schemeClr>
+            </a:lnRef>
+            <a:fillRef idx="1">
+              <a:schemeClr val="accent1"/>
+            </a:fillRef>
+            <a:effectRef idx="0">
+              <a:schemeClr val="accent1"/>
+            </a:effectRef>
+            <a:fontRef idx="minor">
+              <a:schemeClr val="lt1"/>
+            </a:fontRef>
+          </p:style>
+          <p:txBody>
+            <a:bodyPr rtlCol="0" anchor="ctr"/>
+            <a:lstStyle/>
+            <a:p>
+              <a:pPr algn="ctr"/>
+              <a:endParaRPr lang="pt-BR"/>
+            </a:p>
+          </p:txBody>
+        </p:sp>
+        <p:sp>
+          <p:nvSpPr>
+            <p:cNvPr id="92" name="Retângulo 91"/>
+            <p:cNvSpPr/>
+            <p:nvPr/>
+          </p:nvSpPr>
+          <p:spPr>
+            <a:xfrm>
+              <a:off x="3408982" y="2987904"/>
+              <a:ext cx="293854" cy="293854"/>
+            </a:xfrm>
+            <a:prstGeom prst="rect">
+              <a:avLst/>
+            </a:prstGeom>
+            <a:solidFill>
+              <a:srgbClr val="D3BBAF"/>
+            </a:solidFill>
+            <a:ln>
+              <a:noFill/>
+            </a:ln>
+          </p:spPr>
+          <p:style>
+            <a:lnRef idx="2">
+              <a:schemeClr val="accent1">
+                <a:shade val="50000"/>
+              </a:schemeClr>
+            </a:lnRef>
+            <a:fillRef idx="1">
+              <a:schemeClr val="accent1"/>
+            </a:fillRef>
+            <a:effectRef idx="0">
+              <a:schemeClr val="accent1"/>
+            </a:effectRef>
+            <a:fontRef idx="minor">
+              <a:schemeClr val="lt1"/>
+            </a:fontRef>
+          </p:style>
+          <p:txBody>
+            <a:bodyPr rtlCol="0" anchor="ctr"/>
+            <a:lstStyle/>
+            <a:p>
+              <a:pPr algn="ctr"/>
+              <a:endParaRPr lang="pt-BR"/>
+            </a:p>
+          </p:txBody>
+        </p:sp>
+        <p:sp>
+          <p:nvSpPr>
+            <p:cNvPr id="93" name="Fluxograma: Terminação 92"/>
+            <p:cNvSpPr/>
+            <p:nvPr/>
+          </p:nvSpPr>
+          <p:spPr>
+            <a:xfrm>
+              <a:off x="3310368" y="3257122"/>
+              <a:ext cx="497593" cy="24879"/>
+            </a:xfrm>
+            <a:prstGeom prst="flowChartTerminator">
+              <a:avLst/>
+            </a:prstGeom>
+            <a:solidFill>
+              <a:srgbClr val="C0C0C0"/>
+            </a:solidFill>
+            <a:ln>
+              <a:noFill/>
+            </a:ln>
+          </p:spPr>
+          <p:style>
+            <a:lnRef idx="2">
+              <a:schemeClr val="accent1">
+                <a:shade val="50000"/>
+              </a:schemeClr>
+            </a:lnRef>
+            <a:fillRef idx="1">
+              <a:schemeClr val="accent1"/>
+            </a:fillRef>
+            <a:effectRef idx="0">
+              <a:schemeClr val="accent1"/>
+            </a:effectRef>
+            <a:fontRef idx="minor">
+              <a:schemeClr val="lt1"/>
+            </a:fontRef>
+          </p:style>
+          <p:txBody>
+            <a:bodyPr rtlCol="0" anchor="ctr"/>
+            <a:lstStyle/>
+            <a:p>
+              <a:pPr algn="ctr"/>
+              <a:endParaRPr lang="pt-BR"/>
+            </a:p>
+          </p:txBody>
+        </p:sp>
+        <p:sp>
+          <p:nvSpPr>
+            <p:cNvPr id="94" name="Fluxograma: Terminação 93"/>
+            <p:cNvSpPr/>
+            <p:nvPr/>
+          </p:nvSpPr>
+          <p:spPr>
+            <a:xfrm>
+              <a:off x="3310368" y="3184451"/>
+              <a:ext cx="497593" cy="24879"/>
+            </a:xfrm>
+            <a:prstGeom prst="flowChartTerminator">
+              <a:avLst/>
+            </a:prstGeom>
+            <a:solidFill>
+              <a:srgbClr val="F5F0EA"/>
+            </a:solidFill>
+            <a:ln>
+              <a:noFill/>
+            </a:ln>
+          </p:spPr>
+          <p:style>
+            <a:lnRef idx="2">
+              <a:schemeClr val="accent1">
+                <a:shade val="50000"/>
+              </a:schemeClr>
+            </a:lnRef>
+            <a:fillRef idx="1">
+              <a:schemeClr val="accent1"/>
+            </a:fillRef>
+            <a:effectRef idx="0">
+              <a:schemeClr val="accent1"/>
+            </a:effectRef>
+            <a:fontRef idx="minor">
+              <a:schemeClr val="lt1"/>
+            </a:fontRef>
+          </p:style>
+          <p:txBody>
+            <a:bodyPr rtlCol="0" anchor="ctr"/>
+            <a:lstStyle/>
+            <a:p>
+              <a:pPr algn="ctr"/>
+              <a:endParaRPr lang="pt-BR"/>
+            </a:p>
+          </p:txBody>
+        </p:sp>
+        <p:sp>
+          <p:nvSpPr>
+            <p:cNvPr id="95" name="Forma livre 94"/>
+            <p:cNvSpPr/>
+            <p:nvPr/>
+          </p:nvSpPr>
+          <p:spPr>
+            <a:xfrm>
+              <a:off x="3519979" y="2835111"/>
+              <a:ext cx="78370" cy="254128"/>
+            </a:xfrm>
+            <a:custGeom>
+              <a:avLst/>
+              <a:gdLst>
+                <a:gd name="connsiteX0" fmla="*/ 0 w 144016"/>
+                <a:gd name="connsiteY0" fmla="*/ 0 h 559395"/>
+                <a:gd name="connsiteX1" fmla="*/ 1140 w 144016"/>
+                <a:gd name="connsiteY1" fmla="*/ 0 h 559395"/>
+                <a:gd name="connsiteX2" fmla="*/ 144016 w 144016"/>
+                <a:gd name="connsiteY2" fmla="*/ 166127 h 559395"/>
+                <a:gd name="connsiteX3" fmla="*/ 144016 w 144016"/>
+                <a:gd name="connsiteY3" fmla="*/ 559395 h 559395"/>
+                <a:gd name="connsiteX4" fmla="*/ 0 w 144016"/>
+                <a:gd name="connsiteY4" fmla="*/ 559395 h 559395"/>
+              </a:gdLst>
+              <a:ahLst/>
+              <a:cxnLst>
+                <a:cxn ang="0">
+                  <a:pos x="connsiteX0" y="connsiteY0"/>
+                </a:cxn>
+                <a:cxn ang="0">
+                  <a:pos x="connsiteX1" y="connsiteY1"/>
+                </a:cxn>
+                <a:cxn ang="0">
+                  <a:pos x="connsiteX2" y="connsiteY2"/>
+                </a:cxn>
+                <a:cxn ang="0">
+                  <a:pos x="connsiteX3" y="connsiteY3"/>
+                </a:cxn>
+                <a:cxn ang="0">
+                  <a:pos x="connsiteX4" y="connsiteY4"/>
+                </a:cxn>
+              </a:cxnLst>
+              <a:rect l="l" t="t" r="r" b="b"/>
+              <a:pathLst>
+                <a:path w="144016" h="559395">
+                  <a:moveTo>
+                    <a:pt x="0" y="0"/>
+                  </a:moveTo>
+                  <a:lnTo>
+                    <a:pt x="1140" y="0"/>
+                  </a:lnTo>
+                  <a:lnTo>
+                    <a:pt x="144016" y="166127"/>
+                  </a:lnTo>
+                  <a:lnTo>
+                    <a:pt x="144016" y="559395"/>
+                  </a:lnTo>
+                  <a:lnTo>
+                    <a:pt x="0" y="559395"/>
+                  </a:lnTo>
+                  <a:close/>
+                </a:path>
+              </a:pathLst>
+            </a:custGeom>
+            <a:solidFill>
+              <a:schemeClr val="bg1"/>
+            </a:solidFill>
+            <a:ln>
+              <a:noFill/>
+            </a:ln>
+          </p:spPr>
+          <p:style>
+            <a:lnRef idx="2">
+              <a:schemeClr val="accent1">
+                <a:shade val="50000"/>
+              </a:schemeClr>
+            </a:lnRef>
+            <a:fillRef idx="1">
+              <a:schemeClr val="accent1"/>
+            </a:fillRef>
+            <a:effectRef idx="0">
+              <a:schemeClr val="accent1"/>
+            </a:effectRef>
+            <a:fontRef idx="minor">
+              <a:schemeClr val="lt1"/>
+            </a:fontRef>
+          </p:style>
+          <p:txBody>
+            <a:bodyPr rtlCol="0" anchor="ctr"/>
+            <a:lstStyle/>
+            <a:p>
+              <a:pPr algn="ctr"/>
+              <a:endParaRPr lang="pt-BR"/>
+            </a:p>
+          </p:txBody>
+        </p:sp>
+        <p:sp>
+          <p:nvSpPr>
+            <p:cNvPr id="96" name="Retângulo 95"/>
+            <p:cNvSpPr/>
+            <p:nvPr/>
+          </p:nvSpPr>
+          <p:spPr>
+            <a:xfrm>
+              <a:off x="3378662" y="2983533"/>
+              <a:ext cx="352660" cy="109977"/>
+            </a:xfrm>
+            <a:prstGeom prst="rect">
+              <a:avLst/>
+            </a:prstGeom>
+            <a:solidFill>
+              <a:srgbClr val="C0C0C0"/>
+            </a:solidFill>
+            <a:ln>
+              <a:noFill/>
+            </a:ln>
+          </p:spPr>
+          <p:style>
+            <a:lnRef idx="2">
+              <a:schemeClr val="accent1">
+                <a:shade val="50000"/>
+              </a:schemeClr>
+            </a:lnRef>
+            <a:fillRef idx="1">
+              <a:schemeClr val="accent1"/>
+            </a:fillRef>
+            <a:effectRef idx="0">
+              <a:schemeClr val="accent1"/>
+            </a:effectRef>
+            <a:fontRef idx="minor">
+              <a:schemeClr val="lt1"/>
+            </a:fontRef>
+          </p:style>
+          <p:txBody>
+            <a:bodyPr rtlCol="0" anchor="ctr"/>
+            <a:lstStyle/>
+            <a:p>
+              <a:pPr algn="ctr"/>
+              <a:endParaRPr lang="pt-BR"/>
+            </a:p>
+          </p:txBody>
+        </p:sp>
+        <p:sp>
+          <p:nvSpPr>
+            <p:cNvPr id="97" name="Fluxograma: Terminação 96"/>
+            <p:cNvSpPr/>
+            <p:nvPr/>
+          </p:nvSpPr>
+          <p:spPr>
+            <a:xfrm>
+              <a:off x="3310368" y="3089139"/>
+              <a:ext cx="497593" cy="24879"/>
+            </a:xfrm>
+            <a:prstGeom prst="flowChartTerminator">
+              <a:avLst/>
+            </a:prstGeom>
+            <a:solidFill>
+              <a:srgbClr val="F5F0EA"/>
+            </a:solidFill>
+            <a:ln>
+              <a:noFill/>
+            </a:ln>
+          </p:spPr>
+          <p:style>
+            <a:lnRef idx="2">
+              <a:schemeClr val="accent1">
+                <a:shade val="50000"/>
+              </a:schemeClr>
+            </a:lnRef>
+            <a:fillRef idx="1">
+              <a:schemeClr val="accent1"/>
+            </a:fillRef>
+            <a:effectRef idx="0">
+              <a:schemeClr val="accent1"/>
+            </a:effectRef>
+            <a:fontRef idx="minor">
+              <a:schemeClr val="lt1"/>
+            </a:fontRef>
+          </p:style>
+          <p:txBody>
+            <a:bodyPr rtlCol="0" anchor="ctr"/>
+            <a:lstStyle/>
+            <a:p>
+              <a:pPr algn="ctr"/>
+              <a:endParaRPr lang="pt-BR"/>
+            </a:p>
+          </p:txBody>
+        </p:sp>
       </p:grpSp>
       <p:grpSp>
         <p:nvGrpSpPr>
@@ -22937,6 +21495,426 @@
             </p:txBody>
           </p:sp>
         </p:grpSp>
+      </p:grpSp>
+      <p:grpSp>
+        <p:nvGrpSpPr>
+          <p:cNvPr id="99" name="Grupo 98"/>
+          <p:cNvGrpSpPr/>
+          <p:nvPr/>
+        </p:nvGrpSpPr>
+        <p:grpSpPr>
+          <a:xfrm>
+            <a:off x="2311847" y="4637940"/>
+            <a:ext cx="2291796" cy="2175435"/>
+            <a:chOff x="2031802" y="799040"/>
+            <a:chExt cx="4640684" cy="4405064"/>
+          </a:xfrm>
+        </p:grpSpPr>
+        <p:sp>
+          <p:nvSpPr>
+            <p:cNvPr id="100" name="Retângulo de cantos arredondados 99"/>
+            <p:cNvSpPr/>
+            <p:nvPr/>
+          </p:nvSpPr>
+          <p:spPr>
+            <a:xfrm>
+              <a:off x="2339752" y="879670"/>
+              <a:ext cx="4332734" cy="4324434"/>
+            </a:xfrm>
+            <a:prstGeom prst="roundRect">
+              <a:avLst/>
+            </a:prstGeom>
+            <a:ln>
+              <a:noFill/>
+            </a:ln>
+          </p:spPr>
+          <p:style>
+            <a:lnRef idx="2">
+              <a:schemeClr val="accent1">
+                <a:shade val="50000"/>
+              </a:schemeClr>
+            </a:lnRef>
+            <a:fillRef idx="1">
+              <a:schemeClr val="accent1"/>
+            </a:fillRef>
+            <a:effectRef idx="0">
+              <a:schemeClr val="accent1"/>
+            </a:effectRef>
+            <a:fontRef idx="minor">
+              <a:schemeClr val="lt1"/>
+            </a:fontRef>
+          </p:style>
+          <p:txBody>
+            <a:bodyPr rtlCol="0" anchor="ctr"/>
+            <a:lstStyle/>
+            <a:p>
+              <a:pPr algn="ctr"/>
+              <a:endParaRPr lang="pt-BR"/>
+            </a:p>
+          </p:txBody>
+        </p:sp>
+        <p:sp>
+          <p:nvSpPr>
+            <p:cNvPr id="101" name="Forma livre 100"/>
+            <p:cNvSpPr/>
+            <p:nvPr/>
+          </p:nvSpPr>
+          <p:spPr>
+            <a:xfrm>
+              <a:off x="3419872" y="2132856"/>
+              <a:ext cx="3252614" cy="3071248"/>
+            </a:xfrm>
+            <a:custGeom>
+              <a:avLst/>
+              <a:gdLst>
+                <a:gd name="connsiteX0" fmla="*/ 1885950 w 3252614"/>
+                <a:gd name="connsiteY0" fmla="*/ 0 h 3071248"/>
+                <a:gd name="connsiteX1" fmla="*/ 3252614 w 3252614"/>
+                <a:gd name="connsiteY1" fmla="*/ 1587094 h 3071248"/>
+                <a:gd name="connsiteX2" fmla="*/ 3252614 w 3252614"/>
+                <a:gd name="connsiteY2" fmla="*/ 2350495 h 3071248"/>
+                <a:gd name="connsiteX3" fmla="*/ 2531861 w 3252614"/>
+                <a:gd name="connsiteY3" fmla="*/ 3071248 h 3071248"/>
+                <a:gd name="connsiteX4" fmla="*/ 821354 w 3252614"/>
+                <a:gd name="connsiteY4" fmla="*/ 3071248 h 3071248"/>
+                <a:gd name="connsiteX5" fmla="*/ 0 w 3252614"/>
+                <a:gd name="connsiteY5" fmla="*/ 1708150 h 3071248"/>
+              </a:gdLst>
+              <a:ahLst/>
+              <a:cxnLst>
+                <a:cxn ang="0">
+                  <a:pos x="connsiteX0" y="connsiteY0"/>
+                </a:cxn>
+                <a:cxn ang="0">
+                  <a:pos x="connsiteX1" y="connsiteY1"/>
+                </a:cxn>
+                <a:cxn ang="0">
+                  <a:pos x="connsiteX2" y="connsiteY2"/>
+                </a:cxn>
+                <a:cxn ang="0">
+                  <a:pos x="connsiteX3" y="connsiteY3"/>
+                </a:cxn>
+                <a:cxn ang="0">
+                  <a:pos x="connsiteX4" y="connsiteY4"/>
+                </a:cxn>
+                <a:cxn ang="0">
+                  <a:pos x="connsiteX5" y="connsiteY5"/>
+                </a:cxn>
+              </a:cxnLst>
+              <a:rect l="l" t="t" r="r" b="b"/>
+              <a:pathLst>
+                <a:path w="3252614" h="3071248">
+                  <a:moveTo>
+                    <a:pt x="1885950" y="0"/>
+                  </a:moveTo>
+                  <a:lnTo>
+                    <a:pt x="3252614" y="1587094"/>
+                  </a:lnTo>
+                  <a:lnTo>
+                    <a:pt x="3252614" y="2350495"/>
+                  </a:lnTo>
+                  <a:cubicBezTo>
+                    <a:pt x="3252614" y="2748556"/>
+                    <a:pt x="2929922" y="3071248"/>
+                    <a:pt x="2531861" y="3071248"/>
+                  </a:cubicBezTo>
+                  <a:lnTo>
+                    <a:pt x="821354" y="3071248"/>
+                  </a:lnTo>
+                  <a:lnTo>
+                    <a:pt x="0" y="1708150"/>
+                  </a:lnTo>
+                  <a:close/>
+                </a:path>
+              </a:pathLst>
+            </a:custGeom>
+            <a:solidFill>
+              <a:srgbClr val="000000">
+                <a:alpha val="16078"/>
+              </a:srgbClr>
+            </a:solidFill>
+            <a:ln>
+              <a:noFill/>
+            </a:ln>
+          </p:spPr>
+          <p:style>
+            <a:lnRef idx="2">
+              <a:schemeClr val="accent1">
+                <a:shade val="50000"/>
+              </a:schemeClr>
+            </a:lnRef>
+            <a:fillRef idx="1">
+              <a:schemeClr val="accent1"/>
+            </a:fillRef>
+            <a:effectRef idx="0">
+              <a:schemeClr val="accent1"/>
+            </a:effectRef>
+            <a:fontRef idx="minor">
+              <a:schemeClr val="lt1"/>
+            </a:fontRef>
+          </p:style>
+          <p:txBody>
+            <a:bodyPr rtlCol="0" anchor="ctr"/>
+            <a:lstStyle/>
+            <a:p>
+              <a:pPr algn="ctr"/>
+              <a:endParaRPr lang="pt-BR"/>
+            </a:p>
+          </p:txBody>
+        </p:sp>
+        <p:pic>
+          <p:nvPicPr>
+            <p:cNvPr id="102" name="Imagem 101"/>
+            <p:cNvPicPr>
+              <a:picLocks noChangeAspect="1"/>
+            </p:cNvPicPr>
+            <p:nvPr/>
+          </p:nvPicPr>
+          <p:blipFill>
+            <a:blip r:embed="rId2"/>
+            <a:stretch>
+              <a:fillRect/>
+            </a:stretch>
+          </p:blipFill>
+          <p:spPr>
+            <a:xfrm>
+              <a:off x="2031802" y="799040"/>
+              <a:ext cx="4476750" cy="4392488"/>
+            </a:xfrm>
+            <a:prstGeom prst="rect">
+              <a:avLst/>
+            </a:prstGeom>
+            <a:ln>
+              <a:noFill/>
+            </a:ln>
+          </p:spPr>
+        </p:pic>
+      </p:grpSp>
+      <p:grpSp>
+        <p:nvGrpSpPr>
+          <p:cNvPr id="103" name="Grupo 102"/>
+          <p:cNvGrpSpPr/>
+          <p:nvPr/>
+        </p:nvGrpSpPr>
+        <p:grpSpPr>
+          <a:xfrm>
+            <a:off x="-108519" y="2043549"/>
+            <a:ext cx="2767774" cy="2755636"/>
+            <a:chOff x="4492981" y="2149439"/>
+            <a:chExt cx="2642719" cy="2631129"/>
+          </a:xfrm>
+        </p:grpSpPr>
+        <p:sp>
+          <p:nvSpPr>
+            <p:cNvPr id="104" name="Retângulo de cantos arredondados 103"/>
+            <p:cNvSpPr/>
+            <p:nvPr/>
+          </p:nvSpPr>
+          <p:spPr>
+            <a:xfrm>
+              <a:off x="4815126" y="2521521"/>
+              <a:ext cx="1998431" cy="1998431"/>
+            </a:xfrm>
+            <a:prstGeom prst="roundRect">
+              <a:avLst/>
+            </a:prstGeom>
+            <a:solidFill>
+              <a:srgbClr val="79CD4B"/>
+            </a:solidFill>
+            <a:ln>
+              <a:noFill/>
+            </a:ln>
+          </p:spPr>
+          <p:style>
+            <a:lnRef idx="2">
+              <a:schemeClr val="accent1">
+                <a:shade val="50000"/>
+              </a:schemeClr>
+            </a:lnRef>
+            <a:fillRef idx="1">
+              <a:schemeClr val="accent1"/>
+            </a:fillRef>
+            <a:effectRef idx="0">
+              <a:schemeClr val="accent1"/>
+            </a:effectRef>
+            <a:fontRef idx="minor">
+              <a:schemeClr val="lt1"/>
+            </a:fontRef>
+          </p:style>
+          <p:txBody>
+            <a:bodyPr rtlCol="0" anchor="ctr"/>
+            <a:lstStyle/>
+            <a:p>
+              <a:pPr algn="ctr"/>
+              <a:endParaRPr lang="pt-BR"/>
+            </a:p>
+          </p:txBody>
+        </p:sp>
+        <p:sp>
+          <p:nvSpPr>
+            <p:cNvPr id="105" name="Forma livre 104"/>
+            <p:cNvSpPr/>
+            <p:nvPr/>
+          </p:nvSpPr>
+          <p:spPr>
+            <a:xfrm>
+              <a:off x="5654041" y="3063240"/>
+              <a:ext cx="1160693" cy="1456712"/>
+            </a:xfrm>
+            <a:custGeom>
+              <a:avLst/>
+              <a:gdLst>
+                <a:gd name="connsiteX0" fmla="*/ 281940 w 1160693"/>
+                <a:gd name="connsiteY0" fmla="*/ 0 h 1456712"/>
+                <a:gd name="connsiteX1" fmla="*/ 739140 w 1160693"/>
+                <a:gd name="connsiteY1" fmla="*/ 137160 h 1456712"/>
+                <a:gd name="connsiteX2" fmla="*/ 1160693 w 1160693"/>
+                <a:gd name="connsiteY2" fmla="*/ 347937 h 1456712"/>
+                <a:gd name="connsiteX3" fmla="*/ 1160693 w 1160693"/>
+                <a:gd name="connsiteY3" fmla="*/ 1123634 h 1456712"/>
+                <a:gd name="connsiteX4" fmla="*/ 827615 w 1160693"/>
+                <a:gd name="connsiteY4" fmla="*/ 1456712 h 1456712"/>
+                <a:gd name="connsiteX5" fmla="*/ 103399 w 1160693"/>
+                <a:gd name="connsiteY5" fmla="*/ 1456712 h 1456712"/>
+                <a:gd name="connsiteX6" fmla="*/ 0 w 1160693"/>
+                <a:gd name="connsiteY6" fmla="*/ 1097280 h 1456712"/>
+                <a:gd name="connsiteX7" fmla="*/ 152400 w 1160693"/>
+                <a:gd name="connsiteY7" fmla="*/ 1043940 h 1456712"/>
+                <a:gd name="connsiteX8" fmla="*/ 129540 w 1160693"/>
+                <a:gd name="connsiteY8" fmla="*/ 701040 h 1456712"/>
+                <a:gd name="connsiteX9" fmla="*/ 167640 w 1160693"/>
+                <a:gd name="connsiteY9" fmla="*/ 251460 h 1456712"/>
+              </a:gdLst>
+              <a:ahLst/>
+              <a:cxnLst>
+                <a:cxn ang="0">
+                  <a:pos x="connsiteX0" y="connsiteY0"/>
+                </a:cxn>
+                <a:cxn ang="0">
+                  <a:pos x="connsiteX1" y="connsiteY1"/>
+                </a:cxn>
+                <a:cxn ang="0">
+                  <a:pos x="connsiteX2" y="connsiteY2"/>
+                </a:cxn>
+                <a:cxn ang="0">
+                  <a:pos x="connsiteX3" y="connsiteY3"/>
+                </a:cxn>
+                <a:cxn ang="0">
+                  <a:pos x="connsiteX4" y="connsiteY4"/>
+                </a:cxn>
+                <a:cxn ang="0">
+                  <a:pos x="connsiteX5" y="connsiteY5"/>
+                </a:cxn>
+                <a:cxn ang="0">
+                  <a:pos x="connsiteX6" y="connsiteY6"/>
+                </a:cxn>
+                <a:cxn ang="0">
+                  <a:pos x="connsiteX7" y="connsiteY7"/>
+                </a:cxn>
+                <a:cxn ang="0">
+                  <a:pos x="connsiteX8" y="connsiteY8"/>
+                </a:cxn>
+                <a:cxn ang="0">
+                  <a:pos x="connsiteX9" y="connsiteY9"/>
+                </a:cxn>
+              </a:cxnLst>
+              <a:rect l="l" t="t" r="r" b="b"/>
+              <a:pathLst>
+                <a:path w="1160693" h="1456712">
+                  <a:moveTo>
+                    <a:pt x="281940" y="0"/>
+                  </a:moveTo>
+                  <a:lnTo>
+                    <a:pt x="739140" y="137160"/>
+                  </a:lnTo>
+                  <a:lnTo>
+                    <a:pt x="1160693" y="347937"/>
+                  </a:lnTo>
+                  <a:lnTo>
+                    <a:pt x="1160693" y="1123634"/>
+                  </a:lnTo>
+                  <a:cubicBezTo>
+                    <a:pt x="1160693" y="1307588"/>
+                    <a:pt x="1011569" y="1456712"/>
+                    <a:pt x="827615" y="1456712"/>
+                  </a:cubicBezTo>
+                  <a:lnTo>
+                    <a:pt x="103399" y="1456712"/>
+                  </a:lnTo>
+                  <a:lnTo>
+                    <a:pt x="0" y="1097280"/>
+                  </a:lnTo>
+                  <a:lnTo>
+                    <a:pt x="152400" y="1043940"/>
+                  </a:lnTo>
+                  <a:lnTo>
+                    <a:pt x="129540" y="701040"/>
+                  </a:lnTo>
+                  <a:lnTo>
+                    <a:pt x="167640" y="251460"/>
+                  </a:lnTo>
+                  <a:close/>
+                </a:path>
+              </a:pathLst>
+            </a:custGeom>
+            <a:solidFill>
+              <a:srgbClr val="000000">
+                <a:alpha val="16863"/>
+              </a:srgbClr>
+            </a:solidFill>
+            <a:ln>
+              <a:noFill/>
+            </a:ln>
+          </p:spPr>
+          <p:style>
+            <a:lnRef idx="2">
+              <a:schemeClr val="accent1">
+                <a:shade val="50000"/>
+              </a:schemeClr>
+            </a:lnRef>
+            <a:fillRef idx="1">
+              <a:schemeClr val="accent1"/>
+            </a:fillRef>
+            <a:effectRef idx="0">
+              <a:schemeClr val="accent1"/>
+            </a:effectRef>
+            <a:fontRef idx="minor">
+              <a:schemeClr val="lt1"/>
+            </a:fontRef>
+          </p:style>
+          <p:txBody>
+            <a:bodyPr rtlCol="0" anchor="ctr"/>
+            <a:lstStyle/>
+            <a:p>
+              <a:pPr algn="ctr"/>
+              <a:endParaRPr lang="pt-BR"/>
+            </a:p>
+          </p:txBody>
+        </p:sp>
+        <p:pic>
+          <p:nvPicPr>
+            <p:cNvPr id="106" name="Imagem 105"/>
+            <p:cNvPicPr>
+              <a:picLocks noChangeAspect="1"/>
+            </p:cNvPicPr>
+            <p:nvPr/>
+          </p:nvPicPr>
+          <p:blipFill>
+            <a:blip r:embed="rId3"/>
+            <a:stretch>
+              <a:fillRect/>
+            </a:stretch>
+          </p:blipFill>
+          <p:spPr>
+            <a:xfrm>
+              <a:off x="4492981" y="2149439"/>
+              <a:ext cx="2642719" cy="2631129"/>
+            </a:xfrm>
+            <a:prstGeom prst="rect">
+              <a:avLst/>
+            </a:prstGeom>
+          </p:spPr>
+        </p:pic>
       </p:grpSp>
     </p:spTree>
     <p:extLst>

</xml_diff>